<commit_message>
Small changes and references fix
</commit_message>
<xml_diff>
--- a/presentations/2018 CMCL/RSAPosterCMCL2018_GS.pptx
+++ b/presentations/2018 CMCL/RSAPosterCMCL2018_GS.pptx
@@ -215,7 +215,7 @@
           <a:p>
             <a:fld id="{69CE500B-FF5B-4B28-95C2-E41CE5CE306B}" type="datetimeFigureOut">
               <a:rPr lang="en-US" smtClean="0"/>
-              <a:t>12/20/17</a:t>
+              <a:t>12/20/2017</a:t>
             </a:fld>
             <a:endParaRPr lang="en-US"/>
           </a:p>
@@ -697,7 +697,7 @@
           <a:p>
             <a:fld id="{DE94126C-84A0-4B2B-A8D1-685EF76357B6}" type="datetimeFigureOut">
               <a:rPr lang="en-US" smtClean="0"/>
-              <a:t>12/20/17</a:t>
+              <a:t>12/20/2017</a:t>
             </a:fld>
             <a:endParaRPr lang="en-US"/>
           </a:p>
@@ -867,7 +867,7 @@
           <a:p>
             <a:fld id="{DE94126C-84A0-4B2B-A8D1-685EF76357B6}" type="datetimeFigureOut">
               <a:rPr lang="en-US" smtClean="0"/>
-              <a:t>12/20/17</a:t>
+              <a:t>12/20/2017</a:t>
             </a:fld>
             <a:endParaRPr lang="en-US"/>
           </a:p>
@@ -1047,7 +1047,7 @@
           <a:p>
             <a:fld id="{DE94126C-84A0-4B2B-A8D1-685EF76357B6}" type="datetimeFigureOut">
               <a:rPr lang="en-US" smtClean="0"/>
-              <a:t>12/20/17</a:t>
+              <a:t>12/20/2017</a:t>
             </a:fld>
             <a:endParaRPr lang="en-US"/>
           </a:p>
@@ -1217,7 +1217,7 @@
           <a:p>
             <a:fld id="{DE94126C-84A0-4B2B-A8D1-685EF76357B6}" type="datetimeFigureOut">
               <a:rPr lang="en-US" smtClean="0"/>
-              <a:t>12/20/17</a:t>
+              <a:t>12/20/2017</a:t>
             </a:fld>
             <a:endParaRPr lang="en-US"/>
           </a:p>
@@ -1461,7 +1461,7 @@
           <a:p>
             <a:fld id="{DE94126C-84A0-4B2B-A8D1-685EF76357B6}" type="datetimeFigureOut">
               <a:rPr lang="en-US" smtClean="0"/>
-              <a:t>12/20/17</a:t>
+              <a:t>12/20/2017</a:t>
             </a:fld>
             <a:endParaRPr lang="en-US"/>
           </a:p>
@@ -1693,7 +1693,7 @@
           <a:p>
             <a:fld id="{DE94126C-84A0-4B2B-A8D1-685EF76357B6}" type="datetimeFigureOut">
               <a:rPr lang="en-US" smtClean="0"/>
-              <a:t>12/20/17</a:t>
+              <a:t>12/20/2017</a:t>
             </a:fld>
             <a:endParaRPr lang="en-US"/>
           </a:p>
@@ -2060,7 +2060,7 @@
           <a:p>
             <a:fld id="{DE94126C-84A0-4B2B-A8D1-685EF76357B6}" type="datetimeFigureOut">
               <a:rPr lang="en-US" smtClean="0"/>
-              <a:t>12/20/17</a:t>
+              <a:t>12/20/2017</a:t>
             </a:fld>
             <a:endParaRPr lang="en-US"/>
           </a:p>
@@ -2178,7 +2178,7 @@
           <a:p>
             <a:fld id="{DE94126C-84A0-4B2B-A8D1-685EF76357B6}" type="datetimeFigureOut">
               <a:rPr lang="en-US" smtClean="0"/>
-              <a:t>12/20/17</a:t>
+              <a:t>12/20/2017</a:t>
             </a:fld>
             <a:endParaRPr lang="en-US"/>
           </a:p>
@@ -2273,7 +2273,7 @@
           <a:p>
             <a:fld id="{DE94126C-84A0-4B2B-A8D1-685EF76357B6}" type="datetimeFigureOut">
               <a:rPr lang="en-US" smtClean="0"/>
-              <a:t>12/20/17</a:t>
+              <a:t>12/20/2017</a:t>
             </a:fld>
             <a:endParaRPr lang="en-US"/>
           </a:p>
@@ -2550,7 +2550,7 @@
           <a:p>
             <a:fld id="{DE94126C-84A0-4B2B-A8D1-685EF76357B6}" type="datetimeFigureOut">
               <a:rPr lang="en-US" smtClean="0"/>
-              <a:t>12/20/17</a:t>
+              <a:t>12/20/2017</a:t>
             </a:fld>
             <a:endParaRPr lang="en-US"/>
           </a:p>
@@ -2807,7 +2807,7 @@
           <a:p>
             <a:fld id="{DE94126C-84A0-4B2B-A8D1-685EF76357B6}" type="datetimeFigureOut">
               <a:rPr lang="en-US" smtClean="0"/>
-              <a:t>12/20/17</a:t>
+              <a:t>12/20/2017</a:t>
             </a:fld>
             <a:endParaRPr lang="en-US"/>
           </a:p>
@@ -3020,7 +3020,7 @@
           <a:p>
             <a:fld id="{DE94126C-84A0-4B2B-A8D1-685EF76357B6}" type="datetimeFigureOut">
               <a:rPr lang="en-US" smtClean="0"/>
-              <a:t>12/20/17</a:t>
+              <a:t>12/20/2017</a:t>
             </a:fld>
             <a:endParaRPr lang="en-US"/>
           </a:p>
@@ -3488,7 +3488,7 @@
           <p:cNvPr id="127" name="TextBox 126">
             <a:extLst>
               <a:ext uri="{FF2B5EF4-FFF2-40B4-BE49-F238E27FC236}">
-                <a16:creationId xmlns="" xmlns:a16="http://schemas.microsoft.com/office/drawing/2014/main" id="{EEAA3936-7914-4CE9-99DB-DF7A4AA95BA1}"/>
+                <a16:creationId xmlns:a16="http://schemas.microsoft.com/office/drawing/2014/main" id="{EEAA3936-7914-4CE9-99DB-DF7A4AA95BA1}"/>
               </a:ext>
             </a:extLst>
           </p:cNvPr>
@@ -3512,7 +3512,7 @@
           <a:lstStyle/>
           <a:p>
             <a:r>
-              <a:rPr lang="en-US" sz="3200" dirty="0" err="1" smtClean="0">
+              <a:rPr lang="en-US" sz="3200" dirty="0" err="1">
                 <a:latin typeface="Helvetica" charset="0"/>
                 <a:ea typeface="Helvetica" charset="0"/>
                 <a:cs typeface="Helvetica" charset="0"/>
@@ -3520,7 +3520,7 @@
               <a:t>Musolino</a:t>
             </a:r>
             <a:r>
-              <a:rPr lang="en-US" sz="3200" dirty="0" smtClean="0">
+              <a:rPr lang="en-US" sz="3200" dirty="0">
                 <a:latin typeface="Helvetica" charset="0"/>
                 <a:ea typeface="Helvetica" charset="0"/>
                 <a:cs typeface="Helvetica" charset="0"/>
@@ -3528,7 +3528,7 @@
               <a:t> &amp; </a:t>
             </a:r>
             <a:r>
-              <a:rPr lang="en-US" sz="3200" dirty="0" err="1" smtClean="0">
+              <a:rPr lang="en-US" sz="3200" dirty="0" err="1">
                 <a:latin typeface="Helvetica" charset="0"/>
                 <a:ea typeface="Helvetica" charset="0"/>
                 <a:cs typeface="Helvetica" charset="0"/>
@@ -3536,23 +3536,15 @@
               <a:t>Lidz</a:t>
             </a:r>
             <a:r>
-              <a:rPr lang="en-US" sz="3200" dirty="0" smtClean="0">
-                <a:latin typeface="Helvetica" charset="0"/>
-                <a:ea typeface="Helvetica" charset="0"/>
-                <a:cs typeface="Helvetica" charset="0"/>
-              </a:rPr>
-              <a:t> </a:t>
-            </a:r>
-            <a:r>
-              <a:rPr lang="en-US" sz="3200" dirty="0" smtClean="0">
-                <a:latin typeface="Helvetica" charset="0"/>
-                <a:ea typeface="Helvetica" charset="0"/>
-                <a:cs typeface="Helvetica" charset="0"/>
-              </a:rPr>
-              <a:t>(2003) show that </a:t>
-            </a:r>
-            <a:r>
-              <a:rPr lang="en-US" sz="3200" b="1" dirty="0" smtClean="0">
+              <a:rPr lang="en-US" sz="3200" dirty="0">
+                <a:latin typeface="Helvetica" charset="0"/>
+                <a:ea typeface="Helvetica" charset="0"/>
+                <a:cs typeface="Helvetica" charset="0"/>
+              </a:rPr>
+              <a:t> (2003) show that </a:t>
+            </a:r>
+            <a:r>
+              <a:rPr lang="en-US" sz="3200" b="1" dirty="0">
                 <a:latin typeface="Helvetica" charset="0"/>
                 <a:ea typeface="Helvetica" charset="0"/>
                 <a:cs typeface="Helvetica" charset="0"/>
@@ -3560,7 +3552,7 @@
               <a:t>adults</a:t>
             </a:r>
             <a:r>
-              <a:rPr lang="en-US" sz="3200" dirty="0" smtClean="0">
+              <a:rPr lang="en-US" sz="3200" dirty="0">
                 <a:latin typeface="Helvetica" charset="0"/>
                 <a:ea typeface="Helvetica" charset="0"/>
                 <a:cs typeface="Helvetica" charset="0"/>
@@ -3568,7 +3560,7 @@
               <a:t> refuse to endorse </a:t>
             </a:r>
             <a:r>
-              <a:rPr lang="en-US" sz="3200" dirty="0" smtClean="0">
+              <a:rPr lang="en-US" sz="3200" dirty="0">
                 <a:latin typeface="Courier" charset="0"/>
                 <a:ea typeface="Courier" charset="0"/>
                 <a:cs typeface="Courier" charset="0"/>
@@ -3576,18 +3568,13 @@
               <a:t>two-not</a:t>
             </a:r>
             <a:r>
-              <a:rPr lang="en-US" sz="3200" dirty="0" smtClean="0">
+              <a:rPr lang="en-US" sz="3200" dirty="0">
                 <a:latin typeface="Helvetica" charset="0"/>
                 <a:ea typeface="Helvetica" charset="0"/>
                 <a:cs typeface="Helvetica" charset="0"/>
               </a:rPr>
               <a:t> utterances in certain contexts:</a:t>
             </a:r>
-            <a:endParaRPr lang="en-US" sz="3200" dirty="0">
-              <a:latin typeface="Helvetica" charset="0"/>
-              <a:ea typeface="Helvetica" charset="0"/>
-              <a:cs typeface="Helvetica" charset="0"/>
-            </a:endParaRPr>
           </a:p>
         </p:txBody>
       </p:sp>
@@ -3596,7 +3583,7 @@
           <p:cNvPr id="169" name="Picture 168">
             <a:extLst>
               <a:ext uri="{FF2B5EF4-FFF2-40B4-BE49-F238E27FC236}">
-                <a16:creationId xmlns="" xmlns:a16="http://schemas.microsoft.com/office/drawing/2014/main" id="{8D050889-FB9D-491E-A95E-778F47B1E4FE}"/>
+                <a16:creationId xmlns:a16="http://schemas.microsoft.com/office/drawing/2014/main" id="{8D050889-FB9D-491E-A95E-778F47B1E4FE}"/>
               </a:ext>
             </a:extLst>
           </p:cNvPr>
@@ -3613,7 +3600,7 @@
         </p:blipFill>
         <p:spPr>
           <a:xfrm>
-            <a:off x="40189757" y="16392764"/>
+            <a:off x="40191587" y="16358576"/>
             <a:ext cx="1045286" cy="1096113"/>
           </a:xfrm>
           <a:prstGeom prst="rect">
@@ -3626,7 +3613,7 @@
           <p:cNvPr id="41" name="Picture 40">
             <a:extLst>
               <a:ext uri="{FF2B5EF4-FFF2-40B4-BE49-F238E27FC236}">
-                <a16:creationId xmlns="" xmlns:a16="http://schemas.microsoft.com/office/drawing/2014/main" id="{7191ED53-E81F-4B76-9EBB-A450C102DF2F}"/>
+                <a16:creationId xmlns:a16="http://schemas.microsoft.com/office/drawing/2014/main" id="{7191ED53-E81F-4B76-9EBB-A450C102DF2F}"/>
               </a:ext>
             </a:extLst>
           </p:cNvPr>
@@ -3662,7 +3649,7 @@
           <p:cNvPr id="134" name="Rectangle 133">
             <a:extLst>
               <a:ext uri="{FF2B5EF4-FFF2-40B4-BE49-F238E27FC236}">
-                <a16:creationId xmlns="" xmlns:a16="http://schemas.microsoft.com/office/drawing/2014/main" id="{32FD2C88-DD69-4C4B-AB1B-5AE8FF06BA5B}"/>
+                <a16:creationId xmlns:a16="http://schemas.microsoft.com/office/drawing/2014/main" id="{32FD2C88-DD69-4C4B-AB1B-5AE8FF06BA5B}"/>
               </a:ext>
             </a:extLst>
           </p:cNvPr>
@@ -3724,7 +3711,7 @@
           <p:cNvPr id="91" name="TextBox 90">
             <a:extLst>
               <a:ext uri="{FF2B5EF4-FFF2-40B4-BE49-F238E27FC236}">
-                <a16:creationId xmlns="" xmlns:a16="http://schemas.microsoft.com/office/drawing/2014/main" id="{FD11FAC6-BD2B-4B4F-B7DB-34B067D55296}"/>
+                <a16:creationId xmlns:a16="http://schemas.microsoft.com/office/drawing/2014/main" id="{FD11FAC6-BD2B-4B4F-B7DB-34B067D55296}"/>
               </a:ext>
             </a:extLst>
           </p:cNvPr>
@@ -3748,36 +3735,12 @@
           <a:lstStyle/>
           <a:p>
             <a:r>
-              <a:rPr lang="en-US" sz="3200" dirty="0" smtClean="0">
-                <a:latin typeface="Helvetica" charset="0"/>
-                <a:ea typeface="Helvetica" charset="0"/>
-                <a:cs typeface="Helvetica" charset="0"/>
-              </a:rPr>
-              <a:t>TVJT </a:t>
-            </a:r>
-            <a:r>
-              <a:rPr lang="en-US" sz="3200" dirty="0">
-                <a:latin typeface="Helvetica" charset="0"/>
-                <a:ea typeface="Helvetica" charset="0"/>
-                <a:cs typeface="Helvetica" charset="0"/>
-              </a:rPr>
-              <a:t>behavior </a:t>
-            </a:r>
-            <a:r>
-              <a:rPr lang="en-US" sz="3200" dirty="0" smtClean="0">
-                <a:latin typeface="Helvetica" charset="0"/>
-                <a:ea typeface="Helvetica" charset="0"/>
-                <a:cs typeface="Helvetica" charset="0"/>
-              </a:rPr>
-              <a:t>modeled as </a:t>
-            </a:r>
-            <a:r>
-              <a:rPr lang="en-US" sz="3200" dirty="0">
-                <a:latin typeface="Helvetica" charset="0"/>
-                <a:ea typeface="Helvetica" charset="0"/>
-                <a:cs typeface="Helvetica" charset="0"/>
-              </a:rPr>
-              <a:t>utterance </a:t>
+              <a:rPr lang="en-US" sz="3200" dirty="0">
+                <a:latin typeface="Helvetica" charset="0"/>
+                <a:ea typeface="Helvetica" charset="0"/>
+                <a:cs typeface="Helvetica" charset="0"/>
+              </a:rPr>
+              <a:t>TVJT behavior modeled as utterance </a:t>
             </a:r>
             <a:r>
               <a:rPr lang="en-US" sz="3200" b="1" dirty="0">
@@ -3801,55 +3764,15 @@
                 <a:ea typeface="Helvetica" charset="0"/>
                 <a:cs typeface="Helvetica" charset="0"/>
               </a:rPr>
-              <a:t>Degen &amp; Goodman, 2014; Tessler &amp; Goodman, </a:t>
-            </a:r>
-            <a:r>
-              <a:rPr lang="en-US" sz="2400" dirty="0" smtClean="0">
-                <a:latin typeface="Helvetica" charset="0"/>
-                <a:ea typeface="Helvetica" charset="0"/>
-                <a:cs typeface="Helvetica" charset="0"/>
-              </a:rPr>
-              <a:t>2016</a:t>
-            </a:r>
-            <a:r>
-              <a:rPr lang="en-US" sz="3200" dirty="0" smtClean="0">
-                <a:latin typeface="Helvetica" charset="0"/>
-                <a:ea typeface="Helvetica" charset="0"/>
-                <a:cs typeface="Helvetica" charset="0"/>
-              </a:rPr>
-              <a:t>): A </a:t>
-            </a:r>
-            <a:r>
-              <a:rPr lang="en-US" sz="3200" dirty="0">
-                <a:latin typeface="Helvetica" charset="0"/>
-                <a:ea typeface="Helvetica" charset="0"/>
-                <a:cs typeface="Helvetica" charset="0"/>
-              </a:rPr>
-              <a:t>pragmatic </a:t>
-            </a:r>
-            <a:r>
-              <a:rPr lang="en-US" sz="3200" dirty="0" smtClean="0">
-                <a:latin typeface="Helvetica" charset="0"/>
-                <a:ea typeface="Helvetica" charset="0"/>
-                <a:cs typeface="Helvetica" charset="0"/>
-              </a:rPr>
-              <a:t>speaker observes </a:t>
-            </a:r>
-            <a:r>
-              <a:rPr lang="en-US" sz="3200" dirty="0">
-                <a:latin typeface="Helvetica" charset="0"/>
-                <a:ea typeface="Helvetica" charset="0"/>
-                <a:cs typeface="Helvetica" charset="0"/>
-              </a:rPr>
-              <a:t>the </a:t>
-            </a:r>
-            <a:r>
-              <a:rPr lang="en-US" sz="3200" dirty="0" smtClean="0">
-                <a:latin typeface="Helvetica" charset="0"/>
-                <a:ea typeface="Helvetica" charset="0"/>
-                <a:cs typeface="Helvetica" charset="0"/>
-              </a:rPr>
-              <a:t>state of the world and decides whether to describe it with the</a:t>
+              <a:t>Degen &amp; Goodman, 2014; Tessler &amp; Goodman, 2016</a:t>
+            </a:r>
+            <a:r>
+              <a:rPr lang="en-US" sz="3200" dirty="0">
+                <a:latin typeface="Helvetica" charset="0"/>
+                <a:ea typeface="Helvetica" charset="0"/>
+                <a:cs typeface="Helvetica" charset="0"/>
+              </a:rPr>
+              <a:t>): A pragmatic speaker observes the state of the world and decides whether to describe it with the</a:t>
             </a:r>
             <a:r>
               <a:rPr lang="en-US" sz="3200" dirty="0">
@@ -3860,18 +3783,13 @@
               <a:t> every-not </a:t>
             </a:r>
             <a:r>
-              <a:rPr lang="en-US" sz="3200" dirty="0" smtClean="0">
+              <a:rPr lang="en-US" sz="3200" dirty="0">
                 <a:latin typeface="Helvetica" charset="0"/>
                 <a:ea typeface="Helvetica" charset="0"/>
                 <a:cs typeface="Helvetica" charset="0"/>
               </a:rPr>
               <a:t>utterance</a:t>
             </a:r>
-            <a:endParaRPr lang="en-US" sz="3200" dirty="0">
-              <a:latin typeface="Helvetica" charset="0"/>
-              <a:ea typeface="Helvetica" charset="0"/>
-              <a:cs typeface="Helvetica" charset="0"/>
-            </a:endParaRPr>
           </a:p>
         </p:txBody>
       </p:sp>
@@ -3880,7 +3798,7 @@
           <p:cNvPr id="23" name="Picture 22">
             <a:extLst>
               <a:ext uri="{FF2B5EF4-FFF2-40B4-BE49-F238E27FC236}">
-                <a16:creationId xmlns="" xmlns:a16="http://schemas.microsoft.com/office/drawing/2014/main" id="{C681D177-A061-4120-9217-8AA5221C252A}"/>
+                <a16:creationId xmlns:a16="http://schemas.microsoft.com/office/drawing/2014/main" id="{C681D177-A061-4120-9217-8AA5221C252A}"/>
               </a:ext>
             </a:extLst>
           </p:cNvPr>
@@ -3916,7 +3834,7 @@
           <p:cNvPr id="20" name="Picture 19">
             <a:extLst>
               <a:ext uri="{FF2B5EF4-FFF2-40B4-BE49-F238E27FC236}">
-                <a16:creationId xmlns="" xmlns:a16="http://schemas.microsoft.com/office/drawing/2014/main" id="{D67AB339-B55B-433D-B35B-BDDC5B1F0B6B}"/>
+                <a16:creationId xmlns:a16="http://schemas.microsoft.com/office/drawing/2014/main" id="{D67AB339-B55B-433D-B35B-BDDC5B1F0B6B}"/>
               </a:ext>
             </a:extLst>
           </p:cNvPr>
@@ -4087,28 +4005,9 @@
               </a:rPr>
               <a:t>Exactly two things to learn from modeling scope ambiguity resolution: </a:t>
             </a:r>
-            <a:endParaRPr lang="en-US" sz="7600" b="1" dirty="0" smtClean="0">
-              <a:solidFill>
-                <a:srgbClr val="2F5697"/>
-              </a:solidFill>
-              <a:latin typeface="Helvetica" charset="0"/>
-              <a:ea typeface="Helvetica" charset="0"/>
-              <a:cs typeface="Helvetica" charset="0"/>
-            </a:endParaRPr>
           </a:p>
           <a:p>
             <a:pPr algn="ctr"/>
-            <a:r>
-              <a:rPr lang="en-US" sz="7600" b="1" dirty="0" smtClean="0">
-                <a:solidFill>
-                  <a:srgbClr val="2F5697"/>
-                </a:solidFill>
-                <a:latin typeface="Helvetica" charset="0"/>
-                <a:ea typeface="Helvetica" charset="0"/>
-                <a:cs typeface="Helvetica" charset="0"/>
-              </a:rPr>
-              <a:t>Developmental </a:t>
-            </a:r>
             <a:r>
               <a:rPr lang="en-US" sz="7600" b="1" dirty="0">
                 <a:solidFill>
@@ -4118,7 +4017,7 @@
                 <a:ea typeface="Helvetica" charset="0"/>
                 <a:cs typeface="Helvetica" charset="0"/>
               </a:rPr>
-              <a:t>continuity and numeral semantics</a:t>
+              <a:t>Developmental continuity and numeral semantics</a:t>
             </a:r>
           </a:p>
         </p:txBody>
@@ -4421,7 +4320,7 @@
             </a:r>
           </a:p>
           <a:p>
-            <a:endParaRPr lang="en-US" sz="1000" dirty="0" smtClean="0">
+            <a:endParaRPr lang="en-US" sz="1000" dirty="0">
               <a:latin typeface="Helvetica" charset="0"/>
               <a:ea typeface="Helvetica" charset="0"/>
               <a:cs typeface="Helvetica" charset="0"/>
@@ -4429,28 +4328,12 @@
           </a:p>
           <a:p>
             <a:r>
-              <a:rPr lang="en-US" sz="3200" dirty="0" smtClean="0">
-                <a:latin typeface="Helvetica" charset="0"/>
-                <a:ea typeface="Helvetica" charset="0"/>
-                <a:cs typeface="Helvetica" charset="0"/>
-              </a:rPr>
-              <a:t>P(w</a:t>
-            </a:r>
-            <a:r>
-              <a:rPr lang="en-US" sz="3200" dirty="0">
-                <a:latin typeface="Helvetica" charset="0"/>
-                <a:ea typeface="Helvetica" charset="0"/>
-                <a:cs typeface="Helvetica" charset="0"/>
-              </a:rPr>
-              <a:t>) </a:t>
-            </a:r>
-            <a:r>
-              <a:rPr lang="en-US" sz="3200" dirty="0" smtClean="0">
-                <a:latin typeface="Helvetica" charset="0"/>
-                <a:ea typeface="Helvetica" charset="0"/>
-                <a:cs typeface="Helvetica" charset="0"/>
-              </a:rPr>
-              <a:t>∝ </a:t>
+              <a:rPr lang="en-US" sz="3200" dirty="0">
+                <a:latin typeface="Helvetica" charset="0"/>
+                <a:ea typeface="Helvetica" charset="0"/>
+                <a:cs typeface="Helvetica" charset="0"/>
+              </a:rPr>
+              <a:t>P(w) ∝ </a:t>
             </a:r>
             <a:r>
               <a:rPr lang="en-US" sz="3200" dirty="0" err="1">
@@ -4466,26 +4349,30 @@
                 <a:ea typeface="Helvetica" charset="0"/>
                 <a:cs typeface="Helvetica" charset="0"/>
               </a:rPr>
-              <a:t> = </a:t>
-            </a:r>
-            <a:r>
-              <a:rPr lang="en-US" sz="3200" dirty="0" smtClean="0">
-                <a:latin typeface="Helvetica" charset="0"/>
-                <a:ea typeface="Helvetica" charset="0"/>
-                <a:cs typeface="Helvetica" charset="0"/>
-              </a:rPr>
-              <a:t>0.5</a:t>
-            </a:r>
-          </a:p>
-          <a:p>
-            <a:r>
-              <a:rPr lang="en-US" sz="500" dirty="0" smtClean="0">
+              <a:t> = 0.5</a:t>
+            </a:r>
+          </a:p>
+          <a:p>
+            <a:r>
+              <a:rPr lang="en-US" sz="500" dirty="0">
                 <a:latin typeface="Helvetica" charset="0"/>
                 <a:ea typeface="Helvetica" charset="0"/>
                 <a:cs typeface="Helvetica" charset="0"/>
               </a:rPr>
               <a:t> </a:t>
             </a:r>
+          </a:p>
+          <a:p>
+            <a:r>
+              <a:rPr lang="en-US" sz="3200" dirty="0">
+                <a:latin typeface="Helvetica" charset="0"/>
+                <a:ea typeface="Helvetica" charset="0"/>
+                <a:cs typeface="Helvetica" charset="0"/>
+              </a:rPr>
+              <a:t>P(q) = uniform</a:t>
+            </a:r>
+          </a:p>
+          <a:p>
             <a:endParaRPr lang="en-US" sz="500" dirty="0">
               <a:latin typeface="Helvetica" charset="0"/>
               <a:ea typeface="Helvetica" charset="0"/>
@@ -4499,19 +4386,43 @@
                 <a:ea typeface="Helvetica" charset="0"/>
                 <a:cs typeface="Helvetica" charset="0"/>
               </a:rPr>
-              <a:t>P(q) = </a:t>
-            </a:r>
-            <a:r>
-              <a:rPr lang="en-US" sz="3200" dirty="0" smtClean="0">
-                <a:latin typeface="Helvetica" charset="0"/>
-                <a:ea typeface="Helvetica" charset="0"/>
-                <a:cs typeface="Helvetica" charset="0"/>
-              </a:rPr>
-              <a:t>uniform</a:t>
-            </a:r>
-          </a:p>
-          <a:p>
-            <a:endParaRPr lang="en-US" sz="500" dirty="0">
+              <a:t>P(</a:t>
+            </a:r>
+            <a:r>
+              <a:rPr lang="en-US" sz="3200" i="1" dirty="0" err="1">
+                <a:latin typeface="Helvetica" charset="0"/>
+                <a:ea typeface="Helvetica" charset="0"/>
+                <a:cs typeface="Helvetica" charset="0"/>
+              </a:rPr>
+              <a:t>i</a:t>
+            </a:r>
+            <a:r>
+              <a:rPr lang="en-US" sz="3200" dirty="0">
+                <a:latin typeface="Helvetica" charset="0"/>
+                <a:ea typeface="Helvetica" charset="0"/>
+                <a:cs typeface="Helvetica" charset="0"/>
+              </a:rPr>
+              <a:t> = </a:t>
+            </a:r>
+            <a:r>
+              <a:rPr lang="en-US" sz="3200" dirty="0">
+                <a:latin typeface="Courier" charset="0"/>
+                <a:ea typeface="Courier" charset="0"/>
+                <a:cs typeface="Courier" charset="0"/>
+              </a:rPr>
+              <a:t>surface</a:t>
+            </a:r>
+            <a:r>
+              <a:rPr lang="en-US" sz="3200" dirty="0">
+                <a:latin typeface="Helvetica" charset="0"/>
+                <a:ea typeface="Helvetica" charset="0"/>
+                <a:cs typeface="Helvetica" charset="0"/>
+              </a:rPr>
+              <a:t>) = 0.5</a:t>
+            </a:r>
+          </a:p>
+          <a:p>
+            <a:endParaRPr lang="en-US" sz="3000" b="1" dirty="0">
               <a:latin typeface="Helvetica" charset="0"/>
               <a:ea typeface="Helvetica" charset="0"/>
               <a:cs typeface="Helvetica" charset="0"/>
@@ -4519,77 +4430,12 @@
           </a:p>
           <a:p>
             <a:r>
-              <a:rPr lang="en-US" sz="3200" dirty="0" smtClean="0">
-                <a:latin typeface="Helvetica" charset="0"/>
-                <a:ea typeface="Helvetica" charset="0"/>
-                <a:cs typeface="Helvetica" charset="0"/>
-              </a:rPr>
-              <a:t>P(</a:t>
-            </a:r>
-            <a:r>
-              <a:rPr lang="en-US" sz="3200" i="1" dirty="0" err="1" smtClean="0">
-                <a:latin typeface="Helvetica" charset="0"/>
-                <a:ea typeface="Helvetica" charset="0"/>
-                <a:cs typeface="Helvetica" charset="0"/>
-              </a:rPr>
-              <a:t>i</a:t>
-            </a:r>
-            <a:r>
-              <a:rPr lang="en-US" sz="3200" dirty="0" smtClean="0">
-                <a:latin typeface="Helvetica" charset="0"/>
-                <a:ea typeface="Helvetica" charset="0"/>
-                <a:cs typeface="Helvetica" charset="0"/>
-              </a:rPr>
-              <a:t> = </a:t>
-            </a:r>
-            <a:r>
-              <a:rPr lang="en-US" sz="3200" dirty="0" smtClean="0">
-                <a:latin typeface="Courier" charset="0"/>
-                <a:ea typeface="Courier" charset="0"/>
-                <a:cs typeface="Courier" charset="0"/>
-              </a:rPr>
-              <a:t>surface</a:t>
-            </a:r>
-            <a:r>
-              <a:rPr lang="en-US" sz="3200" dirty="0">
-                <a:latin typeface="Helvetica" charset="0"/>
-                <a:ea typeface="Helvetica" charset="0"/>
-                <a:cs typeface="Helvetica" charset="0"/>
-              </a:rPr>
-              <a:t>) = 0.5</a:t>
-            </a:r>
-          </a:p>
-          <a:p>
-            <a:endParaRPr lang="en-US" sz="3000" b="1" dirty="0" smtClean="0">
-              <a:latin typeface="Helvetica" charset="0"/>
-              <a:ea typeface="Helvetica" charset="0"/>
-              <a:cs typeface="Helvetica" charset="0"/>
-            </a:endParaRPr>
-          </a:p>
-          <a:p>
-            <a:r>
-              <a:rPr lang="en-US" sz="3200" b="1" dirty="0" smtClean="0">
-                <a:latin typeface="Helvetica" charset="0"/>
-                <a:ea typeface="Helvetica" charset="0"/>
-                <a:cs typeface="Helvetica" charset="0"/>
-              </a:rPr>
-              <a:t>Manipulated </a:t>
-            </a:r>
-            <a:r>
               <a:rPr lang="en-US" sz="3200" b="1" dirty="0">
                 <a:latin typeface="Helvetica" charset="0"/>
                 <a:ea typeface="Helvetica" charset="0"/>
                 <a:cs typeface="Helvetica" charset="0"/>
               </a:rPr>
-              <a:t>values</a:t>
-            </a:r>
-            <a:r>
-              <a:rPr lang="en-US" sz="3200" b="1" dirty="0" smtClean="0">
-                <a:latin typeface="Helvetica" charset="0"/>
-                <a:ea typeface="Helvetica" charset="0"/>
-                <a:cs typeface="Helvetica" charset="0"/>
-              </a:rPr>
-              <a:t>:</a:t>
+              <a:t>Manipulated values:</a:t>
             </a:r>
           </a:p>
           <a:p>
@@ -4601,7 +4447,7 @@
           </a:p>
           <a:p>
             <a:r>
-              <a:rPr lang="en-US" sz="3200" dirty="0" err="1" smtClean="0">
+              <a:rPr lang="en-US" sz="3200" dirty="0" err="1">
                 <a:latin typeface="Helvetica" charset="0"/>
                 <a:ea typeface="Helvetica" charset="0"/>
                 <a:cs typeface="Helvetica" charset="0"/>
@@ -4609,28 +4455,12 @@
               <a:t>Baserate</a:t>
             </a:r>
             <a:r>
-              <a:rPr lang="en-US" sz="3200" dirty="0" smtClean="0">
-                <a:latin typeface="Helvetica" charset="0"/>
-                <a:ea typeface="Helvetica" charset="0"/>
-                <a:cs typeface="Helvetica" charset="0"/>
-              </a:rPr>
-              <a:t> ranges from </a:t>
-            </a:r>
-            <a:r>
-              <a:rPr lang="en-US" sz="3200" dirty="0">
-                <a:latin typeface="Helvetica" charset="0"/>
-                <a:ea typeface="Helvetica" charset="0"/>
-                <a:cs typeface="Helvetica" charset="0"/>
-              </a:rPr>
-              <a:t>0.1 </a:t>
-            </a:r>
-            <a:r>
-              <a:rPr lang="en-US" sz="3200" dirty="0" smtClean="0">
-                <a:latin typeface="Helvetica" charset="0"/>
-                <a:ea typeface="Helvetica" charset="0"/>
-                <a:cs typeface="Helvetica" charset="0"/>
-              </a:rPr>
-              <a:t>to 0.5 to 0.9 </a:t>
+              <a:rPr lang="en-US" sz="3200" dirty="0">
+                <a:latin typeface="Helvetica" charset="0"/>
+                <a:ea typeface="Helvetica" charset="0"/>
+                <a:cs typeface="Helvetica" charset="0"/>
+              </a:rPr>
+              <a:t> ranges from 0.1 to 0.5 to 0.9 </a:t>
             </a:r>
           </a:p>
           <a:p>
@@ -4687,137 +4517,25 @@
               <a:t>References: </a:t>
             </a:r>
             <a:r>
-              <a:rPr lang="en-US" sz="1400" dirty="0" smtClean="0">
-                <a:latin typeface="Helvetica" panose="020B0604020202020204" pitchFamily="34" charset="0"/>
-                <a:cs typeface="Helvetica" panose="020B0604020202020204" pitchFamily="34" charset="0"/>
-              </a:rPr>
-              <a:t>Judith </a:t>
-            </a:r>
-            <a:r>
               <a:rPr lang="en-US" sz="1400" dirty="0">
                 <a:latin typeface="Helvetica" panose="020B0604020202020204" pitchFamily="34" charset="0"/>
                 <a:cs typeface="Helvetica" panose="020B0604020202020204" pitchFamily="34" charset="0"/>
               </a:rPr>
-              <a:t>Degen and Noah </a:t>
-            </a:r>
-            <a:r>
-              <a:rPr lang="en-US" sz="1400" dirty="0" smtClean="0">
+              <a:t>Judith Degen and Noah D. Goodman. 2014. Lost your marbles? the puzzle of dependent measures in experimental pragmatics. In Proceedings of the Annual Meeting of the Cognitive Science Society. volume 36, pages 397–402. Noah D. Goodman and Michael C. Frank. 2016. Pragmatic language interpretation as probabilistic inference. Trends in Cognitive Sciences 20(11): 818–829. K.J. Savinelli, Gregory Scontras, and Lisa Pearl. 2017. Modeling scope ambiguity resolution as pragmatic inference: Formalizing differences in child and adult behavior. In </a:t>
+            </a:r>
+            <a:r>
+              <a:rPr lang="en-US" sz="1400" i="1" dirty="0">
                 <a:latin typeface="Helvetica" panose="020B0604020202020204" pitchFamily="34" charset="0"/>
                 <a:cs typeface="Helvetica" panose="020B0604020202020204" pitchFamily="34" charset="0"/>
               </a:rPr>
-              <a:t>D. </a:t>
+              <a:t>Proceedings of the Annual Meeting of the Cognitive Science Society</a:t>
             </a:r>
             <a:r>
               <a:rPr lang="en-US" sz="1400" dirty="0">
                 <a:latin typeface="Helvetica" panose="020B0604020202020204" pitchFamily="34" charset="0"/>
                 <a:cs typeface="Helvetica" panose="020B0604020202020204" pitchFamily="34" charset="0"/>
               </a:rPr>
-              <a:t>Goodman. 2014. Lost your marbles? the puzzle of dependent measures in experimental pragmatics. In Proceedings of the Annual Meeting of the Cognitive Science Society. volume 36, pages 397–402. </a:t>
-            </a:r>
-            <a:r>
-              <a:rPr lang="en-US" sz="1400" dirty="0" smtClean="0">
-                <a:latin typeface="Helvetica" panose="020B0604020202020204" pitchFamily="34" charset="0"/>
-                <a:cs typeface="Helvetica" panose="020B0604020202020204" pitchFamily="34" charset="0"/>
-              </a:rPr>
-              <a:t>Noah D. </a:t>
-            </a:r>
-            <a:r>
-              <a:rPr lang="en-US" sz="1400" dirty="0">
-                <a:latin typeface="Helvetica" panose="020B0604020202020204" pitchFamily="34" charset="0"/>
-                <a:cs typeface="Helvetica" panose="020B0604020202020204" pitchFamily="34" charset="0"/>
-              </a:rPr>
-              <a:t>Goodman and Michael </a:t>
-            </a:r>
-            <a:r>
-              <a:rPr lang="en-US" sz="1400" dirty="0" smtClean="0">
-                <a:latin typeface="Helvetica" panose="020B0604020202020204" pitchFamily="34" charset="0"/>
-                <a:cs typeface="Helvetica" panose="020B0604020202020204" pitchFamily="34" charset="0"/>
-              </a:rPr>
-              <a:t>C. </a:t>
-            </a:r>
-            <a:r>
-              <a:rPr lang="en-US" sz="1400" dirty="0">
-                <a:latin typeface="Helvetica" panose="020B0604020202020204" pitchFamily="34" charset="0"/>
-                <a:cs typeface="Helvetica" panose="020B0604020202020204" pitchFamily="34" charset="0"/>
-              </a:rPr>
-              <a:t>Frank. 2016. Pragmatic language interpretation as probabilistic inference. Trends in Cognitive Sciences 20(11</a:t>
-            </a:r>
-            <a:r>
-              <a:rPr lang="en-US" sz="1400" dirty="0" smtClean="0">
-                <a:latin typeface="Helvetica" panose="020B0604020202020204" pitchFamily="34" charset="0"/>
-                <a:cs typeface="Helvetica" panose="020B0604020202020204" pitchFamily="34" charset="0"/>
-              </a:rPr>
-              <a:t>): 818–829</a:t>
-            </a:r>
-            <a:r>
-              <a:rPr lang="en-US" sz="1400" dirty="0">
-                <a:latin typeface="Helvetica" panose="020B0604020202020204" pitchFamily="34" charset="0"/>
-                <a:cs typeface="Helvetica" panose="020B0604020202020204" pitchFamily="34" charset="0"/>
-              </a:rPr>
-              <a:t>. </a:t>
-            </a:r>
-            <a:r>
-              <a:rPr lang="en-US" sz="1400" dirty="0" smtClean="0">
-                <a:latin typeface="Helvetica" panose="020B0604020202020204" pitchFamily="34" charset="0"/>
-                <a:cs typeface="Helvetica" panose="020B0604020202020204" pitchFamily="34" charset="0"/>
-              </a:rPr>
-              <a:t>K.J</a:t>
-            </a:r>
-            <a:r>
-              <a:rPr lang="en-US" sz="1400" dirty="0">
-                <a:latin typeface="Helvetica" panose="020B0604020202020204" pitchFamily="34" charset="0"/>
-                <a:cs typeface="Helvetica" panose="020B0604020202020204" pitchFamily="34" charset="0"/>
-              </a:rPr>
-              <a:t>. Savinelli, Gregory Scontras, and Lisa Pearl. 2017. Modeling scope ambiguity resolution as pragmatic inference: Formalizing differences in child and adult behavior. In </a:t>
-            </a:r>
-            <a:r>
-              <a:rPr lang="en-US" sz="1400" i="1" dirty="0">
-                <a:latin typeface="Helvetica" panose="020B0604020202020204" pitchFamily="34" charset="0"/>
-                <a:cs typeface="Helvetica" panose="020B0604020202020204" pitchFamily="34" charset="0"/>
-              </a:rPr>
-              <a:t>Proceedings of the Annual Meeting of the Cognitive Science </a:t>
-            </a:r>
-            <a:r>
-              <a:rPr lang="en-US" sz="1400" i="1" dirty="0" smtClean="0">
-                <a:latin typeface="Helvetica" panose="020B0604020202020204" pitchFamily="34" charset="0"/>
-                <a:cs typeface="Helvetica" panose="020B0604020202020204" pitchFamily="34" charset="0"/>
-              </a:rPr>
-              <a:t>Society</a:t>
-            </a:r>
-            <a:r>
-              <a:rPr lang="en-US" sz="1400" dirty="0">
-                <a:latin typeface="Helvetica" panose="020B0604020202020204" pitchFamily="34" charset="0"/>
-                <a:cs typeface="Helvetica" panose="020B0604020202020204" pitchFamily="34" charset="0"/>
-              </a:rPr>
-              <a:t>,</a:t>
-            </a:r>
-            <a:r>
-              <a:rPr lang="en-US" sz="1400" dirty="0" smtClean="0">
-                <a:latin typeface="Helvetica" panose="020B0604020202020204" pitchFamily="34" charset="0"/>
-                <a:cs typeface="Helvetica" panose="020B0604020202020204" pitchFamily="34" charset="0"/>
-              </a:rPr>
-              <a:t> </a:t>
-            </a:r>
-            <a:r>
-              <a:rPr lang="en-US" sz="1400" dirty="0">
-                <a:latin typeface="Helvetica" panose="020B0604020202020204" pitchFamily="34" charset="0"/>
-                <a:cs typeface="Helvetica" panose="020B0604020202020204" pitchFamily="34" charset="0"/>
-              </a:rPr>
-              <a:t>v</a:t>
-            </a:r>
-            <a:r>
-              <a:rPr lang="en-US" sz="1400" dirty="0" smtClean="0">
-                <a:latin typeface="Helvetica" panose="020B0604020202020204" pitchFamily="34" charset="0"/>
-                <a:cs typeface="Helvetica" panose="020B0604020202020204" pitchFamily="34" charset="0"/>
-              </a:rPr>
-              <a:t>olume </a:t>
-            </a:r>
-            <a:r>
-              <a:rPr lang="en-US" sz="1400" dirty="0">
-                <a:latin typeface="Helvetica" panose="020B0604020202020204" pitchFamily="34" charset="0"/>
-                <a:cs typeface="Helvetica" panose="020B0604020202020204" pitchFamily="34" charset="0"/>
-              </a:rPr>
-              <a:t>39, pages 3064–3069. Michael Henry Tessler and Noah D. Goodman. 2016. A pragmatic theory of generic language.</a:t>
+              <a:t>, volume 39, pages 3064–3069. Michael Henry Tessler and Noah D. Goodman. 2016. A pragmatic theory of generic language.</a:t>
             </a:r>
             <a:endParaRPr lang="en-US" sz="1400" b="1" dirty="0">
               <a:latin typeface="Helvetica" panose="020B0604020202020204" pitchFamily="34" charset="0"/>
@@ -4924,15 +4642,7 @@
                 <a:ea typeface="Helvetica" charset="0"/>
                 <a:cs typeface="Helvetica" charset="0"/>
               </a:rPr>
-              <a:t>Savinelli et. al. (2017) articulated </a:t>
-            </a:r>
-            <a:r>
-              <a:rPr lang="en-US" sz="3200" dirty="0" smtClean="0">
-                <a:latin typeface="Helvetica" charset="0"/>
-                <a:ea typeface="Helvetica" charset="0"/>
-                <a:cs typeface="Helvetica" charset="0"/>
-              </a:rPr>
-              <a:t>a computational model of utterance endorsement that incorporated several </a:t>
+              <a:t>Savinelli et. al. (2017) articulated a computational model of utterance endorsement that incorporated several </a:t>
             </a:r>
             <a:r>
               <a:rPr lang="en-US" sz="3200" dirty="0">
@@ -4951,15 +4661,7 @@
                 <a:ea typeface="Helvetica" charset="0"/>
                 <a:cs typeface="Helvetica" charset="0"/>
               </a:rPr>
-              <a:t> </a:t>
-            </a:r>
-            <a:r>
-              <a:rPr lang="en-US" sz="3200" dirty="0" smtClean="0">
-                <a:latin typeface="Helvetica" charset="0"/>
-                <a:ea typeface="Helvetica" charset="0"/>
-                <a:cs typeface="Helvetica" charset="0"/>
-              </a:rPr>
-              <a:t>and </a:t>
+              <a:t> and </a:t>
             </a:r>
             <a:r>
               <a:rPr lang="en-US" sz="3200" dirty="0">
@@ -4978,15 +4680,7 @@
                 <a:ea typeface="Helvetica" charset="0"/>
                 <a:cs typeface="Helvetica" charset="0"/>
               </a:rPr>
-              <a:t> </a:t>
-            </a:r>
-            <a:r>
-              <a:rPr lang="en-US" sz="3200" dirty="0" smtClean="0">
-                <a:latin typeface="Helvetica" charset="0"/>
-                <a:ea typeface="Helvetica" charset="0"/>
-                <a:cs typeface="Helvetica" charset="0"/>
-              </a:rPr>
-              <a:t>factors.</a:t>
+              <a:t> factors.</a:t>
             </a:r>
             <a:endParaRPr lang="en-US" sz="3200" dirty="0">
               <a:latin typeface="Helvetica" panose="020B0604020202020204" pitchFamily="34" charset="0"/>
@@ -5030,31 +4724,8 @@
                 <a:ea typeface="Helvetica" charset="0"/>
                 <a:cs typeface="Helvetica" charset="0"/>
               </a:rPr>
-              <a:t>Our </a:t>
-            </a:r>
-            <a:r>
-              <a:rPr lang="en-US" sz="4200" b="1" dirty="0" smtClean="0">
-                <a:solidFill>
-                  <a:schemeClr val="accent1">
-                    <a:lumMod val="50000"/>
-                  </a:schemeClr>
-                </a:solidFill>
-                <a:latin typeface="Helvetica" charset="0"/>
-                <a:ea typeface="Helvetica" charset="0"/>
-                <a:cs typeface="Helvetica" charset="0"/>
-              </a:rPr>
-              <a:t>contributions</a:t>
-            </a:r>
-            <a:endParaRPr lang="en-US" sz="4200" b="1" dirty="0">
-              <a:solidFill>
-                <a:schemeClr val="accent1">
-                  <a:lumMod val="50000"/>
-                </a:schemeClr>
-              </a:solidFill>
-              <a:latin typeface="Helvetica" charset="0"/>
-              <a:ea typeface="Helvetica" charset="0"/>
-              <a:cs typeface="Helvetica" charset="0"/>
-            </a:endParaRPr>
+              <a:t>Our contributions</a:t>
+            </a:r>
           </a:p>
         </p:txBody>
       </p:sp>
@@ -5291,20 +4962,12 @@
           <a:lstStyle/>
           <a:p>
             <a:r>
-              <a:rPr lang="en-US" sz="3200" dirty="0" smtClean="0">
+              <a:rPr lang="en-US" sz="3200" dirty="0">
                 <a:latin typeface="Helvetica" panose="020B0604020202020204" pitchFamily="34" charset="0"/>
                 <a:ea typeface="Helvetica" charset="0"/>
                 <a:cs typeface="Helvetica" panose="020B0604020202020204" pitchFamily="34" charset="0"/>
               </a:rPr>
-              <a:t>Bayesian </a:t>
-            </a:r>
-            <a:r>
-              <a:rPr lang="en-US" sz="3200" dirty="0">
-                <a:latin typeface="Helvetica" panose="020B0604020202020204" pitchFamily="34" charset="0"/>
-                <a:ea typeface="Helvetica" charset="0"/>
-                <a:cs typeface="Helvetica" panose="020B0604020202020204" pitchFamily="34" charset="0"/>
-              </a:rPr>
-              <a:t>Rational Speech Act (</a:t>
+              <a:t>Bayesian Rational Speech Act (</a:t>
             </a:r>
             <a:r>
               <a:rPr lang="en-US" sz="3200" b="1" dirty="0">
@@ -5320,32 +4983,24 @@
                 <a:ea typeface="Helvetica" charset="0"/>
                 <a:cs typeface="Helvetica" panose="020B0604020202020204" pitchFamily="34" charset="0"/>
               </a:rPr>
-              <a:t>) </a:t>
-            </a:r>
-            <a:r>
-              <a:rPr lang="en-US" sz="3200" dirty="0" smtClean="0">
-                <a:latin typeface="Helvetica" panose="020B0604020202020204" pitchFamily="34" charset="0"/>
-                <a:ea typeface="Helvetica" charset="0"/>
-                <a:cs typeface="Helvetica" panose="020B0604020202020204" pitchFamily="34" charset="0"/>
-              </a:rPr>
-              <a:t>framework </a:t>
-            </a:r>
-            <a:r>
-              <a:rPr lang="en-US" sz="3200" dirty="0" smtClean="0">
+              <a:t>) framework </a:t>
+            </a:r>
+            <a:r>
+              <a:rPr lang="en-US" sz="3200" dirty="0">
                 <a:latin typeface="Helvetica" panose="020B0604020202020204" pitchFamily="34" charset="0"/>
                 <a:cs typeface="Helvetica" panose="020B0604020202020204" pitchFamily="34" charset="0"/>
               </a:rPr>
               <a:t>(</a:t>
             </a:r>
             <a:r>
-              <a:rPr lang="en-US" sz="2400" dirty="0" smtClean="0">
+              <a:rPr lang="en-US" sz="2400" dirty="0">
                 <a:latin typeface="Helvetica" panose="020B0604020202020204" pitchFamily="34" charset="0"/>
                 <a:cs typeface="Helvetica" panose="020B0604020202020204" pitchFamily="34" charset="0"/>
               </a:rPr>
               <a:t>Goodman &amp; Frank, 2016</a:t>
             </a:r>
             <a:r>
-              <a:rPr lang="en-US" sz="3200" dirty="0" smtClean="0">
+              <a:rPr lang="en-US" sz="3200" dirty="0">
                 <a:latin typeface="Helvetica" panose="020B0604020202020204" pitchFamily="34" charset="0"/>
                 <a:cs typeface="Helvetica" panose="020B0604020202020204" pitchFamily="34" charset="0"/>
               </a:rPr>
@@ -5486,20 +5141,12 @@
           <a:lstStyle/>
           <a:p>
             <a:r>
-              <a:rPr lang="en-US" sz="3200" dirty="0" smtClean="0">
-                <a:latin typeface="Helvetica" charset="0"/>
-                <a:ea typeface="Helvetica" charset="0"/>
-                <a:cs typeface="Helvetica" charset="0"/>
-              </a:rPr>
-              <a:t>Changing the </a:t>
-            </a:r>
-            <a:r>
-              <a:rPr lang="en-US" sz="3200" dirty="0">
-                <a:latin typeface="Helvetica" charset="0"/>
-                <a:ea typeface="Helvetica" charset="0"/>
-                <a:cs typeface="Helvetica" charset="0"/>
-              </a:rPr>
-              <a:t>two </a:t>
+              <a:rPr lang="en-US" sz="3200" dirty="0">
+                <a:latin typeface="Helvetica" charset="0"/>
+                <a:ea typeface="Helvetica" charset="0"/>
+                <a:cs typeface="Helvetica" charset="0"/>
+              </a:rPr>
+              <a:t>Changing the two </a:t>
             </a:r>
             <a:r>
               <a:rPr lang="en-US" sz="3200" dirty="0">
@@ -5518,55 +5165,18 @@
                 <a:ea typeface="Helvetica" charset="0"/>
                 <a:cs typeface="Helvetica" charset="0"/>
               </a:rPr>
-              <a:t> factors </a:t>
-            </a:r>
-            <a:r>
-              <a:rPr lang="en-US" sz="3200" dirty="0" smtClean="0">
-                <a:latin typeface="Helvetica" charset="0"/>
-                <a:ea typeface="Helvetica" charset="0"/>
-                <a:cs typeface="Helvetica" charset="0"/>
-              </a:rPr>
-              <a:t>best </a:t>
-            </a:r>
-            <a:r>
-              <a:rPr lang="en-US" sz="3200" dirty="0" smtClean="0">
-                <a:latin typeface="Helvetica" charset="0"/>
-                <a:ea typeface="Helvetica" charset="0"/>
-                <a:cs typeface="Helvetica" charset="0"/>
-              </a:rPr>
-              <a:t>captures </a:t>
-            </a:r>
-            <a:r>
-              <a:rPr lang="en-US" sz="3200" dirty="0" smtClean="0">
-                <a:latin typeface="Helvetica" charset="0"/>
-                <a:ea typeface="Helvetica" charset="0"/>
-                <a:cs typeface="Helvetica" charset="0"/>
-              </a:rPr>
-              <a:t>the observed </a:t>
-            </a:r>
-            <a:r>
-              <a:rPr lang="en-US" sz="3200" dirty="0" smtClean="0">
-                <a:latin typeface="Helvetica" charset="0"/>
-                <a:ea typeface="Helvetica" charset="0"/>
-                <a:cs typeface="Helvetica" charset="0"/>
-              </a:rPr>
-              <a:t>adult behavior in 1-of-2 contexts:</a:t>
-            </a:r>
-          </a:p>
-          <a:p>
-            <a:r>
-              <a:rPr lang="en-US" sz="500" dirty="0" smtClean="0">
+              <a:t> factors best captures the observed adult behavior in 1-of-2 contexts:</a:t>
+            </a:r>
+          </a:p>
+          <a:p>
+            <a:r>
+              <a:rPr lang="en-US" sz="500" dirty="0">
                 <a:latin typeface="Helvetica" charset="0"/>
                 <a:ea typeface="Helvetica" charset="0"/>
                 <a:cs typeface="Helvetica" charset="0"/>
               </a:rPr>
               <a:t> </a:t>
             </a:r>
-            <a:endParaRPr lang="en-US" sz="500" dirty="0" smtClean="0">
-              <a:latin typeface="Helvetica" charset="0"/>
-              <a:ea typeface="Helvetica" charset="0"/>
-              <a:cs typeface="Helvetica" charset="0"/>
-            </a:endParaRPr>
           </a:p>
           <a:p>
             <a:pPr marL="457200" indent="-457200">
@@ -5574,7 +5184,7 @@
               <a:buChar char="v"/>
             </a:pPr>
             <a:r>
-              <a:rPr lang="en-US" sz="3200" dirty="0" smtClean="0">
+              <a:rPr lang="en-US" sz="3200" dirty="0">
                 <a:latin typeface="Helvetica" charset="0"/>
                 <a:ea typeface="Helvetica" charset="0"/>
                 <a:cs typeface="Helvetica" charset="0"/>
@@ -5582,7 +5192,7 @@
               <a:t>Success </a:t>
             </a:r>
             <a:r>
-              <a:rPr lang="en-US" sz="3200" dirty="0" err="1" smtClean="0">
+              <a:rPr lang="en-US" sz="3200" dirty="0" err="1">
                 <a:latin typeface="Helvetica" charset="0"/>
                 <a:ea typeface="Helvetica" charset="0"/>
                 <a:cs typeface="Helvetica" charset="0"/>
@@ -5590,7 +5200,7 @@
               <a:t>baserate</a:t>
             </a:r>
             <a:r>
-              <a:rPr lang="en-US" sz="3200" dirty="0" smtClean="0">
+              <a:rPr lang="en-US" sz="3200" dirty="0">
                 <a:latin typeface="Helvetica" charset="0"/>
                 <a:ea typeface="Helvetica" charset="0"/>
                 <a:cs typeface="Helvetica" charset="0"/>
@@ -5598,7 +5208,7 @@
               <a:t> from </a:t>
             </a:r>
             <a:r>
-              <a:rPr lang="en-US" sz="3200" b="1" dirty="0" smtClean="0">
+              <a:rPr lang="en-US" sz="3200" b="1" dirty="0">
                 <a:latin typeface="Helvetica" charset="0"/>
                 <a:ea typeface="Helvetica" charset="0"/>
                 <a:cs typeface="Helvetica" charset="0"/>
@@ -5606,7 +5216,7 @@
               <a:t>0.1 </a:t>
             </a:r>
             <a:r>
-              <a:rPr lang="en-US" sz="3200" dirty="0" smtClean="0">
+              <a:rPr lang="en-US" sz="3200" dirty="0">
                 <a:latin typeface="Helvetica" charset="0"/>
                 <a:ea typeface="Helvetica" charset="0"/>
                 <a:cs typeface="Helvetica" charset="0"/>
@@ -5614,7 +5224,7 @@
               <a:t>to </a:t>
             </a:r>
             <a:r>
-              <a:rPr lang="en-US" sz="3200" b="1" dirty="0" smtClean="0">
+              <a:rPr lang="en-US" sz="3200" b="1" dirty="0">
                 <a:latin typeface="Helvetica" charset="0"/>
                 <a:ea typeface="Helvetica" charset="0"/>
                 <a:cs typeface="Helvetica" charset="0"/>
@@ -5639,20 +5249,12 @@
               <a:buChar char="v"/>
             </a:pPr>
             <a:r>
-              <a:rPr lang="en-US" sz="3200" dirty="0" smtClean="0">
-                <a:latin typeface="Helvetica" charset="0"/>
-                <a:ea typeface="Helvetica" charset="0"/>
-                <a:cs typeface="Helvetica" charset="0"/>
-              </a:rPr>
-              <a:t>From no </a:t>
-            </a:r>
-            <a:r>
-              <a:rPr lang="en-US" sz="3200" dirty="0" smtClean="0">
-                <a:latin typeface="Helvetica" charset="0"/>
-                <a:ea typeface="Helvetica" charset="0"/>
-                <a:cs typeface="Helvetica" charset="0"/>
-              </a:rPr>
-              <a:t>QUD favored to favoring </a:t>
+              <a:rPr lang="en-US" sz="3200" dirty="0">
+                <a:latin typeface="Helvetica" charset="0"/>
+                <a:ea typeface="Helvetica" charset="0"/>
+                <a:cs typeface="Helvetica" charset="0"/>
+              </a:rPr>
+              <a:t>From no QUD favored to favoring </a:t>
             </a:r>
             <a:r>
               <a:rPr lang="en-US" sz="3200" dirty="0">
@@ -5728,33 +5330,8 @@
                 <a:latin typeface="Helvetica" panose="020B0604020202020204" pitchFamily="34" charset="0"/>
                 <a:cs typeface="Helvetica" panose="020B0604020202020204" pitchFamily="34" charset="0"/>
               </a:rPr>
-              <a:t>Our model of ambiguity resolution in </a:t>
-            </a:r>
-            <a:r>
-              <a:rPr lang="en-US" sz="3200" dirty="0" smtClean="0">
-                <a:latin typeface="Helvetica" panose="020B0604020202020204" pitchFamily="34" charset="0"/>
-                <a:cs typeface="Helvetica" panose="020B0604020202020204" pitchFamily="34" charset="0"/>
-              </a:rPr>
-              <a:t>context that previously captured children’s </a:t>
-            </a:r>
-            <a:r>
-              <a:rPr lang="en-US" sz="3200" dirty="0" smtClean="0">
-                <a:latin typeface="Helvetica" panose="020B0604020202020204" pitchFamily="34" charset="0"/>
-                <a:cs typeface="Helvetica" panose="020B0604020202020204" pitchFamily="34" charset="0"/>
-              </a:rPr>
-              <a:t>behavior seamlessly extends to capture </a:t>
-            </a:r>
-            <a:r>
-              <a:rPr lang="en-US" sz="3200" dirty="0" smtClean="0">
-                <a:latin typeface="Helvetica" panose="020B0604020202020204" pitchFamily="34" charset="0"/>
-                <a:cs typeface="Helvetica" panose="020B0604020202020204" pitchFamily="34" charset="0"/>
-              </a:rPr>
-              <a:t>adult behavior: </a:t>
-            </a:r>
-            <a:endParaRPr lang="en-US" sz="3200" dirty="0" smtClean="0">
-              <a:latin typeface="Helvetica" panose="020B0604020202020204" pitchFamily="34" charset="0"/>
-              <a:cs typeface="Helvetica" panose="020B0604020202020204" pitchFamily="34" charset="0"/>
-            </a:endParaRPr>
+              <a:t>Our model of ambiguity resolution in context that previously captured children’s behavior seamlessly extends to capture adult behavior: </a:t>
+            </a:r>
           </a:p>
           <a:p>
             <a:endParaRPr lang="en-US" sz="500" dirty="0">
@@ -5779,245 +5356,15 @@
                 <a:latin typeface="Helvetica" panose="020B0604020202020204" pitchFamily="34" charset="0"/>
                 <a:cs typeface="Helvetica" panose="020B0604020202020204" pitchFamily="34" charset="0"/>
               </a:rPr>
-              <a:t>developmental </a:t>
-            </a:r>
-            <a:r>
-              <a:rPr lang="en-US" sz="3200" b="1" dirty="0" smtClean="0">
+              <a:t>developmental continuity</a:t>
+            </a:r>
+            <a:r>
+              <a:rPr lang="en-US" sz="3200" dirty="0">
                 <a:latin typeface="Helvetica" panose="020B0604020202020204" pitchFamily="34" charset="0"/>
                 <a:cs typeface="Helvetica" panose="020B0604020202020204" pitchFamily="34" charset="0"/>
               </a:rPr>
-              <a:t>continuity</a:t>
-            </a:r>
-            <a:r>
-              <a:rPr lang="en-US" sz="3200" dirty="0" smtClean="0">
-                <a:latin typeface="Helvetica" panose="020B0604020202020204" pitchFamily="34" charset="0"/>
-                <a:cs typeface="Helvetica" panose="020B0604020202020204" pitchFamily="34" charset="0"/>
-              </a:rPr>
               <a:t> in scope ambiguity resolution</a:t>
             </a:r>
-          </a:p>
-          <a:p>
-            <a:pPr marL="457200" indent="-457200">
-              <a:buFont typeface="Wingdings" charset="2"/>
-              <a:buChar char="v"/>
-            </a:pPr>
-            <a:endParaRPr lang="en-US" sz="500" dirty="0" smtClean="0">
-              <a:latin typeface="Helvetica" panose="020B0604020202020204" pitchFamily="34" charset="0"/>
-              <a:cs typeface="Helvetica" panose="020B0604020202020204" pitchFamily="34" charset="0"/>
-            </a:endParaRPr>
-          </a:p>
-          <a:p>
-            <a:pPr marL="457200" indent="-457200">
-              <a:buFont typeface="Wingdings" charset="2"/>
-              <a:buChar char="v"/>
-            </a:pPr>
-            <a:r>
-              <a:rPr lang="en-US" sz="3200" dirty="0" smtClean="0">
-                <a:latin typeface="Helvetica" panose="020B0604020202020204" pitchFamily="34" charset="0"/>
-                <a:cs typeface="Helvetica" panose="020B0604020202020204" pitchFamily="34" charset="0"/>
-              </a:rPr>
-              <a:t>Also explains </a:t>
-            </a:r>
-            <a:r>
-              <a:rPr lang="en-US" sz="3200" i="1" dirty="0" smtClean="0">
-                <a:solidFill>
-                  <a:srgbClr val="FF7A00"/>
-                </a:solidFill>
-                <a:latin typeface="Helvetica" panose="020B0604020202020204" pitchFamily="34" charset="0"/>
-                <a:cs typeface="Helvetica" panose="020B0604020202020204" pitchFamily="34" charset="0"/>
-              </a:rPr>
-              <a:t>why</a:t>
-            </a:r>
-            <a:r>
-              <a:rPr lang="en-US" sz="3200" dirty="0" smtClean="0">
-                <a:solidFill>
-                  <a:srgbClr val="FF7A00"/>
-                </a:solidFill>
-                <a:latin typeface="Helvetica" panose="020B0604020202020204" pitchFamily="34" charset="0"/>
-                <a:cs typeface="Helvetica" panose="020B0604020202020204" pitchFamily="34" charset="0"/>
-              </a:rPr>
-              <a:t> the explicit contrast manipulation works</a:t>
-            </a:r>
-            <a:r>
-              <a:rPr lang="en-US" sz="3200" dirty="0" smtClean="0">
-                <a:latin typeface="Helvetica" panose="020B0604020202020204" pitchFamily="34" charset="0"/>
-                <a:cs typeface="Helvetica" panose="020B0604020202020204" pitchFamily="34" charset="0"/>
-              </a:rPr>
-              <a:t>: the pragmatic factors create a situation where </a:t>
-            </a:r>
-            <a:r>
-              <a:rPr lang="en-US" sz="3200" dirty="0" smtClean="0">
-                <a:latin typeface="Courier"/>
-                <a:cs typeface="Helvetica" panose="020B0604020202020204" pitchFamily="34" charset="0"/>
-              </a:rPr>
-              <a:t>two-not</a:t>
-            </a:r>
-            <a:r>
-              <a:rPr lang="en-US" sz="3200" dirty="0" smtClean="0">
-                <a:latin typeface="Helvetica" panose="020B0604020202020204" pitchFamily="34" charset="0"/>
-                <a:cs typeface="Helvetica" panose="020B0604020202020204" pitchFamily="34" charset="0"/>
-              </a:rPr>
-              <a:t> is still quite informative and therefore useful despite the ambiguity </a:t>
-            </a:r>
-          </a:p>
-          <a:p>
-            <a:pPr marL="457200" indent="-457200">
-              <a:buFont typeface="Wingdings" charset="2"/>
-              <a:buChar char="v"/>
-            </a:pPr>
-            <a:endParaRPr lang="en-US" sz="500" dirty="0" smtClean="0">
-              <a:latin typeface="Helvetica" panose="020B0604020202020204" pitchFamily="34" charset="0"/>
-              <a:cs typeface="Helvetica" panose="020B0604020202020204" pitchFamily="34" charset="0"/>
-            </a:endParaRPr>
-          </a:p>
-          <a:p>
-            <a:pPr marL="457200" indent="-457200">
-              <a:buFont typeface="Wingdings" charset="2"/>
-              <a:buChar char="v"/>
-            </a:pPr>
-            <a:r>
-              <a:rPr lang="en-US" sz="3200" dirty="0" smtClean="0">
-                <a:latin typeface="Helvetica" panose="020B0604020202020204" pitchFamily="34" charset="0"/>
-                <a:cs typeface="Helvetica" panose="020B0604020202020204" pitchFamily="34" charset="0"/>
-              </a:rPr>
-              <a:t>Also </a:t>
-            </a:r>
-            <a:r>
-              <a:rPr lang="en-US" sz="3200" dirty="0" smtClean="0">
-                <a:latin typeface="Helvetica" panose="020B0604020202020204" pitchFamily="34" charset="0"/>
-                <a:cs typeface="Helvetica" panose="020B0604020202020204" pitchFamily="34" charset="0"/>
-              </a:rPr>
-              <a:t>supports </a:t>
-            </a:r>
-            <a:r>
-              <a:rPr lang="en-US" sz="3200" b="1" dirty="0" smtClean="0">
-                <a:latin typeface="Helvetica" panose="020B0604020202020204" pitchFamily="34" charset="0"/>
-                <a:cs typeface="Helvetica" panose="020B0604020202020204" pitchFamily="34" charset="0"/>
-              </a:rPr>
-              <a:t>exactly-two</a:t>
-            </a:r>
-            <a:r>
-              <a:rPr lang="en-US" sz="3200" dirty="0" smtClean="0">
-                <a:latin typeface="Helvetica" panose="020B0604020202020204" pitchFamily="34" charset="0"/>
-                <a:cs typeface="Helvetica" panose="020B0604020202020204" pitchFamily="34" charset="0"/>
-              </a:rPr>
-              <a:t> utterance semantics to explain </a:t>
-            </a:r>
-            <a:r>
-              <a:rPr lang="en-US" sz="3200" dirty="0" smtClean="0">
-                <a:solidFill>
-                  <a:schemeClr val="accent6"/>
-                </a:solidFill>
-                <a:latin typeface="Helvetica" panose="020B0604020202020204" pitchFamily="34" charset="0"/>
-                <a:cs typeface="Helvetica" panose="020B0604020202020204" pitchFamily="34" charset="0"/>
-              </a:rPr>
-              <a:t>adult asymmetry in endorsement behavior across </a:t>
-            </a:r>
-            <a:r>
-              <a:rPr lang="en-US" sz="3200" dirty="0" smtClean="0">
-                <a:solidFill>
-                  <a:schemeClr val="accent6"/>
-                </a:solidFill>
-                <a:latin typeface="Helvetica" panose="020B0604020202020204" pitchFamily="34" charset="0"/>
-                <a:cs typeface="Helvetica" panose="020B0604020202020204" pitchFamily="34" charset="0"/>
-              </a:rPr>
-              <a:t>contexts</a:t>
-            </a:r>
-          </a:p>
-          <a:p>
-            <a:pPr marL="457200" indent="-457200">
-              <a:buFont typeface="Wingdings" charset="2"/>
-              <a:buChar char="v"/>
-            </a:pPr>
-            <a:endParaRPr lang="en-US" sz="1000" dirty="0" smtClean="0">
-              <a:latin typeface="Helvetica" panose="020B0604020202020204" pitchFamily="34" charset="0"/>
-              <a:cs typeface="Helvetica" panose="020B0604020202020204" pitchFamily="34" charset="0"/>
-            </a:endParaRPr>
-          </a:p>
-          <a:p>
-            <a:r>
-              <a:rPr lang="en-US" sz="3200" dirty="0">
-                <a:latin typeface="Helvetica" panose="020B0604020202020204" pitchFamily="34" charset="0"/>
-                <a:cs typeface="Helvetica" panose="020B0604020202020204" pitchFamily="34" charset="0"/>
-              </a:rPr>
-              <a:t>Underscores the </a:t>
-            </a:r>
-            <a:r>
-              <a:rPr lang="en-US" sz="3200" b="1" dirty="0">
-                <a:latin typeface="Helvetica" panose="020B0604020202020204" pitchFamily="34" charset="0"/>
-                <a:cs typeface="Helvetica" panose="020B0604020202020204" pitchFamily="34" charset="0"/>
-              </a:rPr>
-              <a:t>complexity</a:t>
-            </a:r>
-            <a:r>
-              <a:rPr lang="en-US" sz="3200" dirty="0">
-                <a:latin typeface="Helvetica" panose="020B0604020202020204" pitchFamily="34" charset="0"/>
-                <a:cs typeface="Helvetica" panose="020B0604020202020204" pitchFamily="34" charset="0"/>
-              </a:rPr>
-              <a:t> of the </a:t>
-            </a:r>
-            <a:r>
-              <a:rPr lang="en-US" sz="3200" dirty="0" smtClean="0">
-                <a:latin typeface="Helvetica" panose="020B0604020202020204" pitchFamily="34" charset="0"/>
-                <a:cs typeface="Helvetica" panose="020B0604020202020204" pitchFamily="34" charset="0"/>
-              </a:rPr>
-              <a:t>utterance disambiguation:</a:t>
-            </a:r>
-            <a:endParaRPr lang="en-US" sz="3200" dirty="0">
-              <a:latin typeface="Helvetica" panose="020B0604020202020204" pitchFamily="34" charset="0"/>
-              <a:cs typeface="Helvetica" panose="020B0604020202020204" pitchFamily="34" charset="0"/>
-            </a:endParaRPr>
-          </a:p>
-          <a:p>
-            <a:endParaRPr lang="en-US" sz="500" dirty="0">
-              <a:latin typeface="Helvetica" panose="020B0604020202020204" pitchFamily="34" charset="0"/>
-              <a:cs typeface="Helvetica" panose="020B0604020202020204" pitchFamily="34" charset="0"/>
-            </a:endParaRPr>
-          </a:p>
-          <a:p>
-            <a:pPr marL="457200" indent="-457200">
-              <a:buFont typeface="Wingdings" charset="2"/>
-              <a:buChar char="v"/>
-            </a:pPr>
-            <a:r>
-              <a:rPr lang="en-US" sz="3200" dirty="0" smtClean="0">
-                <a:latin typeface="Helvetica" panose="020B0604020202020204" pitchFamily="34" charset="0"/>
-                <a:cs typeface="Helvetica" panose="020B0604020202020204" pitchFamily="34" charset="0"/>
-              </a:rPr>
-              <a:t>A confluence </a:t>
-            </a:r>
-            <a:r>
-              <a:rPr lang="en-US" sz="3200" dirty="0">
-                <a:latin typeface="Helvetica" panose="020B0604020202020204" pitchFamily="34" charset="0"/>
-                <a:cs typeface="Helvetica" panose="020B0604020202020204" pitchFamily="34" charset="0"/>
-              </a:rPr>
-              <a:t>of factors </a:t>
-            </a:r>
-            <a:r>
-              <a:rPr lang="en-US" sz="3200" dirty="0" smtClean="0">
-                <a:latin typeface="Helvetica" panose="020B0604020202020204" pitchFamily="34" charset="0"/>
-                <a:cs typeface="Helvetica" panose="020B0604020202020204" pitchFamily="34" charset="0"/>
-              </a:rPr>
-              <a:t>contribute </a:t>
-            </a:r>
-            <a:r>
-              <a:rPr lang="en-US" sz="3200" dirty="0">
-                <a:latin typeface="Helvetica" panose="020B0604020202020204" pitchFamily="34" charset="0"/>
-                <a:cs typeface="Helvetica" panose="020B0604020202020204" pitchFamily="34" charset="0"/>
-              </a:rPr>
-              <a:t>to how these ambiguities </a:t>
-            </a:r>
-            <a:r>
-              <a:rPr lang="en-US" sz="3200" dirty="0" smtClean="0">
-                <a:latin typeface="Helvetica" panose="020B0604020202020204" pitchFamily="34" charset="0"/>
-                <a:cs typeface="Helvetica" panose="020B0604020202020204" pitchFamily="34" charset="0"/>
-              </a:rPr>
-              <a:t>get resolved</a:t>
-            </a:r>
-            <a:endParaRPr lang="en-US" sz="3200" dirty="0">
-              <a:latin typeface="Helvetica" panose="020B0604020202020204" pitchFamily="34" charset="0"/>
-              <a:cs typeface="Helvetica" panose="020B0604020202020204" pitchFamily="34" charset="0"/>
-            </a:endParaRPr>
           </a:p>
           <a:p>
             <a:pPr marL="457200" indent="-457200">
@@ -6035,78 +5382,100 @@
               <a:buChar char="v"/>
             </a:pPr>
             <a:r>
-              <a:rPr lang="en-US" sz="3200" dirty="0" smtClean="0">
+              <a:rPr lang="en-US" sz="3200" dirty="0">
                 <a:latin typeface="Helvetica" panose="020B0604020202020204" pitchFamily="34" charset="0"/>
                 <a:cs typeface="Helvetica" panose="020B0604020202020204" pitchFamily="34" charset="0"/>
               </a:rPr>
-              <a:t>It appears that </a:t>
-            </a:r>
-            <a:r>
-              <a:rPr lang="en-US" sz="3200" dirty="0" smtClean="0">
+              <a:t>Also explains </a:t>
+            </a:r>
+            <a:r>
+              <a:rPr lang="en-US" sz="3200" i="1" dirty="0">
                 <a:solidFill>
-                  <a:srgbClr val="BA4DFF"/>
+                  <a:srgbClr val="FF7A00"/>
                 </a:solidFill>
                 <a:latin typeface="Helvetica" panose="020B0604020202020204" pitchFamily="34" charset="0"/>
                 <a:cs typeface="Helvetica" panose="020B0604020202020204" pitchFamily="34" charset="0"/>
               </a:rPr>
-              <a:t>pragmatics</a:t>
-            </a:r>
-            <a:r>
-              <a:rPr lang="en-US" sz="3200" dirty="0" smtClean="0">
-                <a:latin typeface="Helvetica" panose="020B0604020202020204" pitchFamily="34" charset="0"/>
-                <a:cs typeface="Helvetica" panose="020B0604020202020204" pitchFamily="34" charset="0"/>
-              </a:rPr>
-              <a:t> has a more profound effect on behavior, </a:t>
-            </a:r>
-            <a:r>
-              <a:rPr lang="en-US" sz="3200" dirty="0">
-                <a:latin typeface="Helvetica" panose="020B0604020202020204" pitchFamily="34" charset="0"/>
-                <a:cs typeface="Helvetica" panose="020B0604020202020204" pitchFamily="34" charset="0"/>
-              </a:rPr>
-              <a:t>but </a:t>
-            </a:r>
-            <a:r>
-              <a:rPr lang="en-US" sz="3200" dirty="0" smtClean="0">
-                <a:latin typeface="Helvetica" panose="020B0604020202020204" pitchFamily="34" charset="0"/>
-                <a:cs typeface="Helvetica" panose="020B0604020202020204" pitchFamily="34" charset="0"/>
-              </a:rPr>
-              <a:t>grammatical </a:t>
-            </a:r>
-            <a:r>
-              <a:rPr lang="en-US" sz="3200" dirty="0" smtClean="0">
+              <a:t>why</a:t>
+            </a:r>
+            <a:r>
+              <a:rPr lang="en-US" sz="3200" dirty="0">
                 <a:solidFill>
-                  <a:srgbClr val="00AEE5"/>
+                  <a:srgbClr val="FF7A00"/>
                 </a:solidFill>
                 <a:latin typeface="Helvetica" panose="020B0604020202020204" pitchFamily="34" charset="0"/>
                 <a:cs typeface="Helvetica" panose="020B0604020202020204" pitchFamily="34" charset="0"/>
               </a:rPr>
-              <a:t>scope</a:t>
-            </a:r>
-            <a:r>
-              <a:rPr lang="en-US" sz="3200" dirty="0" smtClean="0">
+              <a:t> the explicit contrast manipulation works</a:t>
+            </a:r>
+            <a:r>
+              <a:rPr lang="en-US" sz="3200" dirty="0">
                 <a:latin typeface="Helvetica" panose="020B0604020202020204" pitchFamily="34" charset="0"/>
                 <a:cs typeface="Helvetica" panose="020B0604020202020204" pitchFamily="34" charset="0"/>
               </a:rPr>
-              <a:t> access still </a:t>
+              <a:t>: the pragmatic factors create a situation where </a:t>
+            </a:r>
+            <a:r>
+              <a:rPr lang="en-US" sz="3200" dirty="0">
+                <a:latin typeface="Courier"/>
+                <a:cs typeface="Helvetica" panose="020B0604020202020204" pitchFamily="34" charset="0"/>
+              </a:rPr>
+              <a:t>two-not</a:t>
             </a:r>
             <a:r>
               <a:rPr lang="en-US" sz="3200" dirty="0">
                 <a:latin typeface="Helvetica" panose="020B0604020202020204" pitchFamily="34" charset="0"/>
                 <a:cs typeface="Helvetica" panose="020B0604020202020204" pitchFamily="34" charset="0"/>
               </a:rPr>
-              <a:t>matters (especially for adult </a:t>
-            </a:r>
-            <a:r>
-              <a:rPr lang="en-US" sz="3200" dirty="0" smtClean="0">
-                <a:latin typeface="Helvetica" panose="020B0604020202020204" pitchFamily="34" charset="0"/>
-                <a:cs typeface="Helvetica" panose="020B0604020202020204" pitchFamily="34" charset="0"/>
-              </a:rPr>
-              <a:t>behavior!)</a:t>
-            </a:r>
-            <a:endParaRPr lang="en-US" sz="3200" dirty="0">
+              <a:t> is still quite informative and therefore useful despite the ambiguity </a:t>
+            </a:r>
+          </a:p>
+          <a:p>
+            <a:pPr marL="457200" indent="-457200">
+              <a:buFont typeface="Wingdings" charset="2"/>
+              <a:buChar char="v"/>
+            </a:pPr>
+            <a:endParaRPr lang="en-US" sz="500" dirty="0">
               <a:latin typeface="Helvetica" panose="020B0604020202020204" pitchFamily="34" charset="0"/>
               <a:cs typeface="Helvetica" panose="020B0604020202020204" pitchFamily="34" charset="0"/>
             </a:endParaRPr>
+          </a:p>
+          <a:p>
+            <a:pPr marL="457200" indent="-457200">
+              <a:buFont typeface="Wingdings" charset="2"/>
+              <a:buChar char="v"/>
+            </a:pPr>
+            <a:r>
+              <a:rPr lang="en-US" sz="3200" dirty="0">
+                <a:latin typeface="Helvetica" panose="020B0604020202020204" pitchFamily="34" charset="0"/>
+                <a:cs typeface="Helvetica" panose="020B0604020202020204" pitchFamily="34" charset="0"/>
+              </a:rPr>
+              <a:t>Also supports </a:t>
+            </a:r>
+            <a:r>
+              <a:rPr lang="en-US" sz="3200" b="1" dirty="0">
+                <a:latin typeface="Helvetica" panose="020B0604020202020204" pitchFamily="34" charset="0"/>
+                <a:cs typeface="Helvetica" panose="020B0604020202020204" pitchFamily="34" charset="0"/>
+              </a:rPr>
+              <a:t>exactly-two</a:t>
+            </a:r>
+            <a:r>
+              <a:rPr lang="en-US" sz="3200" dirty="0">
+                <a:latin typeface="Helvetica" panose="020B0604020202020204" pitchFamily="34" charset="0"/>
+                <a:cs typeface="Helvetica" panose="020B0604020202020204" pitchFamily="34" charset="0"/>
+              </a:rPr>
+              <a:t> utterance semantics to explain </a:t>
+            </a:r>
+            <a:r>
+              <a:rPr lang="en-US" sz="3200" dirty="0">
+                <a:solidFill>
+                  <a:schemeClr val="accent6"/>
+                </a:solidFill>
+                <a:latin typeface="Helvetica" panose="020B0604020202020204" pitchFamily="34" charset="0"/>
+                <a:cs typeface="Helvetica" panose="020B0604020202020204" pitchFamily="34" charset="0"/>
+              </a:rPr>
+              <a:t>adult asymmetry in endorsement behavior across contexts</a:t>
+            </a:r>
           </a:p>
           <a:p>
             <a:pPr marL="457200" indent="-457200">
@@ -6124,33 +5493,131 @@
                 <a:latin typeface="Helvetica" panose="020B0604020202020204" pitchFamily="34" charset="0"/>
                 <a:cs typeface="Helvetica" panose="020B0604020202020204" pitchFamily="34" charset="0"/>
               </a:rPr>
-              <a:t>Computational modeling can help us refine our </a:t>
+              <a:t>Underscores the </a:t>
             </a:r>
             <a:r>
               <a:rPr lang="en-US" sz="3200" b="1" dirty="0">
                 <a:latin typeface="Helvetica" panose="020B0604020202020204" pitchFamily="34" charset="0"/>
                 <a:cs typeface="Helvetica" panose="020B0604020202020204" pitchFamily="34" charset="0"/>
               </a:rPr>
-              <a:t>theories about language </a:t>
-            </a:r>
-            <a:r>
-              <a:rPr lang="en-US" sz="3200" b="1" dirty="0" smtClean="0">
+              <a:t>complexity</a:t>
+            </a:r>
+            <a:r>
+              <a:rPr lang="en-US" sz="3200" dirty="0">
                 <a:latin typeface="Helvetica" panose="020B0604020202020204" pitchFamily="34" charset="0"/>
                 <a:cs typeface="Helvetica" panose="020B0604020202020204" pitchFamily="34" charset="0"/>
               </a:rPr>
-              <a:t>representation</a:t>
-            </a:r>
-            <a:r>
-              <a:rPr lang="en-US" sz="3200" dirty="0" smtClean="0">
-                <a:latin typeface="Helvetica" panose="020B0604020202020204" pitchFamily="34" charset="0"/>
-                <a:cs typeface="Helvetica" panose="020B0604020202020204" pitchFamily="34" charset="0"/>
-              </a:rPr>
-              <a:t>:</a:t>
-            </a:r>
-            <a:endParaRPr lang="en-US" sz="3200" dirty="0">
+              <a:t> of the utterance disambiguation:</a:t>
+            </a:r>
+          </a:p>
+          <a:p>
+            <a:endParaRPr lang="en-US" sz="500" dirty="0">
               <a:latin typeface="Helvetica" panose="020B0604020202020204" pitchFamily="34" charset="0"/>
               <a:cs typeface="Helvetica" panose="020B0604020202020204" pitchFamily="34" charset="0"/>
             </a:endParaRPr>
+          </a:p>
+          <a:p>
+            <a:pPr marL="457200" indent="-457200">
+              <a:buFont typeface="Wingdings" charset="2"/>
+              <a:buChar char="v"/>
+            </a:pPr>
+            <a:r>
+              <a:rPr lang="en-US" sz="3200" dirty="0">
+                <a:latin typeface="Helvetica" panose="020B0604020202020204" pitchFamily="34" charset="0"/>
+                <a:cs typeface="Helvetica" panose="020B0604020202020204" pitchFamily="34" charset="0"/>
+              </a:rPr>
+              <a:t>A confluence of factors contribute to how these ambiguities get resolved</a:t>
+            </a:r>
+          </a:p>
+          <a:p>
+            <a:pPr marL="457200" indent="-457200">
+              <a:buFont typeface="Wingdings" charset="2"/>
+              <a:buChar char="v"/>
+            </a:pPr>
+            <a:endParaRPr lang="en-US" sz="500" dirty="0">
+              <a:latin typeface="Helvetica" panose="020B0604020202020204" pitchFamily="34" charset="0"/>
+              <a:cs typeface="Helvetica" panose="020B0604020202020204" pitchFamily="34" charset="0"/>
+            </a:endParaRPr>
+          </a:p>
+          <a:p>
+            <a:pPr marL="457200" indent="-457200">
+              <a:buFont typeface="Wingdings" charset="2"/>
+              <a:buChar char="v"/>
+            </a:pPr>
+            <a:r>
+              <a:rPr lang="en-US" sz="3200" dirty="0">
+                <a:latin typeface="Helvetica" panose="020B0604020202020204" pitchFamily="34" charset="0"/>
+                <a:cs typeface="Helvetica" panose="020B0604020202020204" pitchFamily="34" charset="0"/>
+              </a:rPr>
+              <a:t>It appears that </a:t>
+            </a:r>
+            <a:r>
+              <a:rPr lang="en-US" sz="3200" dirty="0">
+                <a:solidFill>
+                  <a:srgbClr val="BA4DFF"/>
+                </a:solidFill>
+                <a:latin typeface="Helvetica" panose="020B0604020202020204" pitchFamily="34" charset="0"/>
+                <a:cs typeface="Helvetica" panose="020B0604020202020204" pitchFamily="34" charset="0"/>
+              </a:rPr>
+              <a:t>pragmatics</a:t>
+            </a:r>
+            <a:r>
+              <a:rPr lang="en-US" sz="3200" dirty="0">
+                <a:latin typeface="Helvetica" panose="020B0604020202020204" pitchFamily="34" charset="0"/>
+                <a:cs typeface="Helvetica" panose="020B0604020202020204" pitchFamily="34" charset="0"/>
+              </a:rPr>
+              <a:t> has a more profound effect on behavior, but grammatical </a:t>
+            </a:r>
+            <a:r>
+              <a:rPr lang="en-US" sz="3200" dirty="0">
+                <a:solidFill>
+                  <a:srgbClr val="00AEE5"/>
+                </a:solidFill>
+                <a:latin typeface="Helvetica" panose="020B0604020202020204" pitchFamily="34" charset="0"/>
+                <a:cs typeface="Helvetica" panose="020B0604020202020204" pitchFamily="34" charset="0"/>
+              </a:rPr>
+              <a:t>scope</a:t>
+            </a:r>
+            <a:r>
+              <a:rPr lang="en-US" sz="3200" dirty="0">
+                <a:latin typeface="Helvetica" panose="020B0604020202020204" pitchFamily="34" charset="0"/>
+                <a:cs typeface="Helvetica" panose="020B0604020202020204" pitchFamily="34" charset="0"/>
+              </a:rPr>
+              <a:t> access still matters (especially for adult behavior!)</a:t>
+            </a:r>
+          </a:p>
+          <a:p>
+            <a:pPr marL="457200" indent="-457200">
+              <a:buFont typeface="Wingdings" charset="2"/>
+              <a:buChar char="v"/>
+            </a:pPr>
+            <a:endParaRPr lang="en-US" sz="1000" dirty="0">
+              <a:latin typeface="Helvetica" panose="020B0604020202020204" pitchFamily="34" charset="0"/>
+              <a:cs typeface="Helvetica" panose="020B0604020202020204" pitchFamily="34" charset="0"/>
+            </a:endParaRPr>
+          </a:p>
+          <a:p>
+            <a:r>
+              <a:rPr lang="en-US" sz="3200" dirty="0">
+                <a:latin typeface="Helvetica" panose="020B0604020202020204" pitchFamily="34" charset="0"/>
+                <a:cs typeface="Helvetica" panose="020B0604020202020204" pitchFamily="34" charset="0"/>
+              </a:rPr>
+              <a:t>Computational modeling can help us refine our </a:t>
+            </a:r>
+            <a:r>
+              <a:rPr lang="en-US" sz="3200" b="1" dirty="0">
+                <a:latin typeface="Helvetica" panose="020B0604020202020204" pitchFamily="34" charset="0"/>
+                <a:cs typeface="Helvetica" panose="020B0604020202020204" pitchFamily="34" charset="0"/>
+              </a:rPr>
+              <a:t>theories about language representation</a:t>
+            </a:r>
+            <a:r>
+              <a:rPr lang="en-US" sz="3200" dirty="0">
+                <a:latin typeface="Helvetica" panose="020B0604020202020204" pitchFamily="34" charset="0"/>
+                <a:cs typeface="Helvetica" panose="020B0604020202020204" pitchFamily="34" charset="0"/>
+              </a:rPr>
+              <a:t>:</a:t>
+            </a:r>
           </a:p>
           <a:p>
             <a:endParaRPr lang="en-US" sz="500" b="1" dirty="0">
@@ -6182,33 +5649,8 @@
                 <a:latin typeface="Helvetica" panose="020B0604020202020204" pitchFamily="34" charset="0"/>
                 <a:cs typeface="Helvetica" panose="020B0604020202020204" pitchFamily="34" charset="0"/>
               </a:rPr>
-              <a:t> </a:t>
-            </a:r>
-            <a:r>
-              <a:rPr lang="en-US" sz="3200" dirty="0" smtClean="0">
-                <a:latin typeface="Helvetica" panose="020B0604020202020204" pitchFamily="34" charset="0"/>
-                <a:cs typeface="Helvetica" panose="020B0604020202020204" pitchFamily="34" charset="0"/>
-              </a:rPr>
-              <a:t>and test the relevant predictions in </a:t>
-            </a:r>
-            <a:r>
-              <a:rPr lang="en-US" sz="3200" dirty="0">
-                <a:latin typeface="Helvetica" panose="020B0604020202020204" pitchFamily="34" charset="0"/>
-                <a:cs typeface="Helvetica" panose="020B0604020202020204" pitchFamily="34" charset="0"/>
-              </a:rPr>
-              <a:t>ways behavioral experiments </a:t>
-            </a:r>
-            <a:r>
-              <a:rPr lang="en-US" sz="3200" dirty="0" smtClean="0">
-                <a:latin typeface="Helvetica" panose="020B0604020202020204" pitchFamily="34" charset="0"/>
-                <a:cs typeface="Helvetica" panose="020B0604020202020204" pitchFamily="34" charset="0"/>
-              </a:rPr>
-              <a:t>alone cannot</a:t>
-            </a:r>
-            <a:endParaRPr lang="en-US" sz="3200" dirty="0">
-              <a:latin typeface="Helvetica" panose="020B0604020202020204" pitchFamily="34" charset="0"/>
-              <a:cs typeface="Helvetica" panose="020B0604020202020204" pitchFamily="34" charset="0"/>
-            </a:endParaRPr>
+              <a:t> and test the relevant predictions in ways behavioral experiments alone cannot</a:t>
+            </a:r>
           </a:p>
           <a:p>
             <a:pPr marL="457200" indent="-457200">
@@ -6307,23 +5749,7 @@
                 <a:ea typeface="Helvetica" charset="0"/>
                 <a:cs typeface="Helvetica" charset="0"/>
               </a:rPr>
-              <a:t>					a. </a:t>
-            </a:r>
-            <a:r>
-              <a:rPr lang="en-US" sz="3500" dirty="0" smtClean="0">
-                <a:latin typeface="Helvetica" charset="0"/>
-                <a:ea typeface="Helvetica" charset="0"/>
-                <a:cs typeface="Helvetica" charset="0"/>
-              </a:rPr>
-              <a:t>∀ </a:t>
-            </a:r>
-            <a:r>
-              <a:rPr lang="en-US" sz="3500" dirty="0">
-                <a:latin typeface="Helvetica" charset="0"/>
-                <a:ea typeface="Helvetica" charset="0"/>
-                <a:cs typeface="Helvetica" charset="0"/>
-              </a:rPr>
-              <a:t>&gt;&gt; ¬ (</a:t>
+              <a:t>					a. ∀ &gt;&gt; ¬ (</a:t>
             </a:r>
             <a:r>
               <a:rPr lang="en-US" sz="3500" dirty="0">
@@ -6390,23 +5816,7 @@
                 <a:ea typeface="Helvetica" charset="0"/>
                 <a:cs typeface="Helvetica" charset="0"/>
               </a:rPr>
-              <a:t>					b.	</a:t>
-            </a:r>
-            <a:r>
-              <a:rPr lang="en-US" sz="3500" dirty="0" smtClean="0">
-                <a:latin typeface="Helvetica" charset="0"/>
-                <a:ea typeface="Helvetica" charset="0"/>
-                <a:cs typeface="Helvetica" charset="0"/>
-              </a:rPr>
-              <a:t>¬ </a:t>
-            </a:r>
-            <a:r>
-              <a:rPr lang="en-US" sz="3500" dirty="0">
-                <a:latin typeface="Helvetica" charset="0"/>
-                <a:ea typeface="Helvetica" charset="0"/>
-                <a:cs typeface="Helvetica" charset="0"/>
-              </a:rPr>
-              <a:t>&gt;&gt; ∀ (</a:t>
+              <a:t>					b.	¬ &gt;&gt; ∀ (</a:t>
             </a:r>
             <a:r>
               <a:rPr lang="en-US" sz="3500" dirty="0">
@@ -6678,23 +6088,7 @@
                 <a:ea typeface="Courier" charset="0"/>
                 <a:cs typeface="Courier" charset="0"/>
               </a:rPr>
-              <a:t>0,1,2} </a:t>
-            </a:r>
-            <a:r>
-              <a:rPr lang="en-US" sz="3200" dirty="0" smtClean="0">
-                <a:latin typeface="Courier" charset="0"/>
-                <a:ea typeface="Courier" charset="0"/>
-                <a:cs typeface="Courier" charset="0"/>
-              </a:rPr>
-              <a:t>or</a:t>
-            </a:r>
-            <a:r>
-              <a:rPr lang="en-US" sz="3200" dirty="0">
-                <a:latin typeface="Courier" charset="0"/>
-                <a:ea typeface="Courier" charset="0"/>
-                <a:cs typeface="Courier" charset="0"/>
-              </a:rPr>
-              <a:t>			{0,1,2,3,4}</a:t>
+              <a:t>0,1,2} or			{0,1,2,3,4}</a:t>
             </a:r>
             <a:endParaRPr lang="en-US" sz="3200" dirty="0">
               <a:latin typeface="Helvetica" charset="0"/>
@@ -6769,7 +6163,7 @@
           <p:cNvPr id="109" name="Rectangle 108">
             <a:extLst>
               <a:ext uri="{FF2B5EF4-FFF2-40B4-BE49-F238E27FC236}">
-                <a16:creationId xmlns="" xmlns:a16="http://schemas.microsoft.com/office/drawing/2014/main" id="{B0C2B74B-A441-4BFD-95E8-40D6ADEE7341}"/>
+                <a16:creationId xmlns:a16="http://schemas.microsoft.com/office/drawing/2014/main" id="{B0C2B74B-A441-4BFD-95E8-40D6ADEE7341}"/>
               </a:ext>
             </a:extLst>
           </p:cNvPr>
@@ -6845,23 +6239,7 @@
                 <a:ea typeface="Helvetica" charset="0"/>
                 <a:cs typeface="Helvetica" charset="0"/>
               </a:rPr>
-              <a:t>					a. </a:t>
-            </a:r>
-            <a:r>
-              <a:rPr lang="en-US" sz="3500" dirty="0" smtClean="0">
-                <a:latin typeface="Helvetica" charset="0"/>
-                <a:ea typeface="Helvetica" charset="0"/>
-                <a:cs typeface="Helvetica" charset="0"/>
-              </a:rPr>
-              <a:t>2 </a:t>
-            </a:r>
-            <a:r>
-              <a:rPr lang="en-US" sz="3500" dirty="0">
-                <a:latin typeface="Helvetica" charset="0"/>
-                <a:ea typeface="Helvetica" charset="0"/>
-                <a:cs typeface="Helvetica" charset="0"/>
-              </a:rPr>
-              <a:t>&gt;&gt; ¬ (</a:t>
+              <a:t>					a. 2 &gt;&gt; ¬ (</a:t>
             </a:r>
             <a:r>
               <a:rPr lang="en-US" sz="3500" dirty="0">
@@ -6944,23 +6322,7 @@
                 <a:ea typeface="Helvetica" charset="0"/>
                 <a:cs typeface="Helvetica" charset="0"/>
               </a:rPr>
-              <a:t>					b.	</a:t>
-            </a:r>
-            <a:r>
-              <a:rPr lang="en-US" sz="3500" dirty="0" smtClean="0">
-                <a:latin typeface="Helvetica" charset="0"/>
-                <a:ea typeface="Helvetica" charset="0"/>
-                <a:cs typeface="Helvetica" charset="0"/>
-              </a:rPr>
-              <a:t>¬ </a:t>
-            </a:r>
-            <a:r>
-              <a:rPr lang="en-US" sz="3500" dirty="0">
-                <a:latin typeface="Helvetica" charset="0"/>
-                <a:ea typeface="Helvetica" charset="0"/>
-                <a:cs typeface="Helvetica" charset="0"/>
-              </a:rPr>
-              <a:t>&gt;&gt; 2 (</a:t>
+              <a:t>					b.	¬ &gt;&gt; 2 (</a:t>
             </a:r>
             <a:r>
               <a:rPr lang="en-US" sz="3500" dirty="0">
@@ -7031,7 +6393,7 @@
           <p:cNvPr id="116" name="TextBox 115">
             <a:extLst>
               <a:ext uri="{FF2B5EF4-FFF2-40B4-BE49-F238E27FC236}">
-                <a16:creationId xmlns="" xmlns:a16="http://schemas.microsoft.com/office/drawing/2014/main" id="{17BF042B-9C15-46E9-BF43-63E86A777B20}"/>
+                <a16:creationId xmlns:a16="http://schemas.microsoft.com/office/drawing/2014/main" id="{17BF042B-9C15-46E9-BF43-63E86A777B20}"/>
               </a:ext>
             </a:extLst>
           </p:cNvPr>
@@ -7076,7 +6438,7 @@
           <p:cNvPr id="26" name="Picture 25">
             <a:extLst>
               <a:ext uri="{FF2B5EF4-FFF2-40B4-BE49-F238E27FC236}">
-                <a16:creationId xmlns="" xmlns:a16="http://schemas.microsoft.com/office/drawing/2014/main" id="{87CDAF56-BA52-4BC5-A6D1-3675E718FA7B}"/>
+                <a16:creationId xmlns:a16="http://schemas.microsoft.com/office/drawing/2014/main" id="{87CDAF56-BA52-4BC5-A6D1-3675E718FA7B}"/>
               </a:ext>
             </a:extLst>
           </p:cNvPr>
@@ -7112,7 +6474,7 @@
           <p:cNvPr id="30" name="Picture 29">
             <a:extLst>
               <a:ext uri="{FF2B5EF4-FFF2-40B4-BE49-F238E27FC236}">
-                <a16:creationId xmlns="" xmlns:a16="http://schemas.microsoft.com/office/drawing/2014/main" id="{C0735CB4-5FC5-4345-87E5-288020E50953}"/>
+                <a16:creationId xmlns:a16="http://schemas.microsoft.com/office/drawing/2014/main" id="{C0735CB4-5FC5-4345-87E5-288020E50953}"/>
               </a:ext>
             </a:extLst>
           </p:cNvPr>
@@ -7148,7 +6510,7 @@
           <p:cNvPr id="35" name="Picture 34">
             <a:extLst>
               <a:ext uri="{FF2B5EF4-FFF2-40B4-BE49-F238E27FC236}">
-                <a16:creationId xmlns="" xmlns:a16="http://schemas.microsoft.com/office/drawing/2014/main" id="{91DF447F-C340-41C3-9C88-2ACF07DD4B62}"/>
+                <a16:creationId xmlns:a16="http://schemas.microsoft.com/office/drawing/2014/main" id="{91DF447F-C340-41C3-9C88-2ACF07DD4B62}"/>
               </a:ext>
             </a:extLst>
           </p:cNvPr>
@@ -7184,7 +6546,7 @@
           <p:cNvPr id="45" name="Picture 44">
             <a:extLst>
               <a:ext uri="{FF2B5EF4-FFF2-40B4-BE49-F238E27FC236}">
-                <a16:creationId xmlns="" xmlns:a16="http://schemas.microsoft.com/office/drawing/2014/main" id="{D613E970-06E9-4139-AD28-CB1762579045}"/>
+                <a16:creationId xmlns:a16="http://schemas.microsoft.com/office/drawing/2014/main" id="{D613E970-06E9-4139-AD28-CB1762579045}"/>
               </a:ext>
             </a:extLst>
           </p:cNvPr>
@@ -7207,7 +6569,7 @@
         </p:blipFill>
         <p:spPr>
           <a:xfrm>
-            <a:off x="37067960" y="13002745"/>
+            <a:off x="37069790" y="12968557"/>
             <a:ext cx="4943475" cy="3228975"/>
           </a:xfrm>
           <a:prstGeom prst="rect">
@@ -7220,7 +6582,7 @@
           <p:cNvPr id="128" name="TextBox 127">
             <a:extLst>
               <a:ext uri="{FF2B5EF4-FFF2-40B4-BE49-F238E27FC236}">
-                <a16:creationId xmlns="" xmlns:a16="http://schemas.microsoft.com/office/drawing/2014/main" id="{09C2DA8E-62D0-4C63-A4AB-8CBB3C23E455}"/>
+                <a16:creationId xmlns:a16="http://schemas.microsoft.com/office/drawing/2014/main" id="{09C2DA8E-62D0-4C63-A4AB-8CBB3C23E455}"/>
               </a:ext>
             </a:extLst>
           </p:cNvPr>
@@ -7244,7 +6606,7 @@
           <a:lstStyle/>
           <a:p>
             <a:r>
-              <a:rPr lang="en-US" sz="3200" dirty="0" smtClean="0">
+              <a:rPr lang="en-US" sz="3200" dirty="0">
                 <a:latin typeface="Helvetica" charset="0"/>
                 <a:ea typeface="Helvetica" charset="0"/>
                 <a:cs typeface="Helvetica" charset="0"/>
@@ -7252,23 +6614,15 @@
               <a:t>The </a:t>
             </a:r>
             <a:r>
-              <a:rPr lang="en-US" sz="3200" b="1" dirty="0" smtClean="0">
-                <a:latin typeface="Helvetica" charset="0"/>
-                <a:ea typeface="Helvetica" charset="0"/>
-                <a:cs typeface="Helvetica" charset="0"/>
-              </a:rPr>
-              <a:t>s</a:t>
-            </a:r>
-            <a:r>
-              <a:rPr lang="en-US" sz="3200" b="1" dirty="0" smtClean="0">
-                <a:latin typeface="Helvetica" charset="0"/>
-                <a:ea typeface="Helvetica" charset="0"/>
-                <a:cs typeface="Helvetica" charset="0"/>
-              </a:rPr>
-              <a:t>ame</a:t>
-            </a:r>
-            <a:r>
-              <a:rPr lang="en-US" sz="3200" dirty="0" smtClean="0">
+              <a:rPr lang="en-US" sz="3200" b="1" dirty="0">
+                <a:latin typeface="Helvetica" charset="0"/>
+                <a:ea typeface="Helvetica" charset="0"/>
+                <a:cs typeface="Helvetica" charset="0"/>
+              </a:rPr>
+              <a:t>same</a:t>
+            </a:r>
+            <a:r>
+              <a:rPr lang="en-US" sz="3200" dirty="0">
                 <a:latin typeface="Helvetica" charset="0"/>
                 <a:ea typeface="Helvetica" charset="0"/>
                 <a:cs typeface="Helvetica" charset="0"/>
@@ -7276,7 +6630,7 @@
               <a:t> </a:t>
             </a:r>
             <a:r>
-              <a:rPr lang="en-US" sz="3200" dirty="0" smtClean="0">
+              <a:rPr lang="en-US" sz="3200" dirty="0">
                 <a:solidFill>
                   <a:srgbClr val="BA4DFF"/>
                 </a:solidFill>
@@ -7287,31 +6641,15 @@
               <a:t>pragmatic</a:t>
             </a:r>
             <a:r>
-              <a:rPr lang="en-US" sz="3200" dirty="0" smtClean="0">
-                <a:latin typeface="Helvetica" charset="0"/>
-                <a:ea typeface="Helvetica" charset="0"/>
-                <a:cs typeface="Helvetica" charset="0"/>
-              </a:rPr>
-              <a:t> parameter </a:t>
-            </a:r>
-            <a:r>
-              <a:rPr lang="en-US" sz="3200" dirty="0">
-                <a:latin typeface="Helvetica" charset="0"/>
-                <a:ea typeface="Helvetica" charset="0"/>
-                <a:cs typeface="Helvetica" charset="0"/>
-              </a:rPr>
-              <a:t>settings </a:t>
-            </a:r>
-            <a:r>
-              <a:rPr lang="en-US" sz="3200" dirty="0" smtClean="0">
-                <a:latin typeface="Helvetica" charset="0"/>
-                <a:ea typeface="Helvetica" charset="0"/>
-                <a:cs typeface="Helvetica" charset="0"/>
-              </a:rPr>
-              <a:t>(</a:t>
-            </a:r>
-            <a:r>
-              <a:rPr lang="en-US" sz="3200" i="1" dirty="0" smtClean="0">
+              <a:rPr lang="en-US" sz="3200" dirty="0">
+                <a:latin typeface="Helvetica" charset="0"/>
+                <a:ea typeface="Helvetica" charset="0"/>
+                <a:cs typeface="Helvetica" charset="0"/>
+              </a:rPr>
+              <a:t> parameter settings (</a:t>
+            </a:r>
+            <a:r>
+              <a:rPr lang="en-US" sz="3200" i="1" dirty="0">
                 <a:latin typeface="Helvetica" charset="0"/>
                 <a:ea typeface="Helvetica" charset="0"/>
                 <a:cs typeface="Helvetica" charset="0"/>
@@ -7319,55 +6657,15 @@
               <a:t>b </a:t>
             </a:r>
             <a:r>
-              <a:rPr lang="en-US" sz="3200" dirty="0" smtClean="0">
-                <a:latin typeface="Helvetica" charset="0"/>
-                <a:ea typeface="Helvetica" charset="0"/>
-                <a:cs typeface="Helvetica" charset="0"/>
-              </a:rPr>
-              <a:t>= 0.1, uniform QUD prior) </a:t>
-            </a:r>
-            <a:r>
-              <a:rPr lang="en-US" sz="3200" dirty="0" smtClean="0">
-                <a:latin typeface="Helvetica" charset="0"/>
-                <a:ea typeface="Helvetica" charset="0"/>
-                <a:cs typeface="Helvetica" charset="0"/>
-              </a:rPr>
-              <a:t>that </a:t>
-            </a:r>
-            <a:r>
-              <a:rPr lang="en-US" sz="3200" dirty="0" smtClean="0">
-                <a:latin typeface="Helvetica" charset="0"/>
-                <a:ea typeface="Helvetica" charset="0"/>
-                <a:cs typeface="Helvetica" charset="0"/>
-              </a:rPr>
-              <a:t>yield low 1-of-2 </a:t>
-            </a:r>
-            <a:r>
-              <a:rPr lang="en-US" sz="3200" dirty="0" smtClean="0">
-                <a:latin typeface="Helvetica" charset="0"/>
-                <a:ea typeface="Helvetica" charset="0"/>
-                <a:cs typeface="Helvetica" charset="0"/>
-              </a:rPr>
-              <a:t>endorsement </a:t>
-            </a:r>
-            <a:r>
-              <a:rPr lang="en-US" sz="3200" dirty="0" smtClean="0">
-                <a:latin typeface="Helvetica" charset="0"/>
-                <a:ea typeface="Helvetica" charset="0"/>
-                <a:cs typeface="Helvetica" charset="0"/>
-              </a:rPr>
-              <a:t>yield </a:t>
-            </a:r>
-            <a:r>
-              <a:rPr lang="en-US" sz="3200" dirty="0" smtClean="0">
-                <a:latin typeface="Helvetica" charset="0"/>
-                <a:ea typeface="Helvetica" charset="0"/>
-                <a:cs typeface="Helvetica" charset="0"/>
-              </a:rPr>
-              <a:t>high 2-of-4 endorsement </a:t>
-            </a:r>
-            <a:r>
-              <a:rPr lang="en-US" sz="3200" dirty="0" smtClean="0">
+              <a:rPr lang="en-US" sz="3200" dirty="0">
+                <a:latin typeface="Helvetica" charset="0"/>
+                <a:ea typeface="Helvetica" charset="0"/>
+                <a:cs typeface="Helvetica" charset="0"/>
+              </a:rPr>
+              <a:t>= 0.1, uniform QUD prior) that yield low 1-of-2 endorsement yield high 2-of-4 endorsement </a:t>
+            </a:r>
+            <a:r>
+              <a:rPr lang="en-US" sz="3200" dirty="0">
                 <a:solidFill>
                   <a:srgbClr val="00AEE5"/>
                 </a:solidFill>
@@ -7375,21 +6673,10 @@
                 <a:ea typeface="Helvetica" charset="0"/>
                 <a:cs typeface="Helvetica" charset="0"/>
               </a:rPr>
-              <a:t>if inverse scope is </a:t>
-            </a:r>
-            <a:r>
-              <a:rPr lang="en-US" sz="3200" dirty="0" smtClean="0">
-                <a:solidFill>
-                  <a:srgbClr val="00AEE5"/>
-                </a:solidFill>
-                <a:latin typeface="Helvetica" charset="0"/>
-                <a:ea typeface="Helvetica" charset="0"/>
-                <a:cs typeface="Helvetica" charset="0"/>
-              </a:rPr>
-              <a:t>unlikely </a:t>
-            </a:r>
-            <a:r>
-              <a:rPr lang="en-US" sz="3200" dirty="0" smtClean="0">
+              <a:t>if inverse scope is unlikely </a:t>
+            </a:r>
+            <a:r>
+              <a:rPr lang="en-US" sz="3200" dirty="0">
                 <a:latin typeface="Helvetica" charset="0"/>
                 <a:ea typeface="Helvetica" charset="0"/>
                 <a:cs typeface="Helvetica" charset="0"/>
@@ -7397,7 +6684,7 @@
               <a:t>(p(</a:t>
             </a:r>
             <a:r>
-              <a:rPr lang="en-US" sz="3200" dirty="0" err="1" smtClean="0">
+              <a:rPr lang="en-US" sz="3200" dirty="0" err="1">
                 <a:latin typeface="Helvetica" charset="0"/>
                 <a:ea typeface="Helvetica" charset="0"/>
                 <a:cs typeface="Helvetica" charset="0"/>
@@ -7405,7 +6692,7 @@
               <a:t>inv</a:t>
             </a:r>
             <a:r>
-              <a:rPr lang="en-US" sz="3200" dirty="0" smtClean="0">
+              <a:rPr lang="en-US" sz="3200" dirty="0">
                 <a:latin typeface="Helvetica" charset="0"/>
                 <a:ea typeface="Helvetica" charset="0"/>
                 <a:cs typeface="Helvetica" charset="0"/>
@@ -7413,7 +6700,7 @@
               <a:t>) = 0.1) and the semantics of the numeral is </a:t>
             </a:r>
             <a:r>
-              <a:rPr lang="en-US" sz="3200" b="1" dirty="0" smtClean="0">
+              <a:rPr lang="en-US" sz="3200" b="1" dirty="0">
                 <a:latin typeface="Helvetica" charset="0"/>
                 <a:ea typeface="Helvetica" charset="0"/>
                 <a:cs typeface="Helvetica" charset="0"/>
@@ -7421,7 +6708,7 @@
               <a:t>exact</a:t>
             </a:r>
             <a:r>
-              <a:rPr lang="en-US" sz="3200" dirty="0" smtClean="0">
+              <a:rPr lang="en-US" sz="3200" dirty="0">
                 <a:latin typeface="Helvetica" charset="0"/>
                 <a:ea typeface="Helvetica" charset="0"/>
                 <a:cs typeface="Helvetica" charset="0"/>
@@ -7441,7 +6728,7 @@
           <p:cNvPr id="131" name="Rectangle 130">
             <a:extLst>
               <a:ext uri="{FF2B5EF4-FFF2-40B4-BE49-F238E27FC236}">
-                <a16:creationId xmlns="" xmlns:a16="http://schemas.microsoft.com/office/drawing/2014/main" id="{9C696C9D-2FF4-4A72-A589-A748EA6F0595}"/>
+                <a16:creationId xmlns:a16="http://schemas.microsoft.com/office/drawing/2014/main" id="{9C696C9D-2FF4-4A72-A589-A748EA6F0595}"/>
               </a:ext>
             </a:extLst>
           </p:cNvPr>
@@ -7495,7 +6782,7 @@
           <p:cNvPr id="132" name="Rectangle 131">
             <a:extLst>
               <a:ext uri="{FF2B5EF4-FFF2-40B4-BE49-F238E27FC236}">
-                <a16:creationId xmlns="" xmlns:a16="http://schemas.microsoft.com/office/drawing/2014/main" id="{24BF3BE1-03F9-4A37-9761-A770594C1EFB}"/>
+                <a16:creationId xmlns:a16="http://schemas.microsoft.com/office/drawing/2014/main" id="{24BF3BE1-03F9-4A37-9761-A770594C1EFB}"/>
               </a:ext>
             </a:extLst>
           </p:cNvPr>
@@ -7549,7 +6836,7 @@
           <p:cNvPr id="133" name="Rectangle 132">
             <a:extLst>
               <a:ext uri="{FF2B5EF4-FFF2-40B4-BE49-F238E27FC236}">
-                <a16:creationId xmlns="" xmlns:a16="http://schemas.microsoft.com/office/drawing/2014/main" id="{64120A37-57DE-414A-99B0-6ADD6D0BD2BD}"/>
+                <a16:creationId xmlns:a16="http://schemas.microsoft.com/office/drawing/2014/main" id="{64120A37-57DE-414A-99B0-6ADD6D0BD2BD}"/>
               </a:ext>
             </a:extLst>
           </p:cNvPr>
@@ -7621,7 +6908,7 @@
           <a:lstStyle/>
           <a:p>
             <a:r>
-              <a:rPr lang="en-US" sz="4200" b="1" dirty="0" smtClean="0">
+              <a:rPr lang="en-US" sz="4200" b="1" dirty="0">
                 <a:solidFill>
                   <a:srgbClr val="002060"/>
                 </a:solidFill>
@@ -7632,7 +6919,7 @@
               <a:t>Which combination of </a:t>
             </a:r>
             <a:r>
-              <a:rPr lang="en-US" sz="4200" b="1" smtClean="0">
+              <a:rPr lang="en-US" sz="4200" b="1">
                 <a:solidFill>
                   <a:srgbClr val="002060"/>
                 </a:solidFill>
@@ -7640,21 +6927,10 @@
                 <a:ea typeface="Helvetica" charset="0"/>
                 <a:cs typeface="Helvetica" charset="0"/>
               </a:rPr>
-              <a:t>settings </a:t>
-            </a:r>
-            <a:r>
-              <a:rPr lang="en-US" sz="4200" b="1" smtClean="0">
-                <a:solidFill>
-                  <a:srgbClr val="002060"/>
-                </a:solidFill>
-                <a:latin typeface="Helvetica" charset="0"/>
-                <a:ea typeface="Helvetica" charset="0"/>
-                <a:cs typeface="Helvetica" charset="0"/>
-              </a:rPr>
-              <a:t>captures </a:t>
-            </a:r>
-            <a:r>
-              <a:rPr lang="en-US" sz="4200" b="1" dirty="0" smtClean="0">
+              <a:t>settings captures </a:t>
+            </a:r>
+            <a:r>
+              <a:rPr lang="en-US" sz="4200" b="1" dirty="0">
                 <a:solidFill>
                   <a:srgbClr val="002060"/>
                 </a:solidFill>
@@ -7680,7 +6956,7 @@
           <p:cNvPr id="71" name="TextBox 70">
             <a:extLst>
               <a:ext uri="{FF2B5EF4-FFF2-40B4-BE49-F238E27FC236}">
-                <a16:creationId xmlns="" xmlns:a16="http://schemas.microsoft.com/office/drawing/2014/main" id="{EF25DB67-E21E-4EE0-821F-CA444EDA7760}"/>
+                <a16:creationId xmlns:a16="http://schemas.microsoft.com/office/drawing/2014/main" id="{EF25DB67-E21E-4EE0-821F-CA444EDA7760}"/>
               </a:ext>
             </a:extLst>
           </p:cNvPr>
@@ -7704,7 +6980,7 @@
           <a:lstStyle/>
           <a:p>
             <a:r>
-              <a:rPr lang="en-US" sz="3200" b="1" dirty="0" smtClean="0">
+              <a:rPr lang="en-US" sz="3200" b="1" dirty="0">
                 <a:latin typeface="Helvetica" charset="0"/>
                 <a:ea typeface="Helvetica" charset="0"/>
                 <a:cs typeface="Helvetica" charset="0"/>
@@ -7731,7 +7007,7 @@
           <p:cNvPr id="78" name="Picture 77">
             <a:extLst>
               <a:ext uri="{FF2B5EF4-FFF2-40B4-BE49-F238E27FC236}">
-                <a16:creationId xmlns="" xmlns:a16="http://schemas.microsoft.com/office/drawing/2014/main" id="{1FF0FE8B-F778-4FE7-A47F-74E6E54E8A49}"/>
+                <a16:creationId xmlns:a16="http://schemas.microsoft.com/office/drawing/2014/main" id="{1FF0FE8B-F778-4FE7-A47F-74E6E54E8A49}"/>
               </a:ext>
             </a:extLst>
           </p:cNvPr>
@@ -7761,7 +7037,7 @@
           <p:cNvPr id="80" name="Picture 79">
             <a:extLst>
               <a:ext uri="{FF2B5EF4-FFF2-40B4-BE49-F238E27FC236}">
-                <a16:creationId xmlns="" xmlns:a16="http://schemas.microsoft.com/office/drawing/2014/main" id="{D45B3ADA-1EE0-4D85-90F2-75D879F9C9EA}"/>
+                <a16:creationId xmlns:a16="http://schemas.microsoft.com/office/drawing/2014/main" id="{D45B3ADA-1EE0-4D85-90F2-75D879F9C9EA}"/>
               </a:ext>
             </a:extLst>
           </p:cNvPr>
@@ -7791,7 +7067,7 @@
           <p:cNvPr id="81" name="Picture 80">
             <a:extLst>
               <a:ext uri="{FF2B5EF4-FFF2-40B4-BE49-F238E27FC236}">
-                <a16:creationId xmlns="" xmlns:a16="http://schemas.microsoft.com/office/drawing/2014/main" id="{32417F60-1B96-4AE0-8F1E-8626603FAC51}"/>
+                <a16:creationId xmlns:a16="http://schemas.microsoft.com/office/drawing/2014/main" id="{32417F60-1B96-4AE0-8F1E-8626603FAC51}"/>
               </a:ext>
             </a:extLst>
           </p:cNvPr>
@@ -7821,7 +7097,7 @@
           <p:cNvPr id="85" name="Picture 84">
             <a:extLst>
               <a:ext uri="{FF2B5EF4-FFF2-40B4-BE49-F238E27FC236}">
-                <a16:creationId xmlns="" xmlns:a16="http://schemas.microsoft.com/office/drawing/2014/main" id="{A9BD64BF-7B3B-4620-9AAD-1B791541DD31}"/>
+                <a16:creationId xmlns:a16="http://schemas.microsoft.com/office/drawing/2014/main" id="{A9BD64BF-7B3B-4620-9AAD-1B791541DD31}"/>
               </a:ext>
             </a:extLst>
           </p:cNvPr>
@@ -7851,7 +7127,7 @@
           <p:cNvPr id="76" name="Picture 75">
             <a:extLst>
               <a:ext uri="{FF2B5EF4-FFF2-40B4-BE49-F238E27FC236}">
-                <a16:creationId xmlns="" xmlns:a16="http://schemas.microsoft.com/office/drawing/2014/main" id="{81AE674A-2320-46A1-A1DE-CBC9EC3467E4}"/>
+                <a16:creationId xmlns:a16="http://schemas.microsoft.com/office/drawing/2014/main" id="{81AE674A-2320-46A1-A1DE-CBC9EC3467E4}"/>
               </a:ext>
             </a:extLst>
           </p:cNvPr>
@@ -7881,7 +7157,7 @@
           <p:cNvPr id="89" name="TextBox 88">
             <a:extLst>
               <a:ext uri="{FF2B5EF4-FFF2-40B4-BE49-F238E27FC236}">
-                <a16:creationId xmlns="" xmlns:a16="http://schemas.microsoft.com/office/drawing/2014/main" id="{2E1B66E9-FF70-4036-A65B-8F3BD9E9C97A}"/>
+                <a16:creationId xmlns:a16="http://schemas.microsoft.com/office/drawing/2014/main" id="{2E1B66E9-FF70-4036-A65B-8F3BD9E9C97A}"/>
               </a:ext>
             </a:extLst>
           </p:cNvPr>
@@ -7905,7 +7181,7 @@
           <a:lstStyle/>
           <a:p>
             <a:r>
-              <a:rPr lang="en-US" sz="3200" b="1" dirty="0" smtClean="0">
+              <a:rPr lang="en-US" sz="3200" b="1" dirty="0">
                 <a:latin typeface="Helvetica" charset="0"/>
                 <a:ea typeface="Helvetica" charset="0"/>
                 <a:cs typeface="Helvetica" charset="0"/>
@@ -7913,7 +7189,7 @@
               <a:t>2-of-3</a:t>
             </a:r>
             <a:r>
-              <a:rPr lang="en-US" sz="3200" dirty="0" smtClean="0">
+              <a:rPr lang="en-US" sz="3200" dirty="0">
                 <a:latin typeface="Courier" charset="0"/>
                 <a:ea typeface="Courier" charset="0"/>
                 <a:cs typeface="Courier" charset="0"/>
@@ -7921,7 +7197,7 @@
               <a:t> </a:t>
             </a:r>
             <a:r>
-              <a:rPr lang="en-US" sz="3200" dirty="0" smtClean="0">
+              <a:rPr lang="en-US" sz="3200" dirty="0">
                 <a:latin typeface="Helvetica" panose="020B0604020202020204" pitchFamily="34" charset="0"/>
                 <a:ea typeface="Courier" charset="0"/>
                 <a:cs typeface="Helvetica" panose="020B0604020202020204" pitchFamily="34" charset="0"/>
@@ -7931,7 +7207,7 @@
           </a:p>
           <a:p>
             <a:r>
-              <a:rPr lang="en-US" sz="3200" dirty="0" smtClean="0">
+              <a:rPr lang="en-US" sz="3200" dirty="0">
                 <a:solidFill>
                   <a:srgbClr val="00B150"/>
                 </a:solidFill>
@@ -7942,20 +7218,12 @@
               <a:t>surface</a:t>
             </a:r>
             <a:r>
-              <a:rPr lang="en-US" sz="3200" dirty="0" smtClean="0">
+              <a:rPr lang="en-US" sz="3200" dirty="0">
                 <a:latin typeface="Helvetica" panose="020B0604020202020204" pitchFamily="34" charset="0"/>
                 <a:ea typeface="Courier" charset="0"/>
                 <a:cs typeface="Helvetica" panose="020B0604020202020204" pitchFamily="34" charset="0"/>
               </a:rPr>
-              <a:t> </a:t>
-            </a:r>
-            <a:r>
-              <a:rPr lang="en-US" sz="3200" dirty="0">
-                <a:latin typeface="Helvetica" panose="020B0604020202020204" pitchFamily="34" charset="0"/>
-                <a:ea typeface="Courier" charset="0"/>
-                <a:cs typeface="Helvetica" panose="020B0604020202020204" pitchFamily="34" charset="0"/>
-              </a:rPr>
-              <a:t>is </a:t>
+              <a:t> is </a:t>
             </a:r>
             <a:r>
               <a:rPr lang="en-US" sz="3200" dirty="0">
@@ -7969,30 +7237,17 @@
               <a:t>false</a:t>
             </a:r>
             <a:r>
-              <a:rPr lang="en-US" sz="3200" dirty="0" smtClean="0">
+              <a:rPr lang="en-US" sz="3200" dirty="0">
                 <a:latin typeface="Helvetica" panose="020B0604020202020204" pitchFamily="34" charset="0"/>
                 <a:ea typeface="Courier" charset="0"/>
                 <a:cs typeface="Helvetica" panose="020B0604020202020204" pitchFamily="34" charset="0"/>
               </a:rPr>
-              <a:t> </a:t>
-            </a:r>
-            <a:r>
-              <a:rPr lang="en-US" sz="3200" dirty="0">
-                <a:latin typeface="Helvetica" panose="020B0604020202020204" pitchFamily="34" charset="0"/>
-                <a:ea typeface="Courier" charset="0"/>
-                <a:cs typeface="Helvetica" panose="020B0604020202020204" pitchFamily="34" charset="0"/>
-              </a:rPr>
-              <a:t>and </a:t>
-            </a:r>
-            <a:endParaRPr lang="en-US" sz="3200" dirty="0" smtClean="0">
-              <a:latin typeface="Helvetica" panose="020B0604020202020204" pitchFamily="34" charset="0"/>
-              <a:ea typeface="Courier" charset="0"/>
-              <a:cs typeface="Helvetica" panose="020B0604020202020204" pitchFamily="34" charset="0"/>
-            </a:endParaRPr>
-          </a:p>
-          <a:p>
-            <a:r>
-              <a:rPr lang="en-US" sz="3200" dirty="0" smtClean="0">
+              <a:t> and </a:t>
+            </a:r>
+          </a:p>
+          <a:p>
+            <a:r>
+              <a:rPr lang="en-US" sz="3200" dirty="0">
                 <a:solidFill>
                   <a:srgbClr val="FF0000"/>
                 </a:solidFill>
@@ -8003,23 +7258,15 @@
               <a:t>inverse</a:t>
             </a:r>
             <a:r>
-              <a:rPr lang="en-US" sz="3200" dirty="0" smtClean="0">
+              <a:rPr lang="en-US" sz="3200" dirty="0">
                 <a:latin typeface="Helvetica" panose="020B0604020202020204" pitchFamily="34" charset="0"/>
                 <a:ea typeface="Courier" charset="0"/>
                 <a:cs typeface="Helvetica" panose="020B0604020202020204" pitchFamily="34" charset="0"/>
               </a:rPr>
-              <a:t> </a:t>
-            </a:r>
-            <a:r>
-              <a:rPr lang="en-US" sz="3200" dirty="0">
-                <a:latin typeface="Helvetica" panose="020B0604020202020204" pitchFamily="34" charset="0"/>
-                <a:ea typeface="Courier" charset="0"/>
-                <a:cs typeface="Helvetica" panose="020B0604020202020204" pitchFamily="34" charset="0"/>
-              </a:rPr>
-              <a:t>is </a:t>
-            </a:r>
-            <a:r>
-              <a:rPr lang="en-US" sz="3200" dirty="0" smtClean="0">
+              <a:t> is </a:t>
+            </a:r>
+            <a:r>
+              <a:rPr lang="en-US" sz="3200" dirty="0">
                 <a:solidFill>
                   <a:srgbClr val="2E34FF"/>
                 </a:solidFill>
@@ -8030,18 +7277,13 @@
               <a:t>true</a:t>
             </a:r>
             <a:r>
-              <a:rPr lang="en-US" sz="3200" dirty="0" smtClean="0">
+              <a:rPr lang="en-US" sz="3200" dirty="0">
                 <a:latin typeface="Helvetica" charset="0"/>
                 <a:ea typeface="Helvetica" charset="0"/>
                 <a:cs typeface="Helvetica" charset="0"/>
               </a:rPr>
               <a:t> </a:t>
             </a:r>
-            <a:endParaRPr lang="en-US" sz="3200" dirty="0">
-              <a:latin typeface="Helvetica" charset="0"/>
-              <a:ea typeface="Helvetica" charset="0"/>
-              <a:cs typeface="Helvetica" charset="0"/>
-            </a:endParaRPr>
           </a:p>
           <a:p>
             <a:endParaRPr lang="en-US" sz="500" dirty="0">
@@ -8064,7 +7306,7 @@
           <p:cNvPr id="12" name="Picture 11">
             <a:extLst>
               <a:ext uri="{FF2B5EF4-FFF2-40B4-BE49-F238E27FC236}">
-                <a16:creationId xmlns="" xmlns:a16="http://schemas.microsoft.com/office/drawing/2014/main" id="{2D50A0F5-7160-4A62-90CC-11FD680298DD}"/>
+                <a16:creationId xmlns:a16="http://schemas.microsoft.com/office/drawing/2014/main" id="{2D50A0F5-7160-4A62-90CC-11FD680298DD}"/>
               </a:ext>
             </a:extLst>
           </p:cNvPr>
@@ -8100,7 +7342,7 @@
           <p:cNvPr id="15" name="Picture 14">
             <a:extLst>
               <a:ext uri="{FF2B5EF4-FFF2-40B4-BE49-F238E27FC236}">
-                <a16:creationId xmlns="" xmlns:a16="http://schemas.microsoft.com/office/drawing/2014/main" id="{F1917D98-D46F-4A6F-BD9F-EF8225222466}"/>
+                <a16:creationId xmlns:a16="http://schemas.microsoft.com/office/drawing/2014/main" id="{F1917D98-D46F-4A6F-BD9F-EF8225222466}"/>
               </a:ext>
             </a:extLst>
           </p:cNvPr>
@@ -8136,7 +7378,7 @@
           <p:cNvPr id="90" name="Rectangle 89">
             <a:extLst>
               <a:ext uri="{FF2B5EF4-FFF2-40B4-BE49-F238E27FC236}">
-                <a16:creationId xmlns="" xmlns:a16="http://schemas.microsoft.com/office/drawing/2014/main" id="{C5E5002A-D77A-41CC-A94F-FDCAC3484728}"/>
+                <a16:creationId xmlns:a16="http://schemas.microsoft.com/office/drawing/2014/main" id="{C5E5002A-D77A-41CC-A94F-FDCAC3484728}"/>
               </a:ext>
             </a:extLst>
           </p:cNvPr>
@@ -8159,7 +7401,7 @@
           <a:lstStyle/>
           <a:p>
             <a:r>
-              <a:rPr lang="en-US" sz="3200" b="1" dirty="0" smtClean="0">
+              <a:rPr lang="en-US" sz="3200" b="1" dirty="0">
                 <a:latin typeface="Helvetica" panose="020B0604020202020204" pitchFamily="34" charset="0"/>
                 <a:ea typeface="Helvetica" charset="0"/>
                 <a:cs typeface="Helvetica" panose="020B0604020202020204" pitchFamily="34" charset="0"/>
@@ -8167,28 +7409,12 @@
               <a:t>Upshot</a:t>
             </a:r>
             <a:r>
-              <a:rPr lang="en-US" sz="3200" dirty="0" smtClean="0">
+              <a:rPr lang="en-US" sz="3200" dirty="0">
                 <a:latin typeface="Helvetica" panose="020B0604020202020204" pitchFamily="34" charset="0"/>
                 <a:ea typeface="Helvetica" charset="0"/>
                 <a:cs typeface="Helvetica" panose="020B0604020202020204" pitchFamily="34" charset="0"/>
               </a:rPr>
-              <a:t>: Pragmatic </a:t>
-            </a:r>
-            <a:r>
-              <a:rPr lang="en-US" sz="3200" dirty="0">
-                <a:latin typeface="Helvetica" panose="020B0604020202020204" pitchFamily="34" charset="0"/>
-                <a:ea typeface="Helvetica" charset="0"/>
-                <a:cs typeface="Helvetica" panose="020B0604020202020204" pitchFamily="34" charset="0"/>
-              </a:rPr>
-              <a:t>factors </a:t>
-            </a:r>
-            <a:r>
-              <a:rPr lang="en-US" sz="3200" dirty="0" smtClean="0">
-                <a:latin typeface="Helvetica" panose="020B0604020202020204" pitchFamily="34" charset="0"/>
-                <a:ea typeface="Helvetica" charset="0"/>
-                <a:cs typeface="Helvetica" panose="020B0604020202020204" pitchFamily="34" charset="0"/>
-              </a:rPr>
-              <a:t>of </a:t>
+              <a:t>: Pragmatic factors of </a:t>
             </a:r>
             <a:r>
               <a:rPr lang="en-US" sz="3200" b="1" dirty="0">
@@ -8242,31 +7468,7 @@
                 <a:ea typeface="Helvetica" charset="0"/>
                 <a:cs typeface="Helvetica" panose="020B0604020202020204" pitchFamily="34" charset="0"/>
               </a:rPr>
-              <a:t>play a stronger role than </a:t>
-            </a:r>
-            <a:r>
-              <a:rPr lang="en-US" sz="3200" dirty="0" smtClean="0">
-                <a:latin typeface="Helvetica" panose="020B0604020202020204" pitchFamily="34" charset="0"/>
-                <a:ea typeface="Helvetica" charset="0"/>
-                <a:cs typeface="Helvetica" panose="020B0604020202020204" pitchFamily="34" charset="0"/>
-              </a:rPr>
-              <a:t>the </a:t>
-            </a:r>
-            <a:r>
-              <a:rPr lang="en-US" sz="3200" dirty="0">
-                <a:latin typeface="Helvetica" panose="020B0604020202020204" pitchFamily="34" charset="0"/>
-                <a:ea typeface="Helvetica" charset="0"/>
-                <a:cs typeface="Helvetica" panose="020B0604020202020204" pitchFamily="34" charset="0"/>
-              </a:rPr>
-              <a:t>grammatical factor </a:t>
-            </a:r>
-            <a:r>
-              <a:rPr lang="en-US" sz="3200" dirty="0" smtClean="0">
-                <a:latin typeface="Helvetica" panose="020B0604020202020204" pitchFamily="34" charset="0"/>
-                <a:ea typeface="Helvetica" charset="0"/>
-                <a:cs typeface="Helvetica" panose="020B0604020202020204" pitchFamily="34" charset="0"/>
-              </a:rPr>
-              <a:t>of </a:t>
+              <a:t>play a stronger role than the grammatical factor of </a:t>
             </a:r>
             <a:r>
               <a:rPr lang="en-US" sz="3200" b="1" dirty="0">
@@ -8285,23 +7487,7 @@
                 <a:ea typeface="Helvetica" charset="0"/>
                 <a:cs typeface="Helvetica" panose="020B0604020202020204" pitchFamily="34" charset="0"/>
               </a:rPr>
-              <a:t> </a:t>
-            </a:r>
-            <a:r>
-              <a:rPr lang="en-US" sz="3200" dirty="0" smtClean="0">
-                <a:latin typeface="Helvetica" panose="020B0604020202020204" pitchFamily="34" charset="0"/>
-                <a:ea typeface="Helvetica" charset="0"/>
-                <a:cs typeface="Helvetica" panose="020B0604020202020204" pitchFamily="34" charset="0"/>
-              </a:rPr>
-              <a:t>access when </a:t>
-            </a:r>
-            <a:r>
-              <a:rPr lang="en-US" sz="3200" dirty="0">
-                <a:latin typeface="Helvetica" panose="020B0604020202020204" pitchFamily="34" charset="0"/>
-                <a:ea typeface="Helvetica" charset="0"/>
-                <a:cs typeface="Helvetica" panose="020B0604020202020204" pitchFamily="34" charset="0"/>
-              </a:rPr>
-              <a:t>disambiguating </a:t>
+              <a:t> access when disambiguating </a:t>
             </a:r>
             <a:r>
               <a:rPr lang="en-US" sz="3200" dirty="0">
@@ -8327,7 +7513,7 @@
           <p:cNvPr id="93" name="TextBox 92">
             <a:extLst>
               <a:ext uri="{FF2B5EF4-FFF2-40B4-BE49-F238E27FC236}">
-                <a16:creationId xmlns="" xmlns:a16="http://schemas.microsoft.com/office/drawing/2014/main" id="{D15FAEA7-7BCB-480A-B1FC-E584B362FE49}"/>
+                <a16:creationId xmlns:a16="http://schemas.microsoft.com/office/drawing/2014/main" id="{D15FAEA7-7BCB-480A-B1FC-E584B362FE49}"/>
               </a:ext>
             </a:extLst>
           </p:cNvPr>
@@ -8372,18 +7558,10 @@
                 <a:ea typeface="Helvetica" charset="0"/>
                 <a:cs typeface="Helvetica" charset="0"/>
               </a:rPr>
-              <a:t>) </a:t>
-            </a:r>
-            <a:r>
-              <a:rPr lang="en-US" sz="3200" dirty="0" smtClean="0">
-                <a:latin typeface="Helvetica" charset="0"/>
-                <a:ea typeface="Helvetica" charset="0"/>
-                <a:cs typeface="Helvetica" charset="0"/>
-              </a:rPr>
-              <a:t>measures utterance </a:t>
-            </a:r>
-            <a:r>
-              <a:rPr lang="en-US" sz="3200" b="1" dirty="0" smtClean="0">
+              <a:t>) measures utterance </a:t>
+            </a:r>
+            <a:r>
+              <a:rPr lang="en-US" sz="3200" b="1" dirty="0">
                 <a:latin typeface="Helvetica" charset="0"/>
                 <a:ea typeface="Helvetica" charset="0"/>
                 <a:cs typeface="Helvetica" charset="0"/>
@@ -8391,7 +7569,7 @@
               <a:t>endorsement</a:t>
             </a:r>
             <a:r>
-              <a:rPr lang="en-US" sz="3200" dirty="0" smtClean="0">
+              <a:rPr lang="en-US" sz="3200" dirty="0">
                 <a:latin typeface="Helvetica" charset="0"/>
                 <a:ea typeface="Helvetica" charset="0"/>
                 <a:cs typeface="Helvetica" charset="0"/>
@@ -8411,7 +7589,7 @@
           <p:cNvPr id="95" name="TextBox 94">
             <a:extLst>
               <a:ext uri="{FF2B5EF4-FFF2-40B4-BE49-F238E27FC236}">
-                <a16:creationId xmlns="" xmlns:a16="http://schemas.microsoft.com/office/drawing/2014/main" id="{FC82A87E-0398-41AF-8E8A-7737BCA27A61}"/>
+                <a16:creationId xmlns:a16="http://schemas.microsoft.com/office/drawing/2014/main" id="{FC82A87E-0398-41AF-8E8A-7737BCA27A61}"/>
               </a:ext>
             </a:extLst>
           </p:cNvPr>
@@ -8446,31 +7624,8 @@
                 <a:ea typeface="Helvetica" charset="0"/>
                 <a:cs typeface="Helvetica" charset="0"/>
               </a:rPr>
-              <a:t>But adults sometimes behave like </a:t>
-            </a:r>
-            <a:r>
-              <a:rPr lang="en-US" sz="4200" b="1" dirty="0" smtClean="0">
-                <a:solidFill>
-                  <a:schemeClr val="accent1">
-                    <a:lumMod val="50000"/>
-                  </a:schemeClr>
-                </a:solidFill>
-                <a:latin typeface="Helvetica" charset="0"/>
-                <a:ea typeface="Helvetica" charset="0"/>
-                <a:cs typeface="Helvetica" charset="0"/>
-              </a:rPr>
-              <a:t>children, too..</a:t>
-            </a:r>
-            <a:endParaRPr lang="en-US" sz="4200" b="1" dirty="0">
-              <a:solidFill>
-                <a:schemeClr val="accent1">
-                  <a:lumMod val="50000"/>
-                </a:schemeClr>
-              </a:solidFill>
-              <a:latin typeface="Helvetica" charset="0"/>
-              <a:ea typeface="Helvetica" charset="0"/>
-              <a:cs typeface="Helvetica" charset="0"/>
-            </a:endParaRPr>
+              <a:t>But adults sometimes behave like children, too..</a:t>
+            </a:r>
           </a:p>
         </p:txBody>
       </p:sp>
@@ -8493,7 +7648,7 @@
             <p:cNvPr id="120" name="Picture 119">
               <a:extLst>
                 <a:ext uri="{FF2B5EF4-FFF2-40B4-BE49-F238E27FC236}">
-                  <a16:creationId xmlns="" xmlns:a16="http://schemas.microsoft.com/office/drawing/2014/main" id="{45909DFF-0F2B-47A8-84F7-223470E1741F}"/>
+                  <a16:creationId xmlns:a16="http://schemas.microsoft.com/office/drawing/2014/main" id="{45909DFF-0F2B-47A8-84F7-223470E1741F}"/>
                 </a:ext>
               </a:extLst>
             </p:cNvPr>
@@ -8523,7 +7678,7 @@
             <p:cNvPr id="102" name="Picture 101">
               <a:extLst>
                 <a:ext uri="{FF2B5EF4-FFF2-40B4-BE49-F238E27FC236}">
-                  <a16:creationId xmlns="" xmlns:a16="http://schemas.microsoft.com/office/drawing/2014/main" id="{9A9D56A7-0F69-4F6F-AF60-A13ABF896C75}"/>
+                  <a16:creationId xmlns:a16="http://schemas.microsoft.com/office/drawing/2014/main" id="{9A9D56A7-0F69-4F6F-AF60-A13ABF896C75}"/>
                 </a:ext>
               </a:extLst>
             </p:cNvPr>
@@ -8553,7 +7708,7 @@
             <p:cNvPr id="107" name="Picture 106">
               <a:extLst>
                 <a:ext uri="{FF2B5EF4-FFF2-40B4-BE49-F238E27FC236}">
-                  <a16:creationId xmlns="" xmlns:a16="http://schemas.microsoft.com/office/drawing/2014/main" id="{81B744A5-C864-4276-A19E-A093C1E2A518}"/>
+                  <a16:creationId xmlns:a16="http://schemas.microsoft.com/office/drawing/2014/main" id="{81B744A5-C864-4276-A19E-A093C1E2A518}"/>
                 </a:ext>
               </a:extLst>
             </p:cNvPr>
@@ -8583,7 +7738,7 @@
             <p:cNvPr id="108" name="Picture 107">
               <a:extLst>
                 <a:ext uri="{FF2B5EF4-FFF2-40B4-BE49-F238E27FC236}">
-                  <a16:creationId xmlns="" xmlns:a16="http://schemas.microsoft.com/office/drawing/2014/main" id="{3314CD18-1027-4B19-BE03-6C973E145C68}"/>
+                  <a16:creationId xmlns:a16="http://schemas.microsoft.com/office/drawing/2014/main" id="{3314CD18-1027-4B19-BE03-6C973E145C68}"/>
                 </a:ext>
               </a:extLst>
             </p:cNvPr>
@@ -8613,7 +7768,7 @@
             <p:cNvPr id="110" name="Picture 109">
               <a:extLst>
                 <a:ext uri="{FF2B5EF4-FFF2-40B4-BE49-F238E27FC236}">
-                  <a16:creationId xmlns="" xmlns:a16="http://schemas.microsoft.com/office/drawing/2014/main" id="{B1980238-2086-4004-8AFC-EE824AEA74C8}"/>
+                  <a16:creationId xmlns:a16="http://schemas.microsoft.com/office/drawing/2014/main" id="{B1980238-2086-4004-8AFC-EE824AEA74C8}"/>
                 </a:ext>
               </a:extLst>
             </p:cNvPr>
@@ -8643,7 +7798,7 @@
             <p:cNvPr id="117" name="Picture 116">
               <a:extLst>
                 <a:ext uri="{FF2B5EF4-FFF2-40B4-BE49-F238E27FC236}">
-                  <a16:creationId xmlns="" xmlns:a16="http://schemas.microsoft.com/office/drawing/2014/main" id="{4CBDC05C-07E1-429B-A1C6-DB21A3783D00}"/>
+                  <a16:creationId xmlns:a16="http://schemas.microsoft.com/office/drawing/2014/main" id="{4CBDC05C-07E1-429B-A1C6-DB21A3783D00}"/>
                 </a:ext>
               </a:extLst>
             </p:cNvPr>
@@ -8673,7 +7828,7 @@
             <p:cNvPr id="122" name="Picture 121">
               <a:extLst>
                 <a:ext uri="{FF2B5EF4-FFF2-40B4-BE49-F238E27FC236}">
-                  <a16:creationId xmlns="" xmlns:a16="http://schemas.microsoft.com/office/drawing/2014/main" id="{63B33A4E-F27D-4D33-8817-A17BD497C8EE}"/>
+                  <a16:creationId xmlns:a16="http://schemas.microsoft.com/office/drawing/2014/main" id="{63B33A4E-F27D-4D33-8817-A17BD497C8EE}"/>
                 </a:ext>
               </a:extLst>
             </p:cNvPr>
@@ -8703,7 +7858,7 @@
             <p:cNvPr id="125" name="TextBox 124">
               <a:extLst>
                 <a:ext uri="{FF2B5EF4-FFF2-40B4-BE49-F238E27FC236}">
-                  <a16:creationId xmlns="" xmlns:a16="http://schemas.microsoft.com/office/drawing/2014/main" id="{1F68845D-524C-4BD2-A86E-6ED3D20E3FD4}"/>
+                  <a16:creationId xmlns:a16="http://schemas.microsoft.com/office/drawing/2014/main" id="{1F68845D-524C-4BD2-A86E-6ED3D20E3FD4}"/>
                 </a:ext>
               </a:extLst>
             </p:cNvPr>
@@ -8727,7 +7882,7 @@
             <a:lstStyle/>
             <a:p>
               <a:r>
-                <a:rPr lang="en-US" sz="3200" b="1" dirty="0" smtClean="0">
+                <a:rPr lang="en-US" sz="3200" b="1" dirty="0">
                   <a:latin typeface="Helvetica" charset="0"/>
                   <a:ea typeface="Helvetica" charset="0"/>
                   <a:cs typeface="Helvetica" charset="0"/>
@@ -8735,7 +7890,7 @@
                 <a:t>2-of-4</a:t>
               </a:r>
               <a:r>
-                <a:rPr lang="en-US" sz="3200" dirty="0" smtClean="0">
+                <a:rPr lang="en-US" sz="3200" dirty="0">
                   <a:latin typeface="Helvetica" charset="0"/>
                   <a:ea typeface="Helvetica" charset="0"/>
                   <a:cs typeface="Helvetica" charset="0"/>
@@ -8745,7 +7900,7 @@
             </a:p>
             <a:p>
               <a:r>
-                <a:rPr lang="en-US" sz="3200" dirty="0" smtClean="0">
+                <a:rPr lang="en-US" sz="3200" dirty="0">
                   <a:solidFill>
                     <a:srgbClr val="00B150"/>
                   </a:solidFill>
@@ -8756,20 +7911,12 @@
                 <a:t>surface</a:t>
               </a:r>
               <a:r>
-                <a:rPr lang="en-US" sz="3200" dirty="0" smtClean="0">
-                  <a:latin typeface="Helvetica" charset="0"/>
-                  <a:ea typeface="Helvetica" charset="0"/>
-                  <a:cs typeface="Helvetica" charset="0"/>
-                </a:rPr>
-                <a:t> </a:t>
-              </a:r>
-              <a:r>
                 <a:rPr lang="en-US" sz="3200" dirty="0">
                   <a:latin typeface="Helvetica" charset="0"/>
                   <a:ea typeface="Helvetica" charset="0"/>
                   <a:cs typeface="Helvetica" charset="0"/>
                 </a:rPr>
-                <a:t>is </a:t>
+                <a:t> is </a:t>
               </a:r>
               <a:r>
                 <a:rPr lang="en-US" sz="3200" dirty="0">
@@ -8790,15 +7937,10 @@
                 </a:rPr>
                 <a:t> and </a:t>
               </a:r>
-              <a:endParaRPr lang="en-US" sz="3200" dirty="0" smtClean="0">
-                <a:latin typeface="Helvetica" charset="0"/>
-                <a:ea typeface="Helvetica" charset="0"/>
-                <a:cs typeface="Helvetica" charset="0"/>
-              </a:endParaRPr>
             </a:p>
             <a:p>
               <a:r>
-                <a:rPr lang="en-US" sz="3200" dirty="0" smtClean="0">
+                <a:rPr lang="en-US" sz="3200" dirty="0">
                   <a:solidFill>
                     <a:srgbClr val="FF0000"/>
                   </a:solidFill>
@@ -8809,20 +7951,12 @@
                 <a:t>inverse</a:t>
               </a:r>
               <a:r>
-                <a:rPr lang="en-US" sz="3200" dirty="0" smtClean="0">
-                  <a:latin typeface="Helvetica" charset="0"/>
-                  <a:ea typeface="Helvetica" charset="0"/>
-                  <a:cs typeface="Helvetica" charset="0"/>
-                </a:rPr>
-                <a:t> </a:t>
-              </a:r>
-              <a:r>
                 <a:rPr lang="en-US" sz="3200" dirty="0">
                   <a:latin typeface="Helvetica" charset="0"/>
                   <a:ea typeface="Helvetica" charset="0"/>
                   <a:cs typeface="Helvetica" charset="0"/>
                 </a:rPr>
-                <a:t>is </a:t>
+                <a:t> is </a:t>
               </a:r>
               <a:r>
                 <a:rPr lang="en-US" sz="3200" dirty="0">
@@ -8852,7 +7986,7 @@
           <p:cNvPr id="96" name="Picture 95">
             <a:extLst>
               <a:ext uri="{FF2B5EF4-FFF2-40B4-BE49-F238E27FC236}">
-                <a16:creationId xmlns="" xmlns:a16="http://schemas.microsoft.com/office/drawing/2014/main" id="{A6A82181-BA23-4000-AFF8-5BACBBD4E665}"/>
+                <a16:creationId xmlns:a16="http://schemas.microsoft.com/office/drawing/2014/main" id="{A6A82181-BA23-4000-AFF8-5BACBBD4E665}"/>
               </a:ext>
             </a:extLst>
           </p:cNvPr>
@@ -8882,7 +8016,7 @@
           <p:cNvPr id="97" name="Picture 96">
             <a:extLst>
               <a:ext uri="{FF2B5EF4-FFF2-40B4-BE49-F238E27FC236}">
-                <a16:creationId xmlns="" xmlns:a16="http://schemas.microsoft.com/office/drawing/2014/main" id="{4B4BF239-E50E-4A30-A707-D52EE4BDCA56}"/>
+                <a16:creationId xmlns:a16="http://schemas.microsoft.com/office/drawing/2014/main" id="{4B4BF239-E50E-4A30-A707-D52EE4BDCA56}"/>
               </a:ext>
             </a:extLst>
           </p:cNvPr>
@@ -8912,7 +8046,7 @@
           <p:cNvPr id="98" name="Picture 97">
             <a:extLst>
               <a:ext uri="{FF2B5EF4-FFF2-40B4-BE49-F238E27FC236}">
-                <a16:creationId xmlns="" xmlns:a16="http://schemas.microsoft.com/office/drawing/2014/main" id="{BB737A67-FCB1-41FF-AE8B-78E965EEC250}"/>
+                <a16:creationId xmlns:a16="http://schemas.microsoft.com/office/drawing/2014/main" id="{BB737A67-FCB1-41FF-AE8B-78E965EEC250}"/>
               </a:ext>
             </a:extLst>
           </p:cNvPr>
@@ -8942,7 +8076,7 @@
           <p:cNvPr id="100" name="Picture 99">
             <a:extLst>
               <a:ext uri="{FF2B5EF4-FFF2-40B4-BE49-F238E27FC236}">
-                <a16:creationId xmlns="" xmlns:a16="http://schemas.microsoft.com/office/drawing/2014/main" id="{626F1E55-B4C2-4AE8-9EFC-1C3DAD2CAF57}"/>
+                <a16:creationId xmlns:a16="http://schemas.microsoft.com/office/drawing/2014/main" id="{626F1E55-B4C2-4AE8-9EFC-1C3DAD2CAF57}"/>
               </a:ext>
             </a:extLst>
           </p:cNvPr>
@@ -8972,7 +8106,7 @@
           <p:cNvPr id="101" name="Picture 100">
             <a:extLst>
               <a:ext uri="{FF2B5EF4-FFF2-40B4-BE49-F238E27FC236}">
-                <a16:creationId xmlns="" xmlns:a16="http://schemas.microsoft.com/office/drawing/2014/main" id="{56C90813-5900-44B7-BC9D-76B11381C6D7}"/>
+                <a16:creationId xmlns:a16="http://schemas.microsoft.com/office/drawing/2014/main" id="{56C90813-5900-44B7-BC9D-76B11381C6D7}"/>
               </a:ext>
             </a:extLst>
           </p:cNvPr>
@@ -9002,7 +8136,7 @@
           <p:cNvPr id="139" name="TextBox 138">
             <a:extLst>
               <a:ext uri="{FF2B5EF4-FFF2-40B4-BE49-F238E27FC236}">
-                <a16:creationId xmlns="" xmlns:a16="http://schemas.microsoft.com/office/drawing/2014/main" id="{5F066279-2386-4311-AC66-B7817477E824}"/>
+                <a16:creationId xmlns:a16="http://schemas.microsoft.com/office/drawing/2014/main" id="{5F066279-2386-4311-AC66-B7817477E824}"/>
               </a:ext>
             </a:extLst>
           </p:cNvPr>
@@ -9026,7 +8160,7 @@
           <a:lstStyle/>
           <a:p>
             <a:r>
-              <a:rPr lang="en-US" sz="3200" b="1" dirty="0" smtClean="0">
+              <a:rPr lang="en-US" sz="3200" b="1" dirty="0">
                 <a:latin typeface="Helvetica" charset="0"/>
                 <a:ea typeface="Helvetica" charset="0"/>
                 <a:cs typeface="Helvetica" charset="0"/>
@@ -9034,7 +8168,7 @@
               <a:t>1-of-2</a:t>
             </a:r>
             <a:r>
-              <a:rPr lang="en-US" sz="3200" dirty="0" smtClean="0">
+              <a:rPr lang="en-US" sz="3200" dirty="0">
                 <a:latin typeface="Helvetica" charset="0"/>
                 <a:ea typeface="Helvetica" charset="0"/>
                 <a:cs typeface="Helvetica" charset="0"/>
@@ -9044,7 +8178,7 @@
           </a:p>
           <a:p>
             <a:r>
-              <a:rPr lang="en-US" sz="3200" dirty="0" smtClean="0">
+              <a:rPr lang="en-US" sz="3200" dirty="0">
                 <a:solidFill>
                   <a:srgbClr val="00B150"/>
                 </a:solidFill>
@@ -9055,20 +8189,12 @@
               <a:t>surface</a:t>
             </a:r>
             <a:r>
-              <a:rPr lang="en-US" sz="3200" dirty="0" smtClean="0">
-                <a:latin typeface="Helvetica" charset="0"/>
-                <a:ea typeface="Helvetica" charset="0"/>
-                <a:cs typeface="Helvetica" charset="0"/>
-              </a:rPr>
-              <a:t> </a:t>
-            </a:r>
-            <a:r>
-              <a:rPr lang="en-US" sz="3200" dirty="0">
-                <a:latin typeface="Helvetica" charset="0"/>
-                <a:ea typeface="Helvetica" charset="0"/>
-                <a:cs typeface="Helvetica" charset="0"/>
-              </a:rPr>
-              <a:t>is </a:t>
+              <a:rPr lang="en-US" sz="3200" dirty="0">
+                <a:latin typeface="Helvetica" charset="0"/>
+                <a:ea typeface="Helvetica" charset="0"/>
+                <a:cs typeface="Helvetica" charset="0"/>
+              </a:rPr>
+              <a:t> is </a:t>
             </a:r>
             <a:r>
               <a:rPr lang="en-US" sz="3200" dirty="0">
@@ -9089,15 +8215,10 @@
               </a:rPr>
               <a:t> and </a:t>
             </a:r>
-            <a:endParaRPr lang="en-US" sz="3200" dirty="0" smtClean="0">
-              <a:latin typeface="Helvetica" charset="0"/>
-              <a:ea typeface="Helvetica" charset="0"/>
-              <a:cs typeface="Helvetica" charset="0"/>
-            </a:endParaRPr>
-          </a:p>
-          <a:p>
-            <a:r>
-              <a:rPr lang="en-US" sz="3200" dirty="0" smtClean="0">
+          </a:p>
+          <a:p>
+            <a:r>
+              <a:rPr lang="en-US" sz="3200" dirty="0">
                 <a:solidFill>
                   <a:srgbClr val="FF0000"/>
                 </a:solidFill>
@@ -9108,20 +8229,12 @@
               <a:t>inverse</a:t>
             </a:r>
             <a:r>
-              <a:rPr lang="en-US" sz="3200" dirty="0" smtClean="0">
-                <a:latin typeface="Helvetica" charset="0"/>
-                <a:ea typeface="Helvetica" charset="0"/>
-                <a:cs typeface="Helvetica" charset="0"/>
-              </a:rPr>
-              <a:t> </a:t>
-            </a:r>
-            <a:r>
-              <a:rPr lang="en-US" sz="3200" dirty="0">
-                <a:latin typeface="Helvetica" charset="0"/>
-                <a:ea typeface="Helvetica" charset="0"/>
-                <a:cs typeface="Helvetica" charset="0"/>
-              </a:rPr>
-              <a:t>is </a:t>
+              <a:rPr lang="en-US" sz="3200" dirty="0">
+                <a:latin typeface="Helvetica" charset="0"/>
+                <a:ea typeface="Helvetica" charset="0"/>
+                <a:cs typeface="Helvetica" charset="0"/>
+              </a:rPr>
+              <a:t> is </a:t>
             </a:r>
             <a:r>
               <a:rPr lang="en-US" sz="3200" dirty="0">
@@ -9150,7 +8263,7 @@
           <p:cNvPr id="141" name="Picture 140">
             <a:extLst>
               <a:ext uri="{FF2B5EF4-FFF2-40B4-BE49-F238E27FC236}">
-                <a16:creationId xmlns="" xmlns:a16="http://schemas.microsoft.com/office/drawing/2014/main" id="{3D08E1A0-E944-4A91-94A0-2D5F3E0AF586}"/>
+                <a16:creationId xmlns:a16="http://schemas.microsoft.com/office/drawing/2014/main" id="{3D08E1A0-E944-4A91-94A0-2D5F3E0AF586}"/>
               </a:ext>
             </a:extLst>
           </p:cNvPr>
@@ -9186,7 +8299,7 @@
           <p:cNvPr id="142" name="Picture 141">
             <a:extLst>
               <a:ext uri="{FF2B5EF4-FFF2-40B4-BE49-F238E27FC236}">
-                <a16:creationId xmlns="" xmlns:a16="http://schemas.microsoft.com/office/drawing/2014/main" id="{C0D67976-BA3A-42DC-8EE1-3F38B512561D}"/>
+                <a16:creationId xmlns:a16="http://schemas.microsoft.com/office/drawing/2014/main" id="{C0D67976-BA3A-42DC-8EE1-3F38B512561D}"/>
               </a:ext>
             </a:extLst>
           </p:cNvPr>
@@ -9222,7 +8335,7 @@
           <p:cNvPr id="146" name="TextBox 145">
             <a:extLst>
               <a:ext uri="{FF2B5EF4-FFF2-40B4-BE49-F238E27FC236}">
-                <a16:creationId xmlns="" xmlns:a16="http://schemas.microsoft.com/office/drawing/2014/main" id="{941ACA53-4D30-41B1-8DC5-BE7BFA228A90}"/>
+                <a16:creationId xmlns:a16="http://schemas.microsoft.com/office/drawing/2014/main" id="{941ACA53-4D30-41B1-8DC5-BE7BFA228A90}"/>
               </a:ext>
             </a:extLst>
           </p:cNvPr>
@@ -9257,44 +8370,8 @@
                 <a:ea typeface="Helvetica" charset="0"/>
                 <a:cs typeface="Helvetica" charset="0"/>
               </a:rPr>
-              <a:t>Open </a:t>
-            </a:r>
-            <a:r>
-              <a:rPr lang="en-US" sz="4200" b="1" dirty="0">
-                <a:solidFill>
-                  <a:schemeClr val="accent1">
-                    <a:lumMod val="50000"/>
-                  </a:schemeClr>
-                </a:solidFill>
-                <a:latin typeface="Helvetica" charset="0"/>
-                <a:ea typeface="Helvetica" charset="0"/>
-                <a:cs typeface="Helvetica" charset="0"/>
-              </a:rPr>
-              <a:t>q</a:t>
-            </a:r>
-            <a:r>
-              <a:rPr lang="en-US" sz="4200" b="1" dirty="0" smtClean="0">
-                <a:solidFill>
-                  <a:schemeClr val="accent1">
-                    <a:lumMod val="50000"/>
-                  </a:schemeClr>
-                </a:solidFill>
-                <a:latin typeface="Helvetica" charset="0"/>
-                <a:ea typeface="Helvetica" charset="0"/>
-                <a:cs typeface="Helvetica" charset="0"/>
-              </a:rPr>
-              <a:t>uestion</a:t>
-            </a:r>
-            <a:endParaRPr lang="en-US" sz="4200" b="1" dirty="0">
-              <a:solidFill>
-                <a:schemeClr val="accent1">
-                  <a:lumMod val="50000"/>
-                </a:schemeClr>
-              </a:solidFill>
-              <a:latin typeface="Helvetica" charset="0"/>
-              <a:ea typeface="Helvetica" charset="0"/>
-              <a:cs typeface="Helvetica" charset="0"/>
-            </a:endParaRPr>
+              <a:t>Open question</a:t>
+            </a:r>
           </a:p>
         </p:txBody>
       </p:sp>
@@ -9303,7 +8380,7 @@
           <p:cNvPr id="147" name="TextBox 146">
             <a:extLst>
               <a:ext uri="{FF2B5EF4-FFF2-40B4-BE49-F238E27FC236}">
-                <a16:creationId xmlns="" xmlns:a16="http://schemas.microsoft.com/office/drawing/2014/main" id="{8F2D2328-C151-4229-93B3-99683B48B33B}"/>
+                <a16:creationId xmlns:a16="http://schemas.microsoft.com/office/drawing/2014/main" id="{8F2D2328-C151-4229-93B3-99683B48B33B}"/>
               </a:ext>
             </a:extLst>
           </p:cNvPr>
@@ -9331,7 +8408,7 @@
               <a:buChar char="v"/>
             </a:pPr>
             <a:r>
-              <a:rPr lang="en-US" sz="3200" b="1" dirty="0" smtClean="0">
+              <a:rPr lang="en-US" sz="3200" b="1" dirty="0">
                 <a:latin typeface="Helvetica" panose="020B0604020202020204" pitchFamily="34" charset="0"/>
                 <a:ea typeface="Courier" charset="0"/>
                 <a:cs typeface="Helvetica" panose="020B0604020202020204" pitchFamily="34" charset="0"/>
@@ -9339,28 +8416,12 @@
               <a:t>Developmental continuity</a:t>
             </a:r>
             <a:r>
-              <a:rPr lang="en-US" sz="3200" dirty="0" smtClean="0">
+              <a:rPr lang="en-US" sz="3200" dirty="0">
                 <a:latin typeface="Helvetica" panose="020B0604020202020204" pitchFamily="34" charset="0"/>
                 <a:ea typeface="Courier" charset="0"/>
                 <a:cs typeface="Helvetica" panose="020B0604020202020204" pitchFamily="34" charset="0"/>
               </a:rPr>
-              <a:t>: Are child and adult ambiguity </a:t>
-            </a:r>
-            <a:r>
-              <a:rPr lang="en-US" sz="3200" dirty="0" smtClean="0">
-                <a:latin typeface="Helvetica" panose="020B0604020202020204" pitchFamily="34" charset="0"/>
-                <a:ea typeface="Courier" charset="0"/>
-                <a:cs typeface="Helvetica" panose="020B0604020202020204" pitchFamily="34" charset="0"/>
-              </a:rPr>
-              <a:t>resolution behavior qualitatively </a:t>
-            </a:r>
-            <a:r>
-              <a:rPr lang="en-US" sz="3200" dirty="0" smtClean="0">
-                <a:latin typeface="Helvetica" panose="020B0604020202020204" pitchFamily="34" charset="0"/>
-                <a:ea typeface="Courier" charset="0"/>
-                <a:cs typeface="Helvetica" panose="020B0604020202020204" pitchFamily="34" charset="0"/>
-              </a:rPr>
-              <a:t>similar? (= same underlying mechanisms)</a:t>
+              <a:t>: Are child and adult ambiguity resolution behavior qualitatively similar? (= same underlying mechanisms)</a:t>
             </a:r>
           </a:p>
           <a:p>
@@ -9368,7 +8429,7 @@
               <a:buFont typeface="Wingdings" charset="2"/>
               <a:buChar char="v"/>
             </a:pPr>
-            <a:endParaRPr lang="en-US" sz="1000" dirty="0" smtClean="0">
+            <a:endParaRPr lang="en-US" sz="1000" dirty="0">
               <a:solidFill>
                 <a:srgbClr val="FF7A00"/>
               </a:solidFill>
@@ -9383,7 +8444,7 @@
               <a:buChar char="v"/>
             </a:pPr>
             <a:r>
-              <a:rPr lang="en-US" sz="3200" dirty="0" smtClean="0">
+              <a:rPr lang="en-US" sz="3200" dirty="0">
                 <a:solidFill>
                   <a:srgbClr val="FF7A00"/>
                 </a:solidFill>
@@ -9391,18 +8452,7 @@
                 <a:ea typeface="Courier" charset="0"/>
                 <a:cs typeface="Helvetica" panose="020B0604020202020204" pitchFamily="34" charset="0"/>
               </a:rPr>
-              <a:t>Why </a:t>
-            </a:r>
-            <a:r>
-              <a:rPr lang="en-US" sz="3200" dirty="0">
-                <a:solidFill>
-                  <a:srgbClr val="FF7A00"/>
-                </a:solidFill>
-                <a:latin typeface="Helvetica" panose="020B0604020202020204" pitchFamily="34" charset="0"/>
-                <a:ea typeface="Courier" charset="0"/>
-                <a:cs typeface="Helvetica" panose="020B0604020202020204" pitchFamily="34" charset="0"/>
-              </a:rPr>
-              <a:t>does the explicit contrast clause work</a:t>
+              <a:t>Why does the explicit contrast clause work</a:t>
             </a:r>
             <a:r>
               <a:rPr lang="en-US" sz="3200" dirty="0">
@@ -9432,7 +8482,7 @@
               <a:t>two-not</a:t>
             </a:r>
             <a:r>
-              <a:rPr lang="en-US" sz="3200" dirty="0" smtClean="0">
+              <a:rPr lang="en-US" sz="3200" dirty="0">
                 <a:latin typeface="Helvetica" panose="020B0604020202020204" pitchFamily="34" charset="0"/>
                 <a:ea typeface="Courier" charset="0"/>
                 <a:cs typeface="Helvetica" panose="020B0604020202020204" pitchFamily="34" charset="0"/>
@@ -9445,7 +8495,7 @@
               <a:buFont typeface="Wingdings" charset="2"/>
               <a:buChar char="v"/>
             </a:pPr>
-            <a:endParaRPr lang="en-US" sz="1000" dirty="0" smtClean="0">
+            <a:endParaRPr lang="en-US" sz="1000" dirty="0">
               <a:solidFill>
                 <a:schemeClr val="accent6"/>
               </a:solidFill>
@@ -9460,7 +8510,7 @@
               <a:buChar char="v"/>
             </a:pPr>
             <a:r>
-              <a:rPr lang="en-US" sz="3200" dirty="0" smtClean="0">
+              <a:rPr lang="en-US" sz="3200" dirty="0">
                 <a:solidFill>
                   <a:schemeClr val="accent6"/>
                 </a:solidFill>
@@ -9468,32 +8518,16 @@
                 <a:ea typeface="Courier" charset="0"/>
                 <a:cs typeface="Helvetica" panose="020B0604020202020204" pitchFamily="34" charset="0"/>
               </a:rPr>
-              <a:t>What </a:t>
-            </a:r>
-            <a:r>
-              <a:rPr lang="en-US" sz="3200" dirty="0">
-                <a:solidFill>
-                  <a:schemeClr val="accent6"/>
-                </a:solidFill>
+              <a:t>What causes the asymmetry </a:t>
+            </a:r>
+            <a:r>
+              <a:rPr lang="en-US" sz="3200" dirty="0">
                 <a:latin typeface="Helvetica" panose="020B0604020202020204" pitchFamily="34" charset="0"/>
                 <a:ea typeface="Courier" charset="0"/>
                 <a:cs typeface="Helvetica" panose="020B0604020202020204" pitchFamily="34" charset="0"/>
               </a:rPr>
-              <a:t>causes the asymmetry </a:t>
-            </a:r>
-            <a:r>
-              <a:rPr lang="en-US" sz="3200" dirty="0">
-                <a:latin typeface="Helvetica" panose="020B0604020202020204" pitchFamily="34" charset="0"/>
-                <a:ea typeface="Courier" charset="0"/>
-                <a:cs typeface="Helvetica" panose="020B0604020202020204" pitchFamily="34" charset="0"/>
-              </a:rPr>
               <a:t>in adult behavior across the two contexts? </a:t>
             </a:r>
-            <a:endParaRPr lang="en-US" sz="3200" dirty="0" smtClean="0">
-              <a:latin typeface="Helvetica" panose="020B0604020202020204" pitchFamily="34" charset="0"/>
-              <a:ea typeface="Courier" charset="0"/>
-              <a:cs typeface="Helvetica" panose="020B0604020202020204" pitchFamily="34" charset="0"/>
-            </a:endParaRPr>
           </a:p>
         </p:txBody>
       </p:sp>
@@ -9502,7 +8536,7 @@
           <p:cNvPr id="148" name="TextBox 147">
             <a:extLst>
               <a:ext uri="{FF2B5EF4-FFF2-40B4-BE49-F238E27FC236}">
-                <a16:creationId xmlns="" xmlns:a16="http://schemas.microsoft.com/office/drawing/2014/main" id="{B3B34038-9853-4593-A8AA-B454BADC5ABD}"/>
+                <a16:creationId xmlns:a16="http://schemas.microsoft.com/office/drawing/2014/main" id="{B3B34038-9853-4593-A8AA-B454BADC5ABD}"/>
               </a:ext>
             </a:extLst>
           </p:cNvPr>
@@ -9543,25 +8577,15 @@
                 <a:ea typeface="Courier" charset="0"/>
                 <a:cs typeface="Helvetica" panose="020B0604020202020204" pitchFamily="34" charset="0"/>
               </a:rPr>
-              <a:t> model from Savinelli et. al. (2017</a:t>
-            </a:r>
-            <a:r>
-              <a:rPr lang="en-US" sz="3200" dirty="0" smtClean="0">
-                <a:latin typeface="Helvetica" panose="020B0604020202020204" pitchFamily="34" charset="0"/>
-                <a:ea typeface="Courier" charset="0"/>
-                <a:cs typeface="Helvetica" panose="020B0604020202020204" pitchFamily="34" charset="0"/>
-              </a:rPr>
-              <a:t>) to capture adult ambiguity resolution behavior in context.</a:t>
-            </a:r>
-            <a:r>
-              <a:rPr lang="en-US" sz="3200" dirty="0">
-                <a:latin typeface="Helvetica" panose="020B0604020202020204" pitchFamily="34" charset="0"/>
-                <a:ea typeface="Courier" charset="0"/>
-                <a:cs typeface="Helvetica" panose="020B0604020202020204" pitchFamily="34" charset="0"/>
-              </a:rPr>
-              <a:t> </a:t>
-            </a:r>
-            <a:endParaRPr lang="en-US" sz="3200" dirty="0" smtClean="0">
+              <a:t> model from Savinelli et. al. (2017) to capture adult ambiguity resolution behavior in context. </a:t>
+            </a:r>
+          </a:p>
+          <a:p>
+            <a:pPr marL="457200" indent="-457200">
+              <a:buFont typeface="Wingdings" charset="2"/>
+              <a:buChar char="v"/>
+            </a:pPr>
+            <a:endParaRPr lang="en-US" sz="1000" dirty="0">
               <a:latin typeface="Helvetica" panose="020B0604020202020204" pitchFamily="34" charset="0"/>
               <a:ea typeface="Courier" charset="0"/>
               <a:cs typeface="Helvetica" panose="020B0604020202020204" pitchFamily="34" charset="0"/>
@@ -9572,32 +8596,13 @@
               <a:buFont typeface="Wingdings" charset="2"/>
               <a:buChar char="v"/>
             </a:pPr>
-            <a:endParaRPr lang="en-US" sz="1000" dirty="0" smtClean="0">
-              <a:latin typeface="Helvetica" panose="020B0604020202020204" pitchFamily="34" charset="0"/>
-              <a:ea typeface="Courier" charset="0"/>
-              <a:cs typeface="Helvetica" panose="020B0604020202020204" pitchFamily="34" charset="0"/>
-            </a:endParaRPr>
-          </a:p>
-          <a:p>
-            <a:pPr marL="457200" indent="-457200">
-              <a:buFont typeface="Wingdings" charset="2"/>
-              <a:buChar char="v"/>
-            </a:pPr>
-            <a:r>
-              <a:rPr lang="en-US" sz="3200" dirty="0" smtClean="0">
+            <a:r>
+              <a:rPr lang="en-US" sz="3200" dirty="0">
                 <a:latin typeface="Helvetica" panose="020B0604020202020204" pitchFamily="34" charset="0"/>
                 <a:ea typeface="Courier" charset="0"/>
                 <a:cs typeface="Helvetica" panose="020B0604020202020204" pitchFamily="34" charset="0"/>
               </a:rPr>
-              <a:t>We support developmental continuity if </a:t>
-            </a:r>
-            <a:r>
-              <a:rPr lang="en-US" sz="3200" dirty="0">
-                <a:latin typeface="Helvetica" panose="020B0604020202020204" pitchFamily="34" charset="0"/>
-                <a:ea typeface="Courier" charset="0"/>
-                <a:cs typeface="Helvetica" panose="020B0604020202020204" pitchFamily="34" charset="0"/>
-              </a:rPr>
-              <a:t>the </a:t>
+              <a:t>We support developmental continuity if the </a:t>
             </a:r>
             <a:r>
               <a:rPr lang="en-US" sz="3200" b="1" dirty="0">
@@ -9613,58 +8618,26 @@
                 <a:ea typeface="Courier" charset="0"/>
                 <a:cs typeface="Helvetica" panose="020B0604020202020204" pitchFamily="34" charset="0"/>
               </a:rPr>
-              <a:t> can account for children’s behavior </a:t>
-            </a:r>
-            <a:r>
-              <a:rPr lang="en-US" sz="3200" dirty="0" smtClean="0">
+              <a:t> can account for children’s behavior with </a:t>
+            </a:r>
+            <a:r>
+              <a:rPr lang="en-US" sz="3200" dirty="0">
+                <a:latin typeface="Courier" charset="0"/>
+                <a:ea typeface="Courier" charset="0"/>
+                <a:cs typeface="Courier" charset="0"/>
+              </a:rPr>
+              <a:t>every-not</a:t>
+            </a:r>
+            <a:r>
+              <a:rPr lang="en-US" sz="3200" dirty="0">
                 <a:latin typeface="Helvetica" panose="020B0604020202020204" pitchFamily="34" charset="0"/>
                 <a:ea typeface="Courier" charset="0"/>
                 <a:cs typeface="Helvetica" panose="020B0604020202020204" pitchFamily="34" charset="0"/>
               </a:rPr>
-              <a:t>with</a:t>
-            </a:r>
-            <a:r>
-              <a:rPr lang="en-US" sz="3200" dirty="0" smtClean="0">
-                <a:latin typeface="Helvetica" panose="020B0604020202020204" pitchFamily="34" charset="0"/>
-                <a:ea typeface="Courier" charset="0"/>
-                <a:cs typeface="Helvetica" panose="020B0604020202020204" pitchFamily="34" charset="0"/>
-              </a:rPr>
-              <a:t> </a:t>
-            </a:r>
-            <a:r>
-              <a:rPr lang="en-US" sz="3200" dirty="0">
-                <a:latin typeface="Courier" charset="0"/>
-                <a:ea typeface="Courier" charset="0"/>
-                <a:cs typeface="Courier" charset="0"/>
-              </a:rPr>
-              <a:t>every-not</a:t>
-            </a:r>
-            <a:r>
-              <a:rPr lang="en-US" sz="3200" dirty="0">
-                <a:latin typeface="Helvetica" panose="020B0604020202020204" pitchFamily="34" charset="0"/>
-                <a:ea typeface="Courier" charset="0"/>
-                <a:cs typeface="Helvetica" panose="020B0604020202020204" pitchFamily="34" charset="0"/>
-              </a:rPr>
-              <a:t> and adult behavior </a:t>
-            </a:r>
-            <a:r>
-              <a:rPr lang="en-US" sz="3200" dirty="0" smtClean="0">
-                <a:latin typeface="Helvetica" panose="020B0604020202020204" pitchFamily="34" charset="0"/>
-                <a:ea typeface="Courier" charset="0"/>
-                <a:cs typeface="Helvetica" panose="020B0604020202020204" pitchFamily="34" charset="0"/>
-              </a:rPr>
-              <a:t>with</a:t>
-            </a:r>
-            <a:r>
-              <a:rPr lang="en-US" sz="3200" dirty="0" smtClean="0">
-                <a:latin typeface="Helvetica" panose="020B0604020202020204" pitchFamily="34" charset="0"/>
-                <a:ea typeface="Courier" charset="0"/>
-                <a:cs typeface="Helvetica" panose="020B0604020202020204" pitchFamily="34" charset="0"/>
-              </a:rPr>
-              <a:t> </a:t>
-            </a:r>
-            <a:r>
-              <a:rPr lang="en-US" sz="3200" dirty="0" smtClean="0">
+              <a:t> and adult behavior with </a:t>
+            </a:r>
+            <a:r>
+              <a:rPr lang="en-US" sz="3200" dirty="0">
                 <a:latin typeface="Courier" charset="0"/>
                 <a:ea typeface="Courier" charset="0"/>
                 <a:cs typeface="Courier" charset="0"/>
@@ -9684,7 +8657,7 @@
           <p:cNvPr id="155" name="TextBox 154">
             <a:extLst>
               <a:ext uri="{FF2B5EF4-FFF2-40B4-BE49-F238E27FC236}">
-                <a16:creationId xmlns="" xmlns:a16="http://schemas.microsoft.com/office/drawing/2014/main" id="{7C150472-22E3-4FF3-872F-B098DA9BF120}"/>
+                <a16:creationId xmlns:a16="http://schemas.microsoft.com/office/drawing/2014/main" id="{7C150472-22E3-4FF3-872F-B098DA9BF120}"/>
               </a:ext>
             </a:extLst>
           </p:cNvPr>
@@ -9708,23 +8681,15 @@
           <a:lstStyle/>
           <a:p>
             <a:r>
-              <a:rPr lang="en-US" sz="3200" dirty="0" smtClean="0">
-                <a:latin typeface="Helvetica" charset="0"/>
-                <a:ea typeface="Helvetica" charset="0"/>
-                <a:cs typeface="Helvetica" charset="0"/>
-              </a:rPr>
-              <a:t>Replication of </a:t>
-            </a:r>
-            <a:r>
-              <a:rPr lang="en-US" sz="3200" dirty="0">
-                <a:latin typeface="Helvetica" charset="0"/>
-                <a:ea typeface="Helvetica" charset="0"/>
-                <a:cs typeface="Helvetica" charset="0"/>
-              </a:rPr>
-              <a:t>previous work modeling children’s behavior with </a:t>
-            </a:r>
-            <a:r>
-              <a:rPr lang="en-US" sz="3200" dirty="0" smtClean="0">
+              <a:rPr lang="en-US" sz="3200" dirty="0">
+                <a:latin typeface="Helvetica" charset="0"/>
+                <a:ea typeface="Helvetica" charset="0"/>
+                <a:cs typeface="Helvetica" charset="0"/>
+              </a:rPr>
+              <a:t>Replication of previous work modeling children’s behavior with </a:t>
+            </a:r>
+            <a:r>
+              <a:rPr lang="en-US" sz="3200" dirty="0">
                 <a:latin typeface="Courier"/>
                 <a:ea typeface="Helvetica" charset="0"/>
                 <a:cs typeface="Helvetica" charset="0"/>
@@ -9732,7 +8697,7 @@
               <a:t>every-not</a:t>
             </a:r>
             <a:r>
-              <a:rPr lang="en-US" sz="3200" dirty="0" smtClean="0">
+              <a:rPr lang="en-US" sz="3200" dirty="0">
                 <a:latin typeface="Helvetica" charset="0"/>
                 <a:ea typeface="Helvetica" charset="0"/>
                 <a:cs typeface="Helvetica" charset="0"/>
@@ -9740,7 +8705,7 @@
               <a:t>: </a:t>
             </a:r>
             <a:r>
-              <a:rPr lang="en-US" sz="3200" dirty="0" smtClean="0">
+              <a:rPr lang="en-US" sz="3200" dirty="0">
                 <a:solidFill>
                   <a:srgbClr val="BA4DFF"/>
                 </a:solidFill>
@@ -9751,7 +8716,7 @@
               <a:t>pragmatic</a:t>
             </a:r>
             <a:r>
-              <a:rPr lang="en-US" sz="3200" dirty="0" smtClean="0">
+              <a:rPr lang="en-US" sz="3200" dirty="0">
                 <a:latin typeface="Helvetica" charset="0"/>
                 <a:ea typeface="Helvetica" charset="0"/>
                 <a:cs typeface="Helvetica" charset="0"/>
@@ -9759,7 +8724,7 @@
               <a:t> factors impact behavior more than </a:t>
             </a:r>
             <a:r>
-              <a:rPr lang="en-US" sz="3200" dirty="0" smtClean="0">
+              <a:rPr lang="en-US" sz="3200" dirty="0">
                 <a:solidFill>
                   <a:srgbClr val="00AEE5"/>
                 </a:solidFill>
@@ -9770,20 +8735,12 @@
               <a:t>grammatical</a:t>
             </a:r>
             <a:r>
-              <a:rPr lang="en-US" sz="3200" dirty="0" smtClean="0">
-                <a:latin typeface="Helvetica" charset="0"/>
-                <a:ea typeface="Helvetica" charset="0"/>
-                <a:cs typeface="Helvetica" charset="0"/>
-              </a:rPr>
-              <a:t> </a:t>
-            </a:r>
-            <a:r>
-              <a:rPr lang="en-US" sz="3200" dirty="0" smtClean="0">
-                <a:latin typeface="Helvetica" charset="0"/>
-                <a:ea typeface="Helvetica" charset="0"/>
-                <a:cs typeface="Helvetica" charset="0"/>
-              </a:rPr>
-              <a:t>factor of scope</a:t>
+              <a:rPr lang="en-US" sz="3200" dirty="0">
+                <a:latin typeface="Helvetica" charset="0"/>
+                <a:ea typeface="Helvetica" charset="0"/>
+                <a:cs typeface="Helvetica" charset="0"/>
+              </a:rPr>
+              <a:t> factor of scope</a:t>
             </a:r>
             <a:endParaRPr lang="en-US" sz="3200" dirty="0">
               <a:latin typeface="Courier"/>
@@ -9812,7 +8769,7 @@
             <p:cNvPr id="158" name="Picture 157">
               <a:extLst>
                 <a:ext uri="{FF2B5EF4-FFF2-40B4-BE49-F238E27FC236}">
-                  <a16:creationId xmlns="" xmlns:a16="http://schemas.microsoft.com/office/drawing/2014/main" id="{B9E63752-B056-4BC0-993C-71C6A9B35D6B}"/>
+                  <a16:creationId xmlns:a16="http://schemas.microsoft.com/office/drawing/2014/main" id="{B9E63752-B056-4BC0-993C-71C6A9B35D6B}"/>
                 </a:ext>
               </a:extLst>
             </p:cNvPr>
@@ -9842,7 +8799,7 @@
             <p:cNvPr id="159" name="Picture 158">
               <a:extLst>
                 <a:ext uri="{FF2B5EF4-FFF2-40B4-BE49-F238E27FC236}">
-                  <a16:creationId xmlns="" xmlns:a16="http://schemas.microsoft.com/office/drawing/2014/main" id="{B5A7751E-FFB4-4A1A-90AF-5A4CECBA4A43}"/>
+                  <a16:creationId xmlns:a16="http://schemas.microsoft.com/office/drawing/2014/main" id="{B5A7751E-FFB4-4A1A-90AF-5A4CECBA4A43}"/>
                 </a:ext>
               </a:extLst>
             </p:cNvPr>
@@ -9872,7 +8829,7 @@
             <p:cNvPr id="160" name="Picture 159">
               <a:extLst>
                 <a:ext uri="{FF2B5EF4-FFF2-40B4-BE49-F238E27FC236}">
-                  <a16:creationId xmlns="" xmlns:a16="http://schemas.microsoft.com/office/drawing/2014/main" id="{73CB8EB3-B019-47EB-B75F-F5F18125590A}"/>
+                  <a16:creationId xmlns:a16="http://schemas.microsoft.com/office/drawing/2014/main" id="{73CB8EB3-B019-47EB-B75F-F5F18125590A}"/>
                 </a:ext>
               </a:extLst>
             </p:cNvPr>
@@ -9903,7 +8860,7 @@
           <p:cNvPr id="161" name="TextBox 160">
             <a:extLst>
               <a:ext uri="{FF2B5EF4-FFF2-40B4-BE49-F238E27FC236}">
-                <a16:creationId xmlns="" xmlns:a16="http://schemas.microsoft.com/office/drawing/2014/main" id="{B8ABCD8D-7AB3-4BE8-9866-CD5EBA48CAC3}"/>
+                <a16:creationId xmlns:a16="http://schemas.microsoft.com/office/drawing/2014/main" id="{B8ABCD8D-7AB3-4BE8-9866-CD5EBA48CAC3}"/>
               </a:ext>
             </a:extLst>
           </p:cNvPr>
@@ -9933,26 +8890,13 @@
                 <a:ea typeface="Helvetica" charset="0"/>
                 <a:cs typeface="Helvetica" charset="0"/>
               </a:rPr>
-              <a:t>t</a:t>
-            </a:r>
-            <a:r>
-              <a:rPr lang="en-US" sz="3200" dirty="0" smtClean="0">
-                <a:latin typeface="Courier"/>
-                <a:ea typeface="Helvetica" charset="0"/>
-                <a:cs typeface="Helvetica" charset="0"/>
-              </a:rPr>
-              <a:t>wo-not</a:t>
-            </a:r>
-            <a:endParaRPr lang="en-US" sz="3200" dirty="0">
-              <a:latin typeface="Courier"/>
-              <a:ea typeface="Helvetica" charset="0"/>
-              <a:cs typeface="Helvetica" charset="0"/>
-            </a:endParaRPr>
+              <a:t>two-not</a:t>
+            </a:r>
           </a:p>
           <a:p>
             <a:pPr algn="ctr"/>
             <a:r>
-              <a:rPr lang="en-US" sz="3200" dirty="0" smtClean="0">
+              <a:rPr lang="en-US" sz="3200" dirty="0">
                 <a:latin typeface="Helvetica" charset="0"/>
                 <a:ea typeface="Helvetica" charset="0"/>
                 <a:cs typeface="Helvetica" charset="0"/>
@@ -9960,7 +8904,7 @@
               <a:t>Adults: </a:t>
             </a:r>
             <a:r>
-              <a:rPr lang="en-US" sz="3200" dirty="0" smtClean="0">
+              <a:rPr lang="en-US" sz="3200" dirty="0">
                 <a:solidFill>
                   <a:srgbClr val="FF0000"/>
                 </a:solidFill>
@@ -9968,21 +8912,10 @@
                 <a:ea typeface="Helvetica" charset="0"/>
                 <a:cs typeface="Helvetica" charset="0"/>
               </a:rPr>
-              <a:t>27.5</a:t>
-            </a:r>
-            <a:r>
-              <a:rPr lang="en-US" sz="3200" dirty="0" smtClean="0">
-                <a:solidFill>
-                  <a:srgbClr val="FF0000"/>
-                </a:solidFill>
-                <a:latin typeface="Helvetica" charset="0"/>
-                <a:ea typeface="Helvetica" charset="0"/>
-                <a:cs typeface="Helvetica" charset="0"/>
-              </a:rPr>
-              <a:t>% </a:t>
-            </a:r>
-            <a:r>
-              <a:rPr lang="en-US" sz="3200" dirty="0" smtClean="0">
+              <a:t>27.5% </a:t>
+            </a:r>
+            <a:r>
+              <a:rPr lang="en-US" sz="3200" dirty="0">
                 <a:latin typeface="Helvetica" charset="0"/>
                 <a:ea typeface="Helvetica" charset="0"/>
                 <a:cs typeface="Helvetica" charset="0"/>
@@ -9990,7 +8923,7 @@
               <a:t>to </a:t>
             </a:r>
             <a:r>
-              <a:rPr lang="en-US" sz="3200" dirty="0" smtClean="0">
+              <a:rPr lang="en-US" sz="3200" dirty="0">
                 <a:solidFill>
                   <a:srgbClr val="00B150"/>
                 </a:solidFill>
@@ -10000,14 +8933,6 @@
               </a:rPr>
               <a:t>92.5%</a:t>
             </a:r>
-            <a:endParaRPr lang="en-US" sz="3200" dirty="0">
-              <a:solidFill>
-                <a:srgbClr val="00B150"/>
-              </a:solidFill>
-              <a:latin typeface="Helvetica" charset="0"/>
-              <a:ea typeface="Helvetica" charset="0"/>
-              <a:cs typeface="Helvetica" charset="0"/>
-            </a:endParaRPr>
           </a:p>
         </p:txBody>
       </p:sp>
@@ -10016,7 +8941,7 @@
           <p:cNvPr id="37" name="Picture 36">
             <a:extLst>
               <a:ext uri="{FF2B5EF4-FFF2-40B4-BE49-F238E27FC236}">
-                <a16:creationId xmlns="" xmlns:a16="http://schemas.microsoft.com/office/drawing/2014/main" id="{7B8CBF04-3631-450C-82E1-6B62E5966AD9}"/>
+                <a16:creationId xmlns:a16="http://schemas.microsoft.com/office/drawing/2014/main" id="{7B8CBF04-3631-450C-82E1-6B62E5966AD9}"/>
               </a:ext>
             </a:extLst>
           </p:cNvPr>
@@ -10052,7 +8977,7 @@
           <p:cNvPr id="154" name="TextBox 153">
             <a:extLst>
               <a:ext uri="{FF2B5EF4-FFF2-40B4-BE49-F238E27FC236}">
-                <a16:creationId xmlns="" xmlns:a16="http://schemas.microsoft.com/office/drawing/2014/main" id="{A3EE292F-D3D0-428F-BDD9-EE369AA555DE}"/>
+                <a16:creationId xmlns:a16="http://schemas.microsoft.com/office/drawing/2014/main" id="{A3EE292F-D3D0-428F-BDD9-EE369AA555DE}"/>
               </a:ext>
             </a:extLst>
           </p:cNvPr>
@@ -10082,21 +9007,8 @@
                 <a:ea typeface="Helvetica" charset="0"/>
                 <a:cs typeface="Helvetica" charset="0"/>
               </a:rPr>
-              <a:t>t</a:t>
-            </a:r>
-            <a:r>
-              <a:rPr lang="en-US" sz="3200" dirty="0" smtClean="0">
-                <a:latin typeface="Courier"/>
-                <a:ea typeface="Helvetica" charset="0"/>
-                <a:cs typeface="Helvetica" charset="0"/>
-              </a:rPr>
-              <a:t>wo-not</a:t>
-            </a:r>
-            <a:endParaRPr lang="en-US" sz="3200" dirty="0">
-              <a:latin typeface="Courier"/>
-              <a:ea typeface="Helvetica" charset="0"/>
-              <a:cs typeface="Helvetica" charset="0"/>
-            </a:endParaRPr>
+              <a:t>two-not</a:t>
+            </a:r>
           </a:p>
           <a:p>
             <a:pPr algn="ctr"/>
@@ -10108,16 +9020,11 @@
               </a:rPr>
               <a:t>Adults: </a:t>
             </a:r>
-            <a:endParaRPr lang="en-US" sz="3200" dirty="0" smtClean="0">
-              <a:latin typeface="Helvetica" charset="0"/>
-              <a:ea typeface="Helvetica" charset="0"/>
-              <a:cs typeface="Helvetica" charset="0"/>
-            </a:endParaRPr>
           </a:p>
           <a:p>
             <a:pPr algn="ctr"/>
             <a:r>
-              <a:rPr lang="en-US" sz="3200" dirty="0" smtClean="0">
+              <a:rPr lang="en-US" sz="3200" dirty="0">
                 <a:solidFill>
                   <a:srgbClr val="FF0000"/>
                 </a:solidFill>
@@ -10128,7 +9035,7 @@
               <a:t>27.5%</a:t>
             </a:r>
             <a:r>
-              <a:rPr lang="en-US" sz="3200" dirty="0" smtClean="0">
+              <a:rPr lang="en-US" sz="3200" dirty="0">
                 <a:latin typeface="Helvetica" charset="0"/>
                 <a:ea typeface="Helvetica" charset="0"/>
                 <a:cs typeface="Helvetica" charset="0"/>
@@ -10136,7 +9043,7 @@
               <a:t> to </a:t>
             </a:r>
             <a:r>
-              <a:rPr lang="en-US" sz="3200" dirty="0" smtClean="0">
+              <a:rPr lang="en-US" sz="3200" dirty="0">
                 <a:solidFill>
                   <a:srgbClr val="00B050"/>
                 </a:solidFill>
@@ -10146,14 +9053,6 @@
               </a:rPr>
               <a:t>92.5%</a:t>
             </a:r>
-            <a:endParaRPr lang="en-US" sz="3200" dirty="0">
-              <a:solidFill>
-                <a:srgbClr val="00B050"/>
-              </a:solidFill>
-              <a:latin typeface="Helvetica" charset="0"/>
-              <a:ea typeface="Helvetica" charset="0"/>
-              <a:cs typeface="Helvetica" charset="0"/>
-            </a:endParaRPr>
           </a:p>
         </p:txBody>
       </p:sp>
@@ -10162,7 +9061,7 @@
           <p:cNvPr id="162" name="Rectangle 161">
             <a:extLst>
               <a:ext uri="{FF2B5EF4-FFF2-40B4-BE49-F238E27FC236}">
-                <a16:creationId xmlns="" xmlns:a16="http://schemas.microsoft.com/office/drawing/2014/main" id="{F6817123-A7B3-4C92-958C-C13CF38A6E38}"/>
+                <a16:creationId xmlns:a16="http://schemas.microsoft.com/office/drawing/2014/main" id="{F6817123-A7B3-4C92-958C-C13CF38A6E38}"/>
               </a:ext>
             </a:extLst>
           </p:cNvPr>
@@ -10218,7 +9117,7 @@
           <p:cNvPr id="163" name="Rectangle 162">
             <a:extLst>
               <a:ext uri="{FF2B5EF4-FFF2-40B4-BE49-F238E27FC236}">
-                <a16:creationId xmlns="" xmlns:a16="http://schemas.microsoft.com/office/drawing/2014/main" id="{E98926B9-62E4-40DE-BD1D-9D5FC999DD4A}"/>
+                <a16:creationId xmlns:a16="http://schemas.microsoft.com/office/drawing/2014/main" id="{E98926B9-62E4-40DE-BD1D-9D5FC999DD4A}"/>
               </a:ext>
             </a:extLst>
           </p:cNvPr>
@@ -10274,7 +9173,7 @@
           <p:cNvPr id="25" name="Oval 24">
             <a:extLst>
               <a:ext uri="{FF2B5EF4-FFF2-40B4-BE49-F238E27FC236}">
-                <a16:creationId xmlns="" xmlns:a16="http://schemas.microsoft.com/office/drawing/2014/main" id="{118047CB-EC8D-4B4F-A0D3-30378AAC069B}"/>
+                <a16:creationId xmlns:a16="http://schemas.microsoft.com/office/drawing/2014/main" id="{118047CB-EC8D-4B4F-A0D3-30378AAC069B}"/>
               </a:ext>
             </a:extLst>
           </p:cNvPr>
@@ -10329,7 +9228,7 @@
           <p:cNvPr id="164" name="Picture 163">
             <a:extLst>
               <a:ext uri="{FF2B5EF4-FFF2-40B4-BE49-F238E27FC236}">
-                <a16:creationId xmlns="" xmlns:a16="http://schemas.microsoft.com/office/drawing/2014/main" id="{F293C8EA-F375-4F53-9F35-F59CB0A6E534}"/>
+                <a16:creationId xmlns:a16="http://schemas.microsoft.com/office/drawing/2014/main" id="{F293C8EA-F375-4F53-9F35-F59CB0A6E534}"/>
               </a:ext>
             </a:extLst>
           </p:cNvPr>
@@ -10346,7 +9245,7 @@
         </p:blipFill>
         <p:spPr>
           <a:xfrm>
-            <a:off x="37572730" y="16164868"/>
+            <a:off x="37574560" y="16130680"/>
             <a:ext cx="504756" cy="567558"/>
           </a:xfrm>
           <a:prstGeom prst="rect">
@@ -10359,7 +9258,7 @@
           <p:cNvPr id="165" name="Picture 164">
             <a:extLst>
               <a:ext uri="{FF2B5EF4-FFF2-40B4-BE49-F238E27FC236}">
-                <a16:creationId xmlns="" xmlns:a16="http://schemas.microsoft.com/office/drawing/2014/main" id="{C57A6062-9AA2-4671-855D-5583E0313095}"/>
+                <a16:creationId xmlns:a16="http://schemas.microsoft.com/office/drawing/2014/main" id="{C57A6062-9AA2-4671-855D-5583E0313095}"/>
               </a:ext>
             </a:extLst>
           </p:cNvPr>
@@ -10376,7 +9275,7 @@
         </p:blipFill>
         <p:spPr>
           <a:xfrm>
-            <a:off x="41235043" y="16164868"/>
+            <a:off x="41236873" y="16130680"/>
             <a:ext cx="438251" cy="490588"/>
           </a:xfrm>
           <a:prstGeom prst="rect">
@@ -10389,7 +9288,7 @@
           <p:cNvPr id="166" name="Picture 165">
             <a:extLst>
               <a:ext uri="{FF2B5EF4-FFF2-40B4-BE49-F238E27FC236}">
-                <a16:creationId xmlns="" xmlns:a16="http://schemas.microsoft.com/office/drawing/2014/main" id="{A4475436-0F09-4EDF-9CBF-B50FE2185A96}"/>
+                <a16:creationId xmlns:a16="http://schemas.microsoft.com/office/drawing/2014/main" id="{A4475436-0F09-4EDF-9CBF-B50FE2185A96}"/>
               </a:ext>
             </a:extLst>
           </p:cNvPr>
@@ -10406,7 +9305,7 @@
         </p:blipFill>
         <p:spPr>
           <a:xfrm>
-            <a:off x="38932729" y="16675739"/>
+            <a:off x="38934559" y="16641551"/>
             <a:ext cx="1100271" cy="1153141"/>
           </a:xfrm>
           <a:prstGeom prst="rect">
@@ -10419,7 +9318,7 @@
           <p:cNvPr id="167" name="Picture 166">
             <a:extLst>
               <a:ext uri="{FF2B5EF4-FFF2-40B4-BE49-F238E27FC236}">
-                <a16:creationId xmlns="" xmlns:a16="http://schemas.microsoft.com/office/drawing/2014/main" id="{B349EB11-C20A-4667-A424-E10A4DF13D8A}"/>
+                <a16:creationId xmlns:a16="http://schemas.microsoft.com/office/drawing/2014/main" id="{B349EB11-C20A-4667-A424-E10A4DF13D8A}"/>
               </a:ext>
             </a:extLst>
           </p:cNvPr>
@@ -10436,7 +9335,7 @@
         </p:blipFill>
         <p:spPr>
           <a:xfrm>
-            <a:off x="40886977" y="17259828"/>
+            <a:off x="40888807" y="17225640"/>
             <a:ext cx="979576" cy="1027209"/>
           </a:xfrm>
           <a:prstGeom prst="rect">
@@ -10449,7 +9348,7 @@
           <p:cNvPr id="173" name="Rectangle 172">
             <a:extLst>
               <a:ext uri="{FF2B5EF4-FFF2-40B4-BE49-F238E27FC236}">
-                <a16:creationId xmlns="" xmlns:a16="http://schemas.microsoft.com/office/drawing/2014/main" id="{3D034900-B05E-413E-8FC5-D0417F4944E5}"/>
+                <a16:creationId xmlns:a16="http://schemas.microsoft.com/office/drawing/2014/main" id="{3D034900-B05E-413E-8FC5-D0417F4944E5}"/>
               </a:ext>
             </a:extLst>
           </p:cNvPr>
@@ -10458,8 +9357,8 @@
         </p:nvSpPr>
         <p:spPr>
           <a:xfrm>
-            <a:off x="36924630" y="12854374"/>
-            <a:ext cx="5116471" cy="6452676"/>
+            <a:off x="36926460" y="12820185"/>
+            <a:ext cx="5116471" cy="6474397"/>
           </a:xfrm>
           <a:prstGeom prst="rect">
             <a:avLst/>
@@ -10505,7 +9404,7 @@
           <p:cNvPr id="174" name="Oval 173">
             <a:extLst>
               <a:ext uri="{FF2B5EF4-FFF2-40B4-BE49-F238E27FC236}">
-                <a16:creationId xmlns="" xmlns:a16="http://schemas.microsoft.com/office/drawing/2014/main" id="{D52CCF49-DDCD-4DFF-8F14-068AA5E10A55}"/>
+                <a16:creationId xmlns:a16="http://schemas.microsoft.com/office/drawing/2014/main" id="{D52CCF49-DDCD-4DFF-8F14-068AA5E10A55}"/>
               </a:ext>
             </a:extLst>
           </p:cNvPr>
@@ -10514,7 +9413,7 @@
         </p:nvSpPr>
         <p:spPr>
           <a:xfrm>
-            <a:off x="39572535" y="13019698"/>
+            <a:off x="39574365" y="12985510"/>
             <a:ext cx="780356" cy="2821563"/>
           </a:xfrm>
           <a:prstGeom prst="ellipse">
@@ -10560,7 +9459,7 @@
           <p:cNvPr id="123" name="Picture 122">
             <a:extLst>
               <a:ext uri="{FF2B5EF4-FFF2-40B4-BE49-F238E27FC236}">
-                <a16:creationId xmlns="" xmlns:a16="http://schemas.microsoft.com/office/drawing/2014/main" id="{81AE674A-2320-46A1-A1DE-CBC9EC3467E4}"/>
+                <a16:creationId xmlns:a16="http://schemas.microsoft.com/office/drawing/2014/main" id="{81AE674A-2320-46A1-A1DE-CBC9EC3467E4}"/>
               </a:ext>
             </a:extLst>
           </p:cNvPr>
@@ -10608,31 +9507,13 @@
           <a:p>
             <a:r>
               <a:rPr lang="en-US" sz="3200" dirty="0">
-                <a:solidFill>
-                  <a:srgbClr val="FF0000"/>
-                </a:solidFill>
                 <a:latin typeface="Helvetica" panose="020B0604020202020204" pitchFamily="34" charset="0"/>
                 <a:ea typeface="Courier" charset="0"/>
                 <a:cs typeface="Helvetica" panose="020B0604020202020204" pitchFamily="34" charset="0"/>
               </a:rPr>
-              <a:t>27.5</a:t>
-            </a:r>
-            <a:r>
-              <a:rPr lang="en-US" sz="3200" dirty="0" smtClean="0">
-                <a:solidFill>
-                  <a:srgbClr val="FF0000"/>
-                </a:solidFill>
-                <a:latin typeface="Helvetica" panose="020B0604020202020204" pitchFamily="34" charset="0"/>
-                <a:ea typeface="Courier" charset="0"/>
-                <a:cs typeface="Helvetica" panose="020B0604020202020204" pitchFamily="34" charset="0"/>
-              </a:rPr>
-              <a:t>% endorsement</a:t>
-            </a:r>
-            <a:endParaRPr lang="en-US" sz="3200" dirty="0">
-              <a:solidFill>
-                <a:srgbClr val="FF0000"/>
-              </a:solidFill>
-            </a:endParaRPr>
+              <a:t>27.5% endorsement</a:t>
+            </a:r>
+            <a:endParaRPr lang="en-US" sz="3200" dirty="0"/>
           </a:p>
         </p:txBody>
       </p:sp>
@@ -10658,21 +9539,14 @@
           <a:lstStyle/>
           <a:p>
             <a:r>
-              <a:rPr lang="en-US" sz="3200" dirty="0" smtClean="0">
-                <a:solidFill>
-                  <a:srgbClr val="00B150"/>
-                </a:solidFill>
+              <a:rPr lang="en-US" sz="3200" dirty="0">
                 <a:latin typeface="Helvetica" panose="020B0604020202020204" pitchFamily="34" charset="0"/>
                 <a:ea typeface="Courier" charset="0"/>
                 <a:cs typeface="Helvetica" panose="020B0604020202020204" pitchFamily="34" charset="0"/>
               </a:rPr>
               <a:t>100% endorsement</a:t>
             </a:r>
-            <a:endParaRPr lang="en-US" sz="3200" dirty="0">
-              <a:solidFill>
-                <a:srgbClr val="00B150"/>
-              </a:solidFill>
-            </a:endParaRPr>
+            <a:endParaRPr lang="en-US" sz="3200" dirty="0"/>
           </a:p>
         </p:txBody>
       </p:sp>
@@ -10765,7 +9639,7 @@
           <a:p>
             <a:pPr algn="r"/>
             <a:r>
-              <a:rPr lang="en-US" sz="2800" b="1" dirty="0" smtClean="0">
+              <a:rPr lang="en-US" sz="2800" b="1" dirty="0">
                 <a:latin typeface="Helvetica" charset="0"/>
                 <a:ea typeface="Helvetica" charset="0"/>
                 <a:cs typeface="Helvetica" charset="0"/>
@@ -10776,7 +9650,7 @@
           <a:p>
             <a:pPr algn="r"/>
             <a:r>
-              <a:rPr lang="en-US" sz="3200" b="1" dirty="0" smtClean="0">
+              <a:rPr lang="en-US" sz="3200" b="1" dirty="0">
                 <a:latin typeface="Courier" charset="0"/>
                 <a:ea typeface="Courier" charset="0"/>
                 <a:cs typeface="Courier" charset="0"/>
@@ -10814,31 +9688,15 @@
           <a:p>
             <a:pPr algn="r"/>
             <a:r>
-              <a:rPr lang="en-US" sz="2400" i="1" dirty="0" smtClean="0">
-                <a:latin typeface="Helvetica" charset="0"/>
-                <a:ea typeface="Helvetica" charset="0"/>
-                <a:cs typeface="Helvetica" charset="0"/>
-              </a:rPr>
-              <a:t>Two frogs jumped </a:t>
-            </a:r>
-            <a:r>
-              <a:rPr lang="en-US" sz="2400" i="1" dirty="0" smtClean="0">
-                <a:latin typeface="Helvetica" charset="0"/>
-                <a:ea typeface="Helvetica" charset="0"/>
-                <a:cs typeface="Helvetica" charset="0"/>
-              </a:rPr>
-              <a:t>over </a:t>
-            </a:r>
-            <a:r>
-              <a:rPr lang="en-US" sz="2400" i="1" dirty="0" smtClean="0">
-                <a:latin typeface="Helvetica" charset="0"/>
-                <a:ea typeface="Helvetica" charset="0"/>
-                <a:cs typeface="Helvetica" charset="0"/>
-              </a:rPr>
-              <a:t>the fence, but</a:t>
-            </a:r>
-            <a:r>
-              <a:rPr lang="mr-IN" sz="2400" i="1" dirty="0" smtClean="0">
+              <a:rPr lang="en-US" sz="2400" i="1" dirty="0">
+                <a:latin typeface="Helvetica" charset="0"/>
+                <a:ea typeface="Helvetica" charset="0"/>
+                <a:cs typeface="Helvetica" charset="0"/>
+              </a:rPr>
+              <a:t>Two frogs jumped over the fence, but</a:t>
+            </a:r>
+            <a:r>
+              <a:rPr lang="mr-IN" sz="2400" i="1" dirty="0">
                 <a:latin typeface="Helvetica" charset="0"/>
                 <a:ea typeface="Helvetica" charset="0"/>
                 <a:cs typeface="Helvetica" charset="0"/>
@@ -10858,7 +9716,7 @@
           <p:cNvPr id="178" name="Picture 177">
             <a:extLst>
               <a:ext uri="{FF2B5EF4-FFF2-40B4-BE49-F238E27FC236}">
-                <a16:creationId xmlns="" xmlns:a16="http://schemas.microsoft.com/office/drawing/2014/main" id="{3D08E1A0-E944-4A91-94A0-2D5F3E0AF586}"/>
+                <a16:creationId xmlns:a16="http://schemas.microsoft.com/office/drawing/2014/main" id="{3D08E1A0-E944-4A91-94A0-2D5F3E0AF586}"/>
               </a:ext>
             </a:extLst>
           </p:cNvPr>
@@ -10911,21 +9769,14 @@
           <a:lstStyle/>
           <a:p>
             <a:r>
-              <a:rPr lang="en-US" sz="3200" dirty="0" smtClean="0">
-                <a:solidFill>
-                  <a:srgbClr val="00B150"/>
-                </a:solidFill>
+              <a:rPr lang="en-US" sz="3200" dirty="0">
                 <a:latin typeface="Helvetica" panose="020B0604020202020204" pitchFamily="34" charset="0"/>
                 <a:ea typeface="Courier" charset="0"/>
                 <a:cs typeface="Helvetica" panose="020B0604020202020204" pitchFamily="34" charset="0"/>
               </a:rPr>
               <a:t>92.5% endorsement</a:t>
             </a:r>
-            <a:endParaRPr lang="en-US" sz="3200" dirty="0">
-              <a:solidFill>
-                <a:srgbClr val="00B150"/>
-              </a:solidFill>
-            </a:endParaRPr>
+            <a:endParaRPr lang="en-US" sz="3200" dirty="0"/>
           </a:p>
         </p:txBody>
       </p:sp>
@@ -10956,7 +9807,7 @@
               <a:buChar char="v"/>
             </a:pPr>
             <a:r>
-              <a:rPr lang="en-US" sz="3200" dirty="0" smtClean="0">
+              <a:rPr lang="en-US" sz="3200" dirty="0">
                 <a:latin typeface="Helvetica" charset="0"/>
                 <a:ea typeface="Helvetica" charset="0"/>
                 <a:cs typeface="Helvetica" charset="0"/>
@@ -10969,7 +9820,7 @@
               <a:buFont typeface="Wingdings" charset="2"/>
               <a:buChar char="v"/>
             </a:pPr>
-            <a:endParaRPr lang="en-US" sz="500" dirty="0" smtClean="0">
+            <a:endParaRPr lang="en-US" sz="500" dirty="0">
               <a:latin typeface="Helvetica" charset="0"/>
               <a:ea typeface="Helvetica" charset="0"/>
               <a:cs typeface="Helvetica" charset="0"/>
@@ -10981,7 +9832,7 @@
               <a:buChar char="v"/>
             </a:pPr>
             <a:r>
-              <a:rPr lang="en-US" sz="3200" dirty="0" err="1" smtClean="0">
+              <a:rPr lang="en-US" sz="3200" dirty="0" err="1">
                 <a:latin typeface="Helvetica" charset="0"/>
                 <a:ea typeface="Helvetica" charset="0"/>
                 <a:cs typeface="Helvetica" charset="0"/>
@@ -10989,7 +9840,7 @@
               <a:t>Baserate</a:t>
             </a:r>
             <a:r>
-              <a:rPr lang="en-US" sz="3200" dirty="0" smtClean="0">
+              <a:rPr lang="en-US" sz="3200" dirty="0">
                 <a:latin typeface="Helvetica" charset="0"/>
                 <a:ea typeface="Helvetica" charset="0"/>
                 <a:cs typeface="Helvetica" charset="0"/>
@@ -10997,7 +9848,7 @@
               <a:t> (</a:t>
             </a:r>
             <a:r>
-              <a:rPr lang="en-US" sz="3200" i="1" dirty="0" smtClean="0">
+              <a:rPr lang="en-US" sz="3200" i="1" dirty="0">
                 <a:latin typeface="Helvetica" charset="0"/>
                 <a:ea typeface="Helvetica" charset="0"/>
                 <a:cs typeface="Helvetica" charset="0"/>
@@ -11005,7 +9856,7 @@
               <a:t>b</a:t>
             </a:r>
             <a:r>
-              <a:rPr lang="en-US" sz="3200" dirty="0" smtClean="0">
+              <a:rPr lang="en-US" sz="3200" dirty="0">
                 <a:latin typeface="Helvetica" charset="0"/>
                 <a:ea typeface="Helvetica" charset="0"/>
                 <a:cs typeface="Helvetica" charset="0"/>
@@ -11018,7 +9869,7 @@
               <a:buFont typeface="Wingdings" charset="2"/>
               <a:buChar char="v"/>
             </a:pPr>
-            <a:endParaRPr lang="en-US" sz="500" dirty="0" smtClean="0">
+            <a:endParaRPr lang="en-US" sz="500" dirty="0">
               <a:latin typeface="Helvetica" charset="0"/>
               <a:ea typeface="Helvetica" charset="0"/>
               <a:cs typeface="Helvetica" charset="0"/>
@@ -11030,7 +9881,7 @@
               <a:buChar char="v"/>
             </a:pPr>
             <a:r>
-              <a:rPr lang="en-US" sz="3200" dirty="0" smtClean="0">
+              <a:rPr lang="en-US" sz="3200" dirty="0">
                 <a:latin typeface="Helvetica" charset="0"/>
                 <a:ea typeface="Helvetica" charset="0"/>
                 <a:cs typeface="Helvetica" charset="0"/>
@@ -11038,7 +9889,7 @@
               <a:t>Pragmatic speaker chooses whether to endorse </a:t>
             </a:r>
             <a:r>
-              <a:rPr lang="en-US" sz="3200" dirty="0" smtClean="0">
+              <a:rPr lang="en-US" sz="3200" dirty="0">
                 <a:latin typeface="Courier" charset="0"/>
                 <a:ea typeface="Courier" charset="0"/>
                 <a:cs typeface="Courier" charset="0"/>
@@ -11046,7 +9897,7 @@
               <a:t>two-not</a:t>
             </a:r>
             <a:r>
-              <a:rPr lang="en-US" sz="3200" dirty="0" smtClean="0">
+              <a:rPr lang="en-US" sz="3200" dirty="0">
                 <a:latin typeface="Helvetica" charset="0"/>
                 <a:ea typeface="Helvetica" charset="0"/>
                 <a:cs typeface="Helvetica" charset="0"/>
@@ -11059,7 +9910,7 @@
               <a:buFont typeface="Wingdings" charset="2"/>
               <a:buChar char="v"/>
             </a:pPr>
-            <a:endParaRPr lang="en-US" sz="500" dirty="0" smtClean="0">
+            <a:endParaRPr lang="en-US" sz="500" dirty="0">
               <a:latin typeface="Courier" charset="0"/>
               <a:ea typeface="Courier" charset="0"/>
               <a:cs typeface="Courier" charset="0"/>
@@ -11071,28 +9922,12 @@
               <a:buChar char="v"/>
             </a:pPr>
             <a:r>
-              <a:rPr lang="en-US" sz="3200" dirty="0" smtClean="0">
-                <a:latin typeface="Helvetica" charset="0"/>
-                <a:ea typeface="Helvetica" charset="0"/>
-                <a:cs typeface="Helvetica" charset="0"/>
-              </a:rPr>
-              <a:t>Separate predictions for 1-of-2 vs. </a:t>
-            </a:r>
-            <a:r>
-              <a:rPr lang="en-US" sz="3200" dirty="0" smtClean="0">
-                <a:latin typeface="Helvetica" charset="0"/>
-                <a:ea typeface="Helvetica" charset="0"/>
-                <a:cs typeface="Helvetica" charset="0"/>
-              </a:rPr>
-              <a:t>2-of-4 </a:t>
-            </a:r>
-            <a:r>
-              <a:rPr lang="en-US" sz="3200" dirty="0" smtClean="0">
-                <a:latin typeface="Helvetica" charset="0"/>
-                <a:ea typeface="Helvetica" charset="0"/>
-                <a:cs typeface="Helvetica" charset="0"/>
-              </a:rPr>
-              <a:t>contexts</a:t>
+              <a:rPr lang="en-US" sz="3200" dirty="0">
+                <a:latin typeface="Helvetica" charset="0"/>
+                <a:ea typeface="Helvetica" charset="0"/>
+                <a:cs typeface="Helvetica" charset="0"/>
+              </a:rPr>
+              <a:t>Separate predictions for 1-of-2 vs. 2-of-4 contexts</a:t>
             </a:r>
           </a:p>
           <a:p>
@@ -11100,7 +9935,7 @@
               <a:buFont typeface="Wingdings" charset="2"/>
               <a:buChar char="v"/>
             </a:pPr>
-            <a:endParaRPr lang="en-US" sz="500" dirty="0" smtClean="0">
+            <a:endParaRPr lang="en-US" sz="500" dirty="0">
               <a:latin typeface="Helvetica" charset="0"/>
               <a:ea typeface="Helvetica" charset="0"/>
               <a:cs typeface="Helvetica" charset="0"/>
@@ -11112,7 +9947,7 @@
               <a:buChar char="v"/>
             </a:pPr>
             <a:r>
-              <a:rPr lang="en-US" sz="3200" dirty="0" smtClean="0">
+              <a:rPr lang="en-US" sz="3200" dirty="0">
                 <a:latin typeface="Helvetica" charset="0"/>
                 <a:ea typeface="Helvetica" charset="0"/>
                 <a:cs typeface="Helvetica" charset="0"/>
@@ -11126,7 +9961,7 @@
               <a:buChar char="v"/>
             </a:pPr>
             <a:r>
-              <a:rPr lang="en-US" sz="3200" dirty="0" smtClean="0">
+              <a:rPr lang="en-US" sz="3200" dirty="0">
                 <a:latin typeface="Helvetica" charset="0"/>
                 <a:ea typeface="Helvetica" charset="0"/>
                 <a:cs typeface="Helvetica" charset="0"/>
@@ -11134,7 +9969,7 @@
               <a:t>Q = {</a:t>
             </a:r>
             <a:r>
-              <a:rPr lang="en-US" sz="3200" dirty="0" smtClean="0">
+              <a:rPr lang="en-US" sz="3200" dirty="0">
                 <a:latin typeface="Courier" charset="0"/>
                 <a:ea typeface="Courier" charset="0"/>
                 <a:cs typeface="Courier" charset="0"/>
@@ -11142,7 +9977,7 @@
               <a:t>how-many?</a:t>
             </a:r>
             <a:r>
-              <a:rPr lang="en-US" sz="3200" dirty="0" smtClean="0">
+              <a:rPr lang="en-US" sz="3200" dirty="0">
                 <a:latin typeface="Helvetica" charset="0"/>
                 <a:ea typeface="Helvetica" charset="0"/>
                 <a:cs typeface="Helvetica" charset="0"/>
@@ -11150,7 +9985,7 @@
               <a:t>, </a:t>
             </a:r>
             <a:r>
-              <a:rPr lang="en-US" sz="3200" dirty="0" smtClean="0">
+              <a:rPr lang="en-US" sz="3200" dirty="0">
                 <a:latin typeface="Courier" charset="0"/>
                 <a:ea typeface="Courier" charset="0"/>
                 <a:cs typeface="Courier" charset="0"/>
@@ -11158,7 +9993,7 @@
               <a:t>all?</a:t>
             </a:r>
             <a:r>
-              <a:rPr lang="en-US" sz="3200" dirty="0" smtClean="0">
+              <a:rPr lang="en-US" sz="3200" dirty="0">
                 <a:latin typeface="Helvetica" charset="0"/>
                 <a:ea typeface="Helvetica" charset="0"/>
                 <a:cs typeface="Helvetica" charset="0"/>
@@ -11166,7 +10001,7 @@
               <a:t>, </a:t>
             </a:r>
             <a:r>
-              <a:rPr lang="en-US" sz="3200" dirty="0" smtClean="0">
+              <a:rPr lang="en-US" sz="3200" dirty="0">
                 <a:latin typeface="Courier" charset="0"/>
                 <a:ea typeface="Courier" charset="0"/>
                 <a:cs typeface="Courier" charset="0"/>
@@ -11174,7 +10009,7 @@
               <a:t>none?</a:t>
             </a:r>
             <a:r>
-              <a:rPr lang="en-US" sz="3200" dirty="0" smtClean="0">
+              <a:rPr lang="en-US" sz="3200" dirty="0">
                 <a:latin typeface="Helvetica" charset="0"/>
                 <a:ea typeface="Helvetica" charset="0"/>
                 <a:cs typeface="Helvetica" charset="0"/>
@@ -11188,7 +10023,7 @@
               <a:buChar char="v"/>
             </a:pPr>
             <a:r>
-              <a:rPr lang="en-US" sz="3200" dirty="0" smtClean="0">
+              <a:rPr lang="en-US" sz="3200" dirty="0">
                 <a:latin typeface="Helvetica" charset="0"/>
                 <a:ea typeface="Helvetica" charset="0"/>
                 <a:cs typeface="Helvetica" charset="0"/>
@@ -11218,15 +10053,7 @@
                 <a:ea typeface="Helvetica" charset="0"/>
                 <a:cs typeface="Helvetica" charset="0"/>
               </a:rPr>
-              <a:t>In the </a:t>
-            </a:r>
-            <a:r>
-              <a:rPr lang="en-US" sz="3200" dirty="0" smtClean="0">
-                <a:latin typeface="Helvetica" charset="0"/>
-                <a:ea typeface="Helvetica" charset="0"/>
-                <a:cs typeface="Helvetica" charset="0"/>
-              </a:rPr>
-              <a:t>2-of-4 contexts:</a:t>
+              <a:t>In the 2-of-4 contexts:</a:t>
             </a:r>
           </a:p>
           <a:p>
@@ -11235,7 +10062,7 @@
               <a:buChar char="v"/>
             </a:pPr>
             <a:r>
-              <a:rPr lang="en-US" sz="3200" dirty="0" smtClean="0">
+              <a:rPr lang="en-US" sz="3200" dirty="0">
                 <a:latin typeface="Helvetica" panose="020B0604020202020204" pitchFamily="34" charset="0"/>
                 <a:ea typeface="Courier" charset="0"/>
                 <a:cs typeface="Helvetica" panose="020B0604020202020204" pitchFamily="34" charset="0"/>
@@ -11243,23 +10070,15 @@
               <a:t>Ambiguity in the interpretation of </a:t>
             </a:r>
             <a:r>
-              <a:rPr lang="en-US" sz="3200" dirty="0" smtClean="0">
-                <a:latin typeface="Helvetica" charset="0"/>
-                <a:ea typeface="Helvetica" charset="0"/>
-                <a:cs typeface="Helvetica" charset="0"/>
-              </a:rPr>
-              <a:t>two</a:t>
-            </a:r>
-            <a:r>
-              <a:rPr lang="en-US" sz="3200" dirty="0">
-                <a:latin typeface="Helvetica" charset="0"/>
-                <a:ea typeface="Helvetica" charset="0"/>
-                <a:cs typeface="Helvetica" charset="0"/>
-              </a:rPr>
-              <a:t>: </a:t>
-            </a:r>
-            <a:r>
-              <a:rPr lang="en-US" sz="3200" b="1" dirty="0" smtClean="0">
+              <a:rPr lang="en-US" sz="3200" dirty="0">
+                <a:latin typeface="Helvetica" charset="0"/>
+                <a:ea typeface="Helvetica" charset="0"/>
+                <a:cs typeface="Helvetica" charset="0"/>
+              </a:rPr>
+              <a:t>two: </a:t>
+            </a:r>
+            <a:r>
+              <a:rPr lang="en-US" sz="3200" b="1" dirty="0">
                 <a:latin typeface="Helvetica" charset="0"/>
                 <a:ea typeface="Helvetica" charset="0"/>
                 <a:cs typeface="Helvetica" charset="0"/>
@@ -11267,31 +10086,15 @@
               <a:t>at-least-two</a:t>
             </a:r>
             <a:r>
-              <a:rPr lang="en-US" sz="3200" dirty="0" smtClean="0">
-                <a:latin typeface="Helvetica" charset="0"/>
-                <a:ea typeface="Helvetica" charset="0"/>
-                <a:cs typeface="Helvetica" charset="0"/>
-              </a:rPr>
-              <a:t> </a:t>
-            </a:r>
-            <a:r>
-              <a:rPr lang="en-US" sz="3200" dirty="0">
-                <a:latin typeface="Helvetica" charset="0"/>
-                <a:ea typeface="Helvetica" charset="0"/>
-                <a:cs typeface="Helvetica" charset="0"/>
-              </a:rPr>
-              <a:t>semantics </a:t>
-            </a:r>
-            <a:r>
-              <a:rPr lang="en-US" sz="3200" dirty="0" smtClean="0">
-                <a:latin typeface="Helvetica" charset="0"/>
-                <a:ea typeface="Helvetica" charset="0"/>
-                <a:cs typeface="Helvetica" charset="0"/>
-              </a:rPr>
-              <a:t>vs. </a:t>
-            </a:r>
-            <a:r>
-              <a:rPr lang="en-US" sz="3200" b="1" dirty="0" smtClean="0">
+              <a:rPr lang="en-US" sz="3200" dirty="0">
+                <a:latin typeface="Helvetica" charset="0"/>
+                <a:ea typeface="Helvetica" charset="0"/>
+                <a:cs typeface="Helvetica" charset="0"/>
+              </a:rPr>
+              <a:t> semantics vs. </a:t>
+            </a:r>
+            <a:r>
+              <a:rPr lang="en-US" sz="3200" b="1" dirty="0">
                 <a:latin typeface="Helvetica" charset="0"/>
                 <a:ea typeface="Helvetica" charset="0"/>
                 <a:cs typeface="Helvetica" charset="0"/>
@@ -11299,20 +10102,12 @@
               <a:t>exactly-two</a:t>
             </a:r>
             <a:r>
-              <a:rPr lang="en-US" sz="3200" dirty="0" smtClean="0">
-                <a:latin typeface="Helvetica" charset="0"/>
-                <a:ea typeface="Helvetica" charset="0"/>
-                <a:cs typeface="Helvetica" charset="0"/>
-              </a:rPr>
-              <a:t> </a:t>
-            </a:r>
-            <a:r>
-              <a:rPr lang="en-US" sz="3200" dirty="0" smtClean="0">
-                <a:latin typeface="Helvetica" charset="0"/>
-                <a:ea typeface="Helvetica" charset="0"/>
-                <a:cs typeface="Helvetica" charset="0"/>
-              </a:rPr>
-              <a:t>semantics</a:t>
+              <a:rPr lang="en-US" sz="3200" dirty="0">
+                <a:latin typeface="Helvetica" charset="0"/>
+                <a:ea typeface="Helvetica" charset="0"/>
+                <a:cs typeface="Helvetica" charset="0"/>
+              </a:rPr>
+              <a:t> semantics</a:t>
             </a:r>
           </a:p>
           <a:p>
@@ -11326,15 +10121,7 @@
                 <a:ea typeface="Helvetica" charset="0"/>
                 <a:cs typeface="Helvetica" charset="0"/>
               </a:rPr>
-              <a:t>A</a:t>
-            </a:r>
-            <a:r>
-              <a:rPr lang="en-US" sz="3200" dirty="0" smtClean="0">
-                <a:latin typeface="Helvetica" charset="0"/>
-                <a:ea typeface="Helvetica" charset="0"/>
-                <a:cs typeface="Helvetica" charset="0"/>
-              </a:rPr>
-              <a:t>dditional QUDs: </a:t>
+              <a:t>Additional QUDs: </a:t>
             </a:r>
             <a:r>
               <a:rPr lang="en-US" sz="3200" dirty="0">
@@ -11350,31 +10137,15 @@
                 <a:ea typeface="Helvetica" charset="0"/>
                 <a:cs typeface="Helvetica" charset="0"/>
               </a:rPr>
-              <a:t> </a:t>
-            </a:r>
-            <a:r>
-              <a:rPr lang="en-US" sz="3200" dirty="0" smtClean="0">
-                <a:latin typeface="Helvetica" charset="0"/>
-                <a:ea typeface="Helvetica" charset="0"/>
-                <a:cs typeface="Helvetica" charset="0"/>
-              </a:rPr>
-              <a:t>and </a:t>
-            </a:r>
-            <a:r>
-              <a:rPr lang="en-US" sz="3200" dirty="0" smtClean="0">
+              <a:t> and </a:t>
+            </a:r>
+            <a:r>
+              <a:rPr lang="en-US" sz="3200" dirty="0">
                 <a:latin typeface="Courier" charset="0"/>
                 <a:ea typeface="Courier" charset="0"/>
                 <a:cs typeface="Courier" charset="0"/>
               </a:rPr>
-              <a:t>exactly-two</a:t>
-            </a:r>
-            <a:r>
-              <a:rPr lang="en-US" sz="3200" dirty="0">
-                <a:latin typeface="Courier" charset="0"/>
-                <a:ea typeface="Courier" charset="0"/>
-                <a:cs typeface="Courier" charset="0"/>
-              </a:rPr>
-              <a:t>?</a:t>
+              <a:t>exactly-two?</a:t>
             </a:r>
           </a:p>
           <a:p>
@@ -11413,7 +10184,7 @@
           <a:lstStyle/>
           <a:p>
             <a:r>
-              <a:rPr lang="en-US" sz="3200" dirty="0" smtClean="0">
+              <a:rPr lang="en-US" sz="3200" dirty="0">
                 <a:solidFill>
                   <a:srgbClr val="FF7A00"/>
                 </a:solidFill>
@@ -11432,18 +10203,7 @@
                 <a:ea typeface="Helvetica" charset="0"/>
                 <a:cs typeface="Helvetica" charset="0"/>
               </a:rPr>
-              <a:t>contrast </a:t>
-            </a:r>
-            <a:r>
-              <a:rPr lang="en-US" sz="3200" smtClean="0">
-                <a:solidFill>
-                  <a:srgbClr val="FF7A00"/>
-                </a:solidFill>
-                <a:latin typeface="Helvetica" charset="0"/>
-                <a:ea typeface="Helvetica" charset="0"/>
-                <a:cs typeface="Helvetica" charset="0"/>
-              </a:rPr>
-              <a:t>manipulation</a:t>
+              <a:t>contrast manipulation</a:t>
             </a:r>
             <a:endParaRPr lang="en-US" sz="3200" dirty="0">
               <a:solidFill>
@@ -11461,7 +10221,7 @@
           <p:cNvPr id="184" name="Oval 183">
             <a:extLst>
               <a:ext uri="{FF2B5EF4-FFF2-40B4-BE49-F238E27FC236}">
-                <a16:creationId xmlns="" xmlns:a16="http://schemas.microsoft.com/office/drawing/2014/main" id="{118047CB-EC8D-4B4F-A0D3-30378AAC069B}"/>
+                <a16:creationId xmlns:a16="http://schemas.microsoft.com/office/drawing/2014/main" id="{118047CB-EC8D-4B4F-A0D3-30378AAC069B}"/>
               </a:ext>
             </a:extLst>
           </p:cNvPr>
@@ -11543,7 +10303,7 @@
               <a:t>a</a:t>
             </a:r>
             <a:r>
-              <a:rPr lang="en-US" sz="3200" smtClean="0">
+              <a:rPr lang="en-US" sz="3200">
                 <a:solidFill>
                   <a:schemeClr val="accent6"/>
                 </a:solidFill>
@@ -11554,7 +10314,7 @@
               <a:t>symmetry </a:t>
             </a:r>
             <a:r>
-              <a:rPr lang="en-US" sz="3200" dirty="0" smtClean="0">
+              <a:rPr lang="en-US" sz="3200" dirty="0">
                 <a:solidFill>
                   <a:schemeClr val="accent6"/>
                 </a:solidFill>
@@ -11564,14 +10324,6 @@
               </a:rPr>
               <a:t>in 1-of-2 vs. 2-of-4</a:t>
             </a:r>
-            <a:endParaRPr lang="en-US" sz="3200" dirty="0">
-              <a:solidFill>
-                <a:schemeClr val="accent6"/>
-              </a:solidFill>
-              <a:latin typeface="Helvetica" charset="0"/>
-              <a:ea typeface="Helvetica" charset="0"/>
-              <a:cs typeface="Helvetica" charset="0"/>
-            </a:endParaRPr>
           </a:p>
         </p:txBody>
       </p:sp>
@@ -11580,7 +10332,7 @@
           <p:cNvPr id="186" name="Picture 185">
             <a:extLst>
               <a:ext uri="{FF2B5EF4-FFF2-40B4-BE49-F238E27FC236}">
-                <a16:creationId xmlns="" xmlns:a16="http://schemas.microsoft.com/office/drawing/2014/main" id="{8D050889-FB9D-491E-A95E-778F47B1E4FE}"/>
+                <a16:creationId xmlns:a16="http://schemas.microsoft.com/office/drawing/2014/main" id="{8D050889-FB9D-491E-A95E-778F47B1E4FE}"/>
               </a:ext>
             </a:extLst>
           </p:cNvPr>
@@ -11597,7 +10349,7 @@
         </p:blipFill>
         <p:spPr>
           <a:xfrm>
-            <a:off x="38021702" y="16567377"/>
+            <a:off x="38023532" y="16533189"/>
             <a:ext cx="895333" cy="938869"/>
           </a:xfrm>
           <a:prstGeom prst="rect">
@@ -11610,7 +10362,7 @@
           <p:cNvPr id="187" name="Picture 186">
             <a:extLst>
               <a:ext uri="{FF2B5EF4-FFF2-40B4-BE49-F238E27FC236}">
-                <a16:creationId xmlns="" xmlns:a16="http://schemas.microsoft.com/office/drawing/2014/main" id="{B349EB11-C20A-4667-A424-E10A4DF13D8A}"/>
+                <a16:creationId xmlns:a16="http://schemas.microsoft.com/office/drawing/2014/main" id="{B349EB11-C20A-4667-A424-E10A4DF13D8A}"/>
               </a:ext>
             </a:extLst>
           </p:cNvPr>
@@ -11627,7 +10379,7 @@
         </p:blipFill>
         <p:spPr>
           <a:xfrm>
-            <a:off x="37185010" y="17117033"/>
+            <a:off x="37186840" y="17082845"/>
             <a:ext cx="902547" cy="946434"/>
           </a:xfrm>
           <a:prstGeom prst="rect">
@@ -11640,7 +10392,7 @@
           <p:cNvPr id="194" name="TextBox 193">
             <a:extLst>
               <a:ext uri="{FF2B5EF4-FFF2-40B4-BE49-F238E27FC236}">
-                <a16:creationId xmlns="" xmlns:a16="http://schemas.microsoft.com/office/drawing/2014/main" id="{B8ABCD8D-7AB3-4BE8-9866-CD5EBA48CAC3}"/>
+                <a16:creationId xmlns:a16="http://schemas.microsoft.com/office/drawing/2014/main" id="{B8ABCD8D-7AB3-4BE8-9866-CD5EBA48CAC3}"/>
               </a:ext>
             </a:extLst>
           </p:cNvPr>
@@ -11649,7 +10401,7 @@
         </p:nvSpPr>
         <p:spPr>
           <a:xfrm>
-            <a:off x="37152105" y="18081913"/>
+            <a:off x="37153935" y="18047725"/>
             <a:ext cx="4717206" cy="1077218"/>
           </a:xfrm>
           <a:prstGeom prst="rect">
@@ -11670,26 +10422,13 @@
                 <a:ea typeface="Helvetica" charset="0"/>
                 <a:cs typeface="Helvetica" charset="0"/>
               </a:rPr>
-              <a:t>t</a:t>
-            </a:r>
-            <a:r>
-              <a:rPr lang="en-US" sz="3200" dirty="0" smtClean="0">
-                <a:latin typeface="Courier"/>
-                <a:ea typeface="Helvetica" charset="0"/>
-                <a:cs typeface="Helvetica" charset="0"/>
-              </a:rPr>
-              <a:t>wo-not</a:t>
-            </a:r>
-            <a:endParaRPr lang="en-US" sz="3200" dirty="0">
-              <a:latin typeface="Courier"/>
-              <a:ea typeface="Helvetica" charset="0"/>
-              <a:cs typeface="Helvetica" charset="0"/>
-            </a:endParaRPr>
+              <a:t>two-not</a:t>
+            </a:r>
           </a:p>
           <a:p>
             <a:pPr algn="ctr"/>
             <a:r>
-              <a:rPr lang="en-US" sz="3200" dirty="0" smtClean="0">
+              <a:rPr lang="en-US" sz="3200" dirty="0">
                 <a:latin typeface="Helvetica" charset="0"/>
                 <a:ea typeface="Helvetica" charset="0"/>
                 <a:cs typeface="Helvetica" charset="0"/>
@@ -11697,7 +10436,7 @@
               <a:t>Adults: </a:t>
             </a:r>
             <a:r>
-              <a:rPr lang="en-US" sz="3200" dirty="0" smtClean="0">
+              <a:rPr lang="en-US" sz="3200" dirty="0">
                 <a:solidFill>
                   <a:srgbClr val="00B150"/>
                 </a:solidFill>
@@ -11707,14 +10446,6 @@
               </a:rPr>
               <a:t>100%</a:t>
             </a:r>
-            <a:endParaRPr lang="en-US" sz="3200" dirty="0">
-              <a:solidFill>
-                <a:srgbClr val="00B150"/>
-              </a:solidFill>
-              <a:latin typeface="Helvetica" charset="0"/>
-              <a:ea typeface="Helvetica" charset="0"/>
-              <a:cs typeface="Helvetica" charset="0"/>
-            </a:endParaRPr>
           </a:p>
         </p:txBody>
       </p:sp>
@@ -11723,7 +10454,7 @@
           <p:cNvPr id="195" name="Picture 194">
             <a:extLst>
               <a:ext uri="{FF2B5EF4-FFF2-40B4-BE49-F238E27FC236}">
-                <a16:creationId xmlns="" xmlns:a16="http://schemas.microsoft.com/office/drawing/2014/main" id="{D0537AEA-9B42-407A-824E-FFBD9B10FDE9}"/>
+                <a16:creationId xmlns:a16="http://schemas.microsoft.com/office/drawing/2014/main" id="{D0537AEA-9B42-407A-824E-FFBD9B10FDE9}"/>
               </a:ext>
             </a:extLst>
           </p:cNvPr>
@@ -11753,7 +10484,7 @@
           <p:cNvPr id="196" name="Picture 195">
             <a:extLst>
               <a:ext uri="{FF2B5EF4-FFF2-40B4-BE49-F238E27FC236}">
-                <a16:creationId xmlns="" xmlns:a16="http://schemas.microsoft.com/office/drawing/2014/main" id="{BCAAE46D-ABE3-49E7-BC35-507A048C1266}"/>
+                <a16:creationId xmlns:a16="http://schemas.microsoft.com/office/drawing/2014/main" id="{BCAAE46D-ABE3-49E7-BC35-507A048C1266}"/>
               </a:ext>
             </a:extLst>
           </p:cNvPr>
@@ -11783,7 +10514,7 @@
           <p:cNvPr id="135" name="TextBox 134">
             <a:extLst>
               <a:ext uri="{FF2B5EF4-FFF2-40B4-BE49-F238E27FC236}">
-                <a16:creationId xmlns="" xmlns:a16="http://schemas.microsoft.com/office/drawing/2014/main" id="{EF25DB67-E21E-4EE0-821F-CA444EDA7760}"/>
+                <a16:creationId xmlns:a16="http://schemas.microsoft.com/office/drawing/2014/main" id="{EF25DB67-E21E-4EE0-821F-CA444EDA7760}"/>
               </a:ext>
             </a:extLst>
           </p:cNvPr>
@@ -11807,7 +10538,7 @@
           <a:lstStyle/>
           <a:p>
             <a:r>
-              <a:rPr lang="en-US" sz="3200" b="1" dirty="0" smtClean="0">
+              <a:rPr lang="en-US" sz="3200" b="1" dirty="0">
                 <a:latin typeface="Helvetica" charset="0"/>
                 <a:ea typeface="Helvetica" charset="0"/>
                 <a:cs typeface="Helvetica" charset="0"/>
@@ -11892,32 +10623,14 @@
           <a:lstStyle/>
           <a:p>
             <a:r>
-              <a:rPr lang="en-US" sz="3200" dirty="0" smtClean="0">
-                <a:solidFill>
-                  <a:srgbClr val="00B150"/>
-                </a:solidFill>
+              <a:rPr lang="en-US" sz="3200" dirty="0">
                 <a:latin typeface="Helvetica" panose="020B0604020202020204" pitchFamily="34" charset="0"/>
                 <a:ea typeface="Courier" charset="0"/>
                 <a:cs typeface="Helvetica" panose="020B0604020202020204" pitchFamily="34" charset="0"/>
               </a:rPr>
-              <a:t>90-100</a:t>
-            </a:r>
-            <a:r>
-              <a:rPr lang="en-US" sz="3200" dirty="0" smtClean="0">
-                <a:solidFill>
-                  <a:srgbClr val="00B150"/>
-                </a:solidFill>
-                <a:latin typeface="Helvetica" panose="020B0604020202020204" pitchFamily="34" charset="0"/>
-                <a:ea typeface="Courier" charset="0"/>
-                <a:cs typeface="Helvetica" panose="020B0604020202020204" pitchFamily="34" charset="0"/>
-              </a:rPr>
-              <a:t>% endorsement</a:t>
-            </a:r>
-            <a:endParaRPr lang="en-US" sz="3200" dirty="0">
-              <a:solidFill>
-                <a:srgbClr val="00B150"/>
-              </a:solidFill>
-            </a:endParaRPr>
+              <a:t>90-100% endorsement</a:t>
+            </a:r>
+            <a:endParaRPr lang="en-US" sz="3200" dirty="0"/>
           </a:p>
         </p:txBody>
       </p:sp>
@@ -11943,10 +10656,7 @@
           <a:lstStyle/>
           <a:p>
             <a:r>
-              <a:rPr lang="en-US" sz="3200" dirty="0" smtClean="0">
-                <a:solidFill>
-                  <a:srgbClr val="FF0000"/>
-                </a:solidFill>
+              <a:rPr lang="en-US" sz="3200" dirty="0">
                 <a:latin typeface="Helvetica" panose="020B0604020202020204" pitchFamily="34" charset="0"/>
                 <a:ea typeface="Courier" charset="0"/>
                 <a:cs typeface="Helvetica" panose="020B0604020202020204" pitchFamily="34" charset="0"/>
@@ -11956,21 +10666,14 @@
           </a:p>
           <a:p>
             <a:r>
-              <a:rPr lang="en-US" sz="3200" dirty="0" smtClean="0">
-                <a:solidFill>
-                  <a:srgbClr val="FF0000"/>
-                </a:solidFill>
+              <a:rPr lang="en-US" sz="3200" dirty="0">
                 <a:latin typeface="Helvetica" panose="020B0604020202020204" pitchFamily="34" charset="0"/>
                 <a:ea typeface="Courier" charset="0"/>
                 <a:cs typeface="Helvetica" panose="020B0604020202020204" pitchFamily="34" charset="0"/>
               </a:rPr>
               <a:t>endorsement</a:t>
             </a:r>
-            <a:endParaRPr lang="en-US" sz="3200" dirty="0">
-              <a:solidFill>
-                <a:srgbClr val="FF0000"/>
-              </a:solidFill>
-            </a:endParaRPr>
+            <a:endParaRPr lang="en-US" sz="3200" dirty="0"/>
           </a:p>
         </p:txBody>
       </p:sp>
@@ -12000,7 +10703,7 @@
               <a:buChar char="v"/>
             </a:pPr>
             <a:r>
-              <a:rPr lang="en-US" sz="3200" dirty="0" smtClean="0">
+              <a:rPr lang="en-US" sz="3200" dirty="0">
                 <a:latin typeface="Helvetica" charset="0"/>
                 <a:ea typeface="Helvetica" charset="0"/>
                 <a:cs typeface="Helvetica" charset="0"/>
@@ -12008,18 +10711,13 @@
               <a:t>language understanding as </a:t>
             </a:r>
             <a:r>
-              <a:rPr lang="en-US" sz="3200" b="1" dirty="0" smtClean="0">
+              <a:rPr lang="en-US" sz="3200" b="1" dirty="0">
                 <a:latin typeface="Helvetica" charset="0"/>
                 <a:ea typeface="Helvetica" charset="0"/>
                 <a:cs typeface="Helvetica" charset="0"/>
               </a:rPr>
               <a:t>recursive social reasoning</a:t>
             </a:r>
-            <a:endParaRPr lang="en-US" sz="3200" b="1" dirty="0">
-              <a:latin typeface="Helvetica" charset="0"/>
-              <a:ea typeface="Helvetica" charset="0"/>
-              <a:cs typeface="Helvetica" charset="0"/>
-            </a:endParaRPr>
           </a:p>
         </p:txBody>
       </p:sp>
@@ -12049,18 +10747,11 @@
               <a:buChar char="v"/>
             </a:pPr>
             <a:r>
-              <a:rPr lang="en-US" sz="3200" dirty="0" smtClean="0">
+              <a:rPr lang="en-US" sz="3200" dirty="0">
                 <a:latin typeface="Helvetica" panose="020B0604020202020204" pitchFamily="34" charset="0"/>
                 <a:cs typeface="Helvetica" panose="020B0604020202020204" pitchFamily="34" charset="0"/>
               </a:rPr>
-              <a:t>ambiguity </a:t>
-            </a:r>
-            <a:r>
-              <a:rPr lang="en-US" sz="3200" dirty="0">
-                <a:latin typeface="Helvetica" panose="020B0604020202020204" pitchFamily="34" charset="0"/>
-                <a:cs typeface="Helvetica" panose="020B0604020202020204" pitchFamily="34" charset="0"/>
-              </a:rPr>
-              <a:t>resolution modeled as </a:t>
+              <a:t>ambiguity resolution modeled as </a:t>
             </a:r>
             <a:r>
               <a:rPr lang="en-US" sz="3200" b="1" dirty="0">
@@ -12092,7 +10783,7 @@
             <p:cNvPr id="144" name="Picture 143">
               <a:extLst>
                 <a:ext uri="{FF2B5EF4-FFF2-40B4-BE49-F238E27FC236}">
-                  <a16:creationId xmlns="" xmlns:a16="http://schemas.microsoft.com/office/drawing/2014/main" id="{D32CA0A8-D98E-4213-92C4-317E441206BD}"/>
+                  <a16:creationId xmlns:a16="http://schemas.microsoft.com/office/drawing/2014/main" id="{D32CA0A8-D98E-4213-92C4-317E441206BD}"/>
                 </a:ext>
               </a:extLst>
             </p:cNvPr>
@@ -12128,7 +10819,7 @@
             <p:cNvPr id="145" name="Picture 144">
               <a:extLst>
                 <a:ext uri="{FF2B5EF4-FFF2-40B4-BE49-F238E27FC236}">
-                  <a16:creationId xmlns="" xmlns:a16="http://schemas.microsoft.com/office/drawing/2014/main" id="{3974D2D4-2650-47DF-9AA0-8C49A7307C50}"/>
+                  <a16:creationId xmlns:a16="http://schemas.microsoft.com/office/drawing/2014/main" id="{3974D2D4-2650-47DF-9AA0-8C49A7307C50}"/>
                 </a:ext>
               </a:extLst>
             </p:cNvPr>
@@ -12165,7 +10856,7 @@
           <p:cNvPr id="156" name="TextBox 155">
             <a:extLst>
               <a:ext uri="{FF2B5EF4-FFF2-40B4-BE49-F238E27FC236}">
-                <a16:creationId xmlns="" xmlns:a16="http://schemas.microsoft.com/office/drawing/2014/main" id="{17BF042B-9C15-46E9-BF43-63E86A777B20}"/>
+                <a16:creationId xmlns:a16="http://schemas.microsoft.com/office/drawing/2014/main" id="{17BF042B-9C15-46E9-BF43-63E86A777B20}"/>
               </a:ext>
             </a:extLst>
           </p:cNvPr>
@@ -12190,7 +10881,7 @@
           <a:p>
             <a:pPr algn="ctr"/>
             <a:r>
-              <a:rPr lang="en-US" sz="4200" b="1" dirty="0" smtClean="0">
+              <a:rPr lang="en-US" sz="4200" b="1" dirty="0">
                 <a:solidFill>
                   <a:schemeClr val="accent1">
                     <a:lumMod val="50000"/>
@@ -12202,16 +10893,6 @@
               </a:rPr>
               <a:t>Pragmatics drives explicit contrast behavior</a:t>
             </a:r>
-            <a:endParaRPr lang="en-US" sz="4200" b="1" dirty="0">
-              <a:solidFill>
-                <a:schemeClr val="accent1">
-                  <a:lumMod val="50000"/>
-                </a:schemeClr>
-              </a:solidFill>
-              <a:latin typeface="Helvetica" charset="0"/>
-              <a:ea typeface="Helvetica" charset="0"/>
-              <a:cs typeface="Helvetica" charset="0"/>
-            </a:endParaRPr>
           </a:p>
         </p:txBody>
       </p:sp>
@@ -12234,7 +10915,7 @@
             <p:cNvPr id="168" name="Picture 167">
               <a:extLst>
                 <a:ext uri="{FF2B5EF4-FFF2-40B4-BE49-F238E27FC236}">
-                  <a16:creationId xmlns="" xmlns:a16="http://schemas.microsoft.com/office/drawing/2014/main" id="{B9E63752-B056-4BC0-993C-71C6A9B35D6B}"/>
+                  <a16:creationId xmlns:a16="http://schemas.microsoft.com/office/drawing/2014/main" id="{B9E63752-B056-4BC0-993C-71C6A9B35D6B}"/>
                 </a:ext>
               </a:extLst>
             </p:cNvPr>
@@ -12264,7 +10945,7 @@
             <p:cNvPr id="170" name="Picture 169">
               <a:extLst>
                 <a:ext uri="{FF2B5EF4-FFF2-40B4-BE49-F238E27FC236}">
-                  <a16:creationId xmlns="" xmlns:a16="http://schemas.microsoft.com/office/drawing/2014/main" id="{B5A7751E-FFB4-4A1A-90AF-5A4CECBA4A43}"/>
+                  <a16:creationId xmlns:a16="http://schemas.microsoft.com/office/drawing/2014/main" id="{B5A7751E-FFB4-4A1A-90AF-5A4CECBA4A43}"/>
                 </a:ext>
               </a:extLst>
             </p:cNvPr>
@@ -12294,7 +10975,7 @@
             <p:cNvPr id="171" name="Picture 170">
               <a:extLst>
                 <a:ext uri="{FF2B5EF4-FFF2-40B4-BE49-F238E27FC236}">
-                  <a16:creationId xmlns="" xmlns:a16="http://schemas.microsoft.com/office/drawing/2014/main" id="{73CB8EB3-B019-47EB-B75F-F5F18125590A}"/>
+                  <a16:creationId xmlns:a16="http://schemas.microsoft.com/office/drawing/2014/main" id="{73CB8EB3-B019-47EB-B75F-F5F18125590A}"/>
                 </a:ext>
               </a:extLst>
             </p:cNvPr>
@@ -12325,7 +11006,7 @@
           <p:cNvPr id="182" name="Picture 181">
             <a:extLst>
               <a:ext uri="{FF2B5EF4-FFF2-40B4-BE49-F238E27FC236}">
-                <a16:creationId xmlns="" xmlns:a16="http://schemas.microsoft.com/office/drawing/2014/main" id="{D0537AEA-9B42-407A-824E-FFBD9B10FDE9}"/>
+                <a16:creationId xmlns:a16="http://schemas.microsoft.com/office/drawing/2014/main" id="{D0537AEA-9B42-407A-824E-FFBD9B10FDE9}"/>
               </a:ext>
             </a:extLst>
           </p:cNvPr>
@@ -12355,7 +11036,7 @@
           <p:cNvPr id="188" name="Picture 187">
             <a:extLst>
               <a:ext uri="{FF2B5EF4-FFF2-40B4-BE49-F238E27FC236}">
-                <a16:creationId xmlns="" xmlns:a16="http://schemas.microsoft.com/office/drawing/2014/main" id="{BCAAE46D-ABE3-49E7-BC35-507A048C1266}"/>
+                <a16:creationId xmlns:a16="http://schemas.microsoft.com/office/drawing/2014/main" id="{BCAAE46D-ABE3-49E7-BC35-507A048C1266}"/>
               </a:ext>
             </a:extLst>
           </p:cNvPr>

</xml_diff>